<commit_message>
post : Phoenix LiveView 에서 사용자 정의 JS code 사용 방법  추가
</commit_message>
<xml_diff>
--- a/_site/assets/docu/genserver.pptx
+++ b/_site/assets/docu/genserver.pptx
@@ -6,6 +6,7 @@
   </p:sldMasterIdLst>
   <p:sldIdLst>
     <p:sldId id="256" r:id="rId2"/>
+    <p:sldId id="257" r:id="rId3"/>
   </p:sldIdLst>
   <p:sldSz cx="12192000" cy="6858000"/>
   <p:notesSz cx="6858000" cy="9144000"/>
@@ -259,7 +260,7 @@
           <a:p>
             <a:fld id="{AAC9601E-31FD-458B-B714-EFF76A516D36}" type="datetimeFigureOut">
               <a:rPr lang="ko-KR" altLang="en-US" smtClean="0"/>
-              <a:t>2024-01-23</a:t>
+              <a:t>2024-01-24</a:t>
             </a:fld>
             <a:endParaRPr lang="ko-KR" altLang="en-US"/>
           </a:p>
@@ -457,7 +458,7 @@
           <a:p>
             <a:fld id="{AAC9601E-31FD-458B-B714-EFF76A516D36}" type="datetimeFigureOut">
               <a:rPr lang="ko-KR" altLang="en-US" smtClean="0"/>
-              <a:t>2024-01-23</a:t>
+              <a:t>2024-01-24</a:t>
             </a:fld>
             <a:endParaRPr lang="ko-KR" altLang="en-US"/>
           </a:p>
@@ -665,7 +666,7 @@
           <a:p>
             <a:fld id="{AAC9601E-31FD-458B-B714-EFF76A516D36}" type="datetimeFigureOut">
               <a:rPr lang="ko-KR" altLang="en-US" smtClean="0"/>
-              <a:t>2024-01-23</a:t>
+              <a:t>2024-01-24</a:t>
             </a:fld>
             <a:endParaRPr lang="ko-KR" altLang="en-US"/>
           </a:p>
@@ -863,7 +864,7 @@
           <a:p>
             <a:fld id="{AAC9601E-31FD-458B-B714-EFF76A516D36}" type="datetimeFigureOut">
               <a:rPr lang="ko-KR" altLang="en-US" smtClean="0"/>
-              <a:t>2024-01-23</a:t>
+              <a:t>2024-01-24</a:t>
             </a:fld>
             <a:endParaRPr lang="ko-KR" altLang="en-US"/>
           </a:p>
@@ -1138,7 +1139,7 @@
           <a:p>
             <a:fld id="{AAC9601E-31FD-458B-B714-EFF76A516D36}" type="datetimeFigureOut">
               <a:rPr lang="ko-KR" altLang="en-US" smtClean="0"/>
-              <a:t>2024-01-23</a:t>
+              <a:t>2024-01-24</a:t>
             </a:fld>
             <a:endParaRPr lang="ko-KR" altLang="en-US"/>
           </a:p>
@@ -1403,7 +1404,7 @@
           <a:p>
             <a:fld id="{AAC9601E-31FD-458B-B714-EFF76A516D36}" type="datetimeFigureOut">
               <a:rPr lang="ko-KR" altLang="en-US" smtClean="0"/>
-              <a:t>2024-01-23</a:t>
+              <a:t>2024-01-24</a:t>
             </a:fld>
             <a:endParaRPr lang="ko-KR" altLang="en-US"/>
           </a:p>
@@ -1815,7 +1816,7 @@
           <a:p>
             <a:fld id="{AAC9601E-31FD-458B-B714-EFF76A516D36}" type="datetimeFigureOut">
               <a:rPr lang="ko-KR" altLang="en-US" smtClean="0"/>
-              <a:t>2024-01-23</a:t>
+              <a:t>2024-01-24</a:t>
             </a:fld>
             <a:endParaRPr lang="ko-KR" altLang="en-US"/>
           </a:p>
@@ -1956,7 +1957,7 @@
           <a:p>
             <a:fld id="{AAC9601E-31FD-458B-B714-EFF76A516D36}" type="datetimeFigureOut">
               <a:rPr lang="ko-KR" altLang="en-US" smtClean="0"/>
-              <a:t>2024-01-23</a:t>
+              <a:t>2024-01-24</a:t>
             </a:fld>
             <a:endParaRPr lang="ko-KR" altLang="en-US"/>
           </a:p>
@@ -2069,7 +2070,7 @@
           <a:p>
             <a:fld id="{AAC9601E-31FD-458B-B714-EFF76A516D36}" type="datetimeFigureOut">
               <a:rPr lang="ko-KR" altLang="en-US" smtClean="0"/>
-              <a:t>2024-01-23</a:t>
+              <a:t>2024-01-24</a:t>
             </a:fld>
             <a:endParaRPr lang="ko-KR" altLang="en-US"/>
           </a:p>
@@ -2380,7 +2381,7 @@
           <a:p>
             <a:fld id="{AAC9601E-31FD-458B-B714-EFF76A516D36}" type="datetimeFigureOut">
               <a:rPr lang="ko-KR" altLang="en-US" smtClean="0"/>
-              <a:t>2024-01-23</a:t>
+              <a:t>2024-01-24</a:t>
             </a:fld>
             <a:endParaRPr lang="ko-KR" altLang="en-US"/>
           </a:p>
@@ -2668,7 +2669,7 @@
           <a:p>
             <a:fld id="{AAC9601E-31FD-458B-B714-EFF76A516D36}" type="datetimeFigureOut">
               <a:rPr lang="ko-KR" altLang="en-US" smtClean="0"/>
-              <a:t>2024-01-23</a:t>
+              <a:t>2024-01-24</a:t>
             </a:fld>
             <a:endParaRPr lang="ko-KR" altLang="en-US"/>
           </a:p>
@@ -2909,7 +2910,7 @@
           <a:p>
             <a:fld id="{AAC9601E-31FD-458B-B714-EFF76A516D36}" type="datetimeFigureOut">
               <a:rPr lang="ko-KR" altLang="en-US" smtClean="0"/>
-              <a:t>2024-01-23</a:t>
+              <a:t>2024-01-24</a:t>
             </a:fld>
             <a:endParaRPr lang="ko-KR" altLang="en-US"/>
           </a:p>
@@ -4377,6 +4378,180 @@
 </p:sld>
 </file>
 
+<file path=ppt/slides/slide2.xml><?xml version="1.0" encoding="utf-8"?>
+<p:sld xmlns:a="http://schemas.openxmlformats.org/drawingml/2006/main" xmlns:r="http://schemas.openxmlformats.org/officeDocument/2006/relationships" xmlns:p="http://schemas.openxmlformats.org/presentationml/2006/main">
+  <p:cSld>
+    <p:spTree>
+      <p:nvGrpSpPr>
+        <p:cNvPr id="1" name=""/>
+        <p:cNvGrpSpPr/>
+        <p:nvPr/>
+      </p:nvGrpSpPr>
+      <p:grpSpPr>
+        <a:xfrm>
+          <a:off x="0" y="0"/>
+          <a:ext cx="0" cy="0"/>
+          <a:chOff x="0" y="0"/>
+          <a:chExt cx="0" cy="0"/>
+        </a:xfrm>
+      </p:grpSpPr>
+      <p:sp>
+        <p:nvSpPr>
+          <p:cNvPr id="6" name="직사각형 5">
+            <a:extLst>
+              <a:ext uri="{FF2B5EF4-FFF2-40B4-BE49-F238E27FC236}">
+                <a16:creationId xmlns:a16="http://schemas.microsoft.com/office/drawing/2014/main" id="{621F2BB9-AED8-E4E6-D989-17EB4D3E2995}"/>
+              </a:ext>
+            </a:extLst>
+          </p:cNvPr>
+          <p:cNvSpPr/>
+          <p:nvPr/>
+        </p:nvSpPr>
+        <p:spPr>
+          <a:xfrm>
+            <a:off x="2977785" y="3718637"/>
+            <a:ext cx="1024511" cy="512255"/>
+          </a:xfrm>
+          <a:prstGeom prst="rect">
+            <a:avLst/>
+          </a:prstGeom>
+          <a:solidFill>
+            <a:schemeClr val="bg2">
+              <a:lumMod val="90000"/>
+            </a:schemeClr>
+          </a:solidFill>
+          <a:ln>
+            <a:noFill/>
+          </a:ln>
+        </p:spPr>
+        <p:style>
+          <a:lnRef idx="2">
+            <a:schemeClr val="accent1">
+              <a:shade val="15000"/>
+            </a:schemeClr>
+          </a:lnRef>
+          <a:fillRef idx="1">
+            <a:schemeClr val="accent1"/>
+          </a:fillRef>
+          <a:effectRef idx="0">
+            <a:schemeClr val="accent1"/>
+          </a:effectRef>
+          <a:fontRef idx="minor">
+            <a:schemeClr val="lt1"/>
+          </a:fontRef>
+        </p:style>
+        <p:txBody>
+          <a:bodyPr rtlCol="0" anchor="ctr"/>
+          <a:lstStyle/>
+          <a:p>
+            <a:pPr algn="ctr"/>
+            <a:endParaRPr lang="ko-KR" altLang="en-US"/>
+          </a:p>
+        </p:txBody>
+      </p:sp>
+      <p:sp>
+        <p:nvSpPr>
+          <p:cNvPr id="7" name="직사각형 6">
+            <a:extLst>
+              <a:ext uri="{FF2B5EF4-FFF2-40B4-BE49-F238E27FC236}">
+                <a16:creationId xmlns:a16="http://schemas.microsoft.com/office/drawing/2014/main" id="{00206F83-3853-D3C8-F832-7831866F04BB}"/>
+              </a:ext>
+            </a:extLst>
+          </p:cNvPr>
+          <p:cNvSpPr/>
+          <p:nvPr/>
+        </p:nvSpPr>
+        <p:spPr>
+          <a:xfrm>
+            <a:off x="5921259" y="3718638"/>
+            <a:ext cx="1024511" cy="512255"/>
+          </a:xfrm>
+          <a:prstGeom prst="rect">
+            <a:avLst/>
+          </a:prstGeom>
+          <a:solidFill>
+            <a:schemeClr val="bg2">
+              <a:lumMod val="90000"/>
+            </a:schemeClr>
+          </a:solidFill>
+          <a:ln>
+            <a:noFill/>
+          </a:ln>
+        </p:spPr>
+        <p:style>
+          <a:lnRef idx="2">
+            <a:schemeClr val="accent1">
+              <a:shade val="15000"/>
+            </a:schemeClr>
+          </a:lnRef>
+          <a:fillRef idx="1">
+            <a:schemeClr val="accent1"/>
+          </a:fillRef>
+          <a:effectRef idx="0">
+            <a:schemeClr val="accent1"/>
+          </a:effectRef>
+          <a:fontRef idx="minor">
+            <a:schemeClr val="lt1"/>
+          </a:fontRef>
+        </p:style>
+        <p:txBody>
+          <a:bodyPr rtlCol="0" anchor="ctr"/>
+          <a:lstStyle/>
+          <a:p>
+            <a:pPr algn="ctr"/>
+            <a:endParaRPr lang="ko-KR" altLang="en-US"/>
+          </a:p>
+        </p:txBody>
+      </p:sp>
+      <p:pic>
+        <p:nvPicPr>
+          <p:cNvPr id="5" name="그림 4">
+            <a:extLst>
+              <a:ext uri="{FF2B5EF4-FFF2-40B4-BE49-F238E27FC236}">
+                <a16:creationId xmlns:a16="http://schemas.microsoft.com/office/drawing/2014/main" id="{E6967DF4-6F93-2C95-0205-48AF9DE32913}"/>
+              </a:ext>
+            </a:extLst>
+          </p:cNvPr>
+          <p:cNvPicPr>
+            <a:picLocks noChangeAspect="1"/>
+          </p:cNvPicPr>
+          <p:nvPr/>
+        </p:nvPicPr>
+        <p:blipFill>
+          <a:blip r:embed="rId2">
+            <a:extLst>
+              <a:ext uri="{28A0092B-C50C-407E-A947-70E740481C1C}">
+                <a14:useLocalDpi xmlns:a14="http://schemas.microsoft.com/office/drawing/2010/main" val="0"/>
+              </a:ext>
+            </a:extLst>
+          </a:blip>
+          <a:stretch>
+            <a:fillRect/>
+          </a:stretch>
+        </p:blipFill>
+        <p:spPr>
+          <a:xfrm>
+            <a:off x="2275327" y="3350876"/>
+            <a:ext cx="5372100" cy="1247775"/>
+          </a:xfrm>
+          <a:prstGeom prst="rect">
+            <a:avLst/>
+          </a:prstGeom>
+        </p:spPr>
+      </p:pic>
+    </p:spTree>
+    <p:extLst>
+      <p:ext uri="{BB962C8B-B14F-4D97-AF65-F5344CB8AC3E}">
+        <p14:creationId xmlns:p14="http://schemas.microsoft.com/office/powerpoint/2010/main" val="2704521900"/>
+      </p:ext>
+    </p:extLst>
+  </p:cSld>
+  <p:clrMapOvr>
+    <a:masterClrMapping/>
+  </p:clrMapOvr>
+</p:sld>
+</file>
+
 <file path=ppt/theme/theme1.xml><?xml version="1.0" encoding="utf-8"?>
 <a:theme xmlns:a="http://schemas.openxmlformats.org/drawingml/2006/main" name="Office 테마">
   <a:themeElements>

</xml_diff>

<commit_message>
post 추가  (IPC 실습 03 - Unix socket / IPC 실습 04 - Shared Memeory)
</commit_message>
<xml_diff>
--- a/_site/assets/docu/genserver.pptx
+++ b/_site/assets/docu/genserver.pptx
@@ -9,6 +9,8 @@
     <p:sldId id="257" r:id="rId3"/>
     <p:sldId id="258" r:id="rId4"/>
     <p:sldId id="259" r:id="rId5"/>
+    <p:sldId id="260" r:id="rId6"/>
+    <p:sldId id="261" r:id="rId7"/>
   </p:sldIdLst>
   <p:sldSz cx="12192000" cy="6858000"/>
   <p:notesSz cx="6858000" cy="9144000"/>
@@ -262,7 +264,7 @@
           <a:p>
             <a:fld id="{AAC9601E-31FD-458B-B714-EFF76A516D36}" type="datetimeFigureOut">
               <a:rPr lang="ko-KR" altLang="en-US" smtClean="0"/>
-              <a:t>2024-02-23</a:t>
+              <a:t>2024-03-20</a:t>
             </a:fld>
             <a:endParaRPr lang="ko-KR" altLang="en-US"/>
           </a:p>
@@ -460,7 +462,7 @@
           <a:p>
             <a:fld id="{AAC9601E-31FD-458B-B714-EFF76A516D36}" type="datetimeFigureOut">
               <a:rPr lang="ko-KR" altLang="en-US" smtClean="0"/>
-              <a:t>2024-02-23</a:t>
+              <a:t>2024-03-20</a:t>
             </a:fld>
             <a:endParaRPr lang="ko-KR" altLang="en-US"/>
           </a:p>
@@ -668,7 +670,7 @@
           <a:p>
             <a:fld id="{AAC9601E-31FD-458B-B714-EFF76A516D36}" type="datetimeFigureOut">
               <a:rPr lang="ko-KR" altLang="en-US" smtClean="0"/>
-              <a:t>2024-02-23</a:t>
+              <a:t>2024-03-20</a:t>
             </a:fld>
             <a:endParaRPr lang="ko-KR" altLang="en-US"/>
           </a:p>
@@ -866,7 +868,7 @@
           <a:p>
             <a:fld id="{AAC9601E-31FD-458B-B714-EFF76A516D36}" type="datetimeFigureOut">
               <a:rPr lang="ko-KR" altLang="en-US" smtClean="0"/>
-              <a:t>2024-02-23</a:t>
+              <a:t>2024-03-20</a:t>
             </a:fld>
             <a:endParaRPr lang="ko-KR" altLang="en-US"/>
           </a:p>
@@ -1141,7 +1143,7 @@
           <a:p>
             <a:fld id="{AAC9601E-31FD-458B-B714-EFF76A516D36}" type="datetimeFigureOut">
               <a:rPr lang="ko-KR" altLang="en-US" smtClean="0"/>
-              <a:t>2024-02-23</a:t>
+              <a:t>2024-03-20</a:t>
             </a:fld>
             <a:endParaRPr lang="ko-KR" altLang="en-US"/>
           </a:p>
@@ -1406,7 +1408,7 @@
           <a:p>
             <a:fld id="{AAC9601E-31FD-458B-B714-EFF76A516D36}" type="datetimeFigureOut">
               <a:rPr lang="ko-KR" altLang="en-US" smtClean="0"/>
-              <a:t>2024-02-23</a:t>
+              <a:t>2024-03-20</a:t>
             </a:fld>
             <a:endParaRPr lang="ko-KR" altLang="en-US"/>
           </a:p>
@@ -1818,7 +1820,7 @@
           <a:p>
             <a:fld id="{AAC9601E-31FD-458B-B714-EFF76A516D36}" type="datetimeFigureOut">
               <a:rPr lang="ko-KR" altLang="en-US" smtClean="0"/>
-              <a:t>2024-02-23</a:t>
+              <a:t>2024-03-20</a:t>
             </a:fld>
             <a:endParaRPr lang="ko-KR" altLang="en-US"/>
           </a:p>
@@ -1959,7 +1961,7 @@
           <a:p>
             <a:fld id="{AAC9601E-31FD-458B-B714-EFF76A516D36}" type="datetimeFigureOut">
               <a:rPr lang="ko-KR" altLang="en-US" smtClean="0"/>
-              <a:t>2024-02-23</a:t>
+              <a:t>2024-03-20</a:t>
             </a:fld>
             <a:endParaRPr lang="ko-KR" altLang="en-US"/>
           </a:p>
@@ -2072,7 +2074,7 @@
           <a:p>
             <a:fld id="{AAC9601E-31FD-458B-B714-EFF76A516D36}" type="datetimeFigureOut">
               <a:rPr lang="ko-KR" altLang="en-US" smtClean="0"/>
-              <a:t>2024-02-23</a:t>
+              <a:t>2024-03-20</a:t>
             </a:fld>
             <a:endParaRPr lang="ko-KR" altLang="en-US"/>
           </a:p>
@@ -2383,7 +2385,7 @@
           <a:p>
             <a:fld id="{AAC9601E-31FD-458B-B714-EFF76A516D36}" type="datetimeFigureOut">
               <a:rPr lang="ko-KR" altLang="en-US" smtClean="0"/>
-              <a:t>2024-02-23</a:t>
+              <a:t>2024-03-20</a:t>
             </a:fld>
             <a:endParaRPr lang="ko-KR" altLang="en-US"/>
           </a:p>
@@ -2671,7 +2673,7 @@
           <a:p>
             <a:fld id="{AAC9601E-31FD-458B-B714-EFF76A516D36}" type="datetimeFigureOut">
               <a:rPr lang="ko-KR" altLang="en-US" smtClean="0"/>
-              <a:t>2024-02-23</a:t>
+              <a:t>2024-03-20</a:t>
             </a:fld>
             <a:endParaRPr lang="ko-KR" altLang="en-US"/>
           </a:p>
@@ -2912,7 +2914,7 @@
           <a:p>
             <a:fld id="{AAC9601E-31FD-458B-B714-EFF76A516D36}" type="datetimeFigureOut">
               <a:rPr lang="ko-KR" altLang="en-US" smtClean="0"/>
-              <a:t>2024-02-23</a:t>
+              <a:t>2024-03-20</a:t>
             </a:fld>
             <a:endParaRPr lang="ko-KR" altLang="en-US"/>
           </a:p>
@@ -5889,6 +5891,2017 @@
 </p:sld>
 </file>
 
+<file path=ppt/slides/slide5.xml><?xml version="1.0" encoding="utf-8"?>
+<p:sld xmlns:a="http://schemas.openxmlformats.org/drawingml/2006/main" xmlns:r="http://schemas.openxmlformats.org/officeDocument/2006/relationships" xmlns:p="http://schemas.openxmlformats.org/presentationml/2006/main">
+  <p:cSld>
+    <p:spTree>
+      <p:nvGrpSpPr>
+        <p:cNvPr id="1" name=""/>
+        <p:cNvGrpSpPr/>
+        <p:nvPr/>
+      </p:nvGrpSpPr>
+      <p:grpSpPr>
+        <a:xfrm>
+          <a:off x="0" y="0"/>
+          <a:ext cx="0" cy="0"/>
+          <a:chOff x="0" y="0"/>
+          <a:chExt cx="0" cy="0"/>
+        </a:xfrm>
+      </p:grpSpPr>
+      <p:sp>
+        <p:nvSpPr>
+          <p:cNvPr id="4" name="사각형: 둥근 모서리 3">
+            <a:extLst>
+              <a:ext uri="{FF2B5EF4-FFF2-40B4-BE49-F238E27FC236}">
+                <a16:creationId xmlns:a16="http://schemas.microsoft.com/office/drawing/2014/main" id="{F3D35D1D-BC8B-A5AD-3BBB-3967C0CF4D28}"/>
+              </a:ext>
+            </a:extLst>
+          </p:cNvPr>
+          <p:cNvSpPr/>
+          <p:nvPr/>
+        </p:nvSpPr>
+        <p:spPr>
+          <a:xfrm>
+            <a:off x="2016706" y="2183070"/>
+            <a:ext cx="2700113" cy="1986785"/>
+          </a:xfrm>
+          <a:prstGeom prst="roundRect">
+            <a:avLst/>
+          </a:prstGeom>
+          <a:noFill/>
+          <a:ln>
+            <a:prstDash val="solid"/>
+          </a:ln>
+        </p:spPr>
+        <p:style>
+          <a:lnRef idx="2">
+            <a:schemeClr val="accent1">
+              <a:shade val="15000"/>
+            </a:schemeClr>
+          </a:lnRef>
+          <a:fillRef idx="1">
+            <a:schemeClr val="accent1"/>
+          </a:fillRef>
+          <a:effectRef idx="0">
+            <a:schemeClr val="accent1"/>
+          </a:effectRef>
+          <a:fontRef idx="minor">
+            <a:schemeClr val="lt1"/>
+          </a:fontRef>
+        </p:style>
+        <p:txBody>
+          <a:bodyPr rtlCol="0" anchor="ctr"/>
+          <a:lstStyle/>
+          <a:p>
+            <a:pPr algn="ctr"/>
+            <a:endParaRPr lang="ko-KR" altLang="en-US"/>
+          </a:p>
+        </p:txBody>
+      </p:sp>
+      <p:sp>
+        <p:nvSpPr>
+          <p:cNvPr id="5" name="TextBox 4">
+            <a:extLst>
+              <a:ext uri="{FF2B5EF4-FFF2-40B4-BE49-F238E27FC236}">
+                <a16:creationId xmlns:a16="http://schemas.microsoft.com/office/drawing/2014/main" id="{E22DE0CA-446A-7452-96A4-E3CA984AA7B2}"/>
+              </a:ext>
+            </a:extLst>
+          </p:cNvPr>
+          <p:cNvSpPr txBox="1"/>
+          <p:nvPr/>
+        </p:nvSpPr>
+        <p:spPr>
+          <a:xfrm>
+            <a:off x="2585215" y="2288393"/>
+            <a:ext cx="1699539" cy="369332"/>
+          </a:xfrm>
+          <a:prstGeom prst="rect">
+            <a:avLst/>
+          </a:prstGeom>
+          <a:noFill/>
+        </p:spPr>
+        <p:txBody>
+          <a:bodyPr wrap="square" rtlCol="0">
+            <a:spAutoFit/>
+          </a:bodyPr>
+          <a:lstStyle/>
+          <a:p>
+            <a:r>
+              <a:rPr lang="ko-KR" altLang="en-US" dirty="0"/>
+              <a:t>부모 프로세스</a:t>
+            </a:r>
+          </a:p>
+        </p:txBody>
+      </p:sp>
+      <p:sp>
+        <p:nvSpPr>
+          <p:cNvPr id="8" name="TextBox 7">
+            <a:extLst>
+              <a:ext uri="{FF2B5EF4-FFF2-40B4-BE49-F238E27FC236}">
+                <a16:creationId xmlns:a16="http://schemas.microsoft.com/office/drawing/2014/main" id="{AC9695CB-7EE8-F1DE-AF9A-77CF46EDAC94}"/>
+              </a:ext>
+            </a:extLst>
+          </p:cNvPr>
+          <p:cNvSpPr txBox="1"/>
+          <p:nvPr/>
+        </p:nvSpPr>
+        <p:spPr>
+          <a:xfrm>
+            <a:off x="2459944" y="2982572"/>
+            <a:ext cx="929560" cy="369332"/>
+          </a:xfrm>
+          <a:prstGeom prst="rect">
+            <a:avLst/>
+          </a:prstGeom>
+          <a:noFill/>
+        </p:spPr>
+        <p:txBody>
+          <a:bodyPr wrap="square" rtlCol="0">
+            <a:spAutoFit/>
+          </a:bodyPr>
+          <a:lstStyle/>
+          <a:p>
+            <a:r>
+              <a:rPr lang="en-US" altLang="ko-KR" dirty="0" err="1"/>
+              <a:t>fd</a:t>
+            </a:r>
+            <a:r>
+              <a:rPr lang="en-US" altLang="ko-KR" dirty="0"/>
+              <a:t>[0]</a:t>
+            </a:r>
+            <a:endParaRPr lang="ko-KR" altLang="en-US" dirty="0"/>
+          </a:p>
+        </p:txBody>
+      </p:sp>
+      <p:sp>
+        <p:nvSpPr>
+          <p:cNvPr id="9" name="TextBox 8">
+            <a:extLst>
+              <a:ext uri="{FF2B5EF4-FFF2-40B4-BE49-F238E27FC236}">
+                <a16:creationId xmlns:a16="http://schemas.microsoft.com/office/drawing/2014/main" id="{DAD1F65A-E23C-3AA2-A010-5C2400C8992F}"/>
+              </a:ext>
+            </a:extLst>
+          </p:cNvPr>
+          <p:cNvSpPr txBox="1"/>
+          <p:nvPr/>
+        </p:nvSpPr>
+        <p:spPr>
+          <a:xfrm>
+            <a:off x="2459944" y="3509987"/>
+            <a:ext cx="929560" cy="369332"/>
+          </a:xfrm>
+          <a:prstGeom prst="rect">
+            <a:avLst/>
+          </a:prstGeom>
+          <a:noFill/>
+        </p:spPr>
+        <p:txBody>
+          <a:bodyPr wrap="square" rtlCol="0">
+            <a:spAutoFit/>
+          </a:bodyPr>
+          <a:lstStyle/>
+          <a:p>
+            <a:r>
+              <a:rPr lang="en-US" altLang="ko-KR" dirty="0" err="1"/>
+              <a:t>fd</a:t>
+            </a:r>
+            <a:r>
+              <a:rPr lang="en-US" altLang="ko-KR" dirty="0"/>
+              <a:t>[1]</a:t>
+            </a:r>
+            <a:endParaRPr lang="ko-KR" altLang="en-US" dirty="0"/>
+          </a:p>
+        </p:txBody>
+      </p:sp>
+      <p:sp>
+        <p:nvSpPr>
+          <p:cNvPr id="10" name="직사각형 9">
+            <a:extLst>
+              <a:ext uri="{FF2B5EF4-FFF2-40B4-BE49-F238E27FC236}">
+                <a16:creationId xmlns:a16="http://schemas.microsoft.com/office/drawing/2014/main" id="{238D1A57-0AFC-73CA-754E-87B8898F7FF2}"/>
+              </a:ext>
+            </a:extLst>
+          </p:cNvPr>
+          <p:cNvSpPr/>
+          <p:nvPr/>
+        </p:nvSpPr>
+        <p:spPr>
+          <a:xfrm>
+            <a:off x="3389504" y="2982572"/>
+            <a:ext cx="929560" cy="488318"/>
+          </a:xfrm>
+          <a:prstGeom prst="rect">
+            <a:avLst/>
+          </a:prstGeom>
+          <a:noFill/>
+          <a:ln>
+            <a:solidFill>
+              <a:schemeClr val="tx1"/>
+            </a:solidFill>
+          </a:ln>
+        </p:spPr>
+        <p:style>
+          <a:lnRef idx="2">
+            <a:schemeClr val="accent1">
+              <a:shade val="15000"/>
+            </a:schemeClr>
+          </a:lnRef>
+          <a:fillRef idx="1">
+            <a:schemeClr val="accent1"/>
+          </a:fillRef>
+          <a:effectRef idx="0">
+            <a:schemeClr val="accent1"/>
+          </a:effectRef>
+          <a:fontRef idx="minor">
+            <a:schemeClr val="lt1"/>
+          </a:fontRef>
+        </p:style>
+        <p:txBody>
+          <a:bodyPr rtlCol="0" anchor="ctr"/>
+          <a:lstStyle/>
+          <a:p>
+            <a:pPr algn="ctr"/>
+            <a:r>
+              <a:rPr lang="en-US" altLang="ko-KR" dirty="0">
+                <a:solidFill>
+                  <a:schemeClr val="tx1"/>
+                </a:solidFill>
+              </a:rPr>
+              <a:t>Read</a:t>
+            </a:r>
+            <a:endParaRPr lang="ko-KR" altLang="en-US" dirty="0">
+              <a:solidFill>
+                <a:schemeClr val="tx1"/>
+              </a:solidFill>
+            </a:endParaRPr>
+          </a:p>
+        </p:txBody>
+      </p:sp>
+      <p:sp>
+        <p:nvSpPr>
+          <p:cNvPr id="11" name="직사각형 10">
+            <a:extLst>
+              <a:ext uri="{FF2B5EF4-FFF2-40B4-BE49-F238E27FC236}">
+                <a16:creationId xmlns:a16="http://schemas.microsoft.com/office/drawing/2014/main" id="{338D7999-436E-F41D-0181-A9E6BF37C44C}"/>
+              </a:ext>
+            </a:extLst>
+          </p:cNvPr>
+          <p:cNvSpPr/>
+          <p:nvPr/>
+        </p:nvSpPr>
+        <p:spPr>
+          <a:xfrm>
+            <a:off x="3389504" y="3468946"/>
+            <a:ext cx="929560" cy="488318"/>
+          </a:xfrm>
+          <a:prstGeom prst="rect">
+            <a:avLst/>
+          </a:prstGeom>
+          <a:noFill/>
+          <a:ln>
+            <a:solidFill>
+              <a:schemeClr val="tx1"/>
+            </a:solidFill>
+          </a:ln>
+        </p:spPr>
+        <p:style>
+          <a:lnRef idx="2">
+            <a:schemeClr val="accent1">
+              <a:shade val="15000"/>
+            </a:schemeClr>
+          </a:lnRef>
+          <a:fillRef idx="1">
+            <a:schemeClr val="accent1"/>
+          </a:fillRef>
+          <a:effectRef idx="0">
+            <a:schemeClr val="accent1"/>
+          </a:effectRef>
+          <a:fontRef idx="minor">
+            <a:schemeClr val="lt1"/>
+          </a:fontRef>
+        </p:style>
+        <p:txBody>
+          <a:bodyPr rtlCol="0" anchor="ctr"/>
+          <a:lstStyle/>
+          <a:p>
+            <a:pPr algn="ctr"/>
+            <a:r>
+              <a:rPr lang="en-US" altLang="ko-KR" dirty="0">
+                <a:solidFill>
+                  <a:schemeClr val="tx1"/>
+                </a:solidFill>
+              </a:rPr>
+              <a:t>Write</a:t>
+            </a:r>
+            <a:endParaRPr lang="ko-KR" altLang="en-US" dirty="0">
+              <a:solidFill>
+                <a:schemeClr val="tx1"/>
+              </a:solidFill>
+            </a:endParaRPr>
+          </a:p>
+        </p:txBody>
+      </p:sp>
+      <p:sp>
+        <p:nvSpPr>
+          <p:cNvPr id="12" name="사각형: 둥근 모서리 11">
+            <a:extLst>
+              <a:ext uri="{FF2B5EF4-FFF2-40B4-BE49-F238E27FC236}">
+                <a16:creationId xmlns:a16="http://schemas.microsoft.com/office/drawing/2014/main" id="{D24DFE26-D9F1-D51C-257A-AAF675BDE6C1}"/>
+              </a:ext>
+            </a:extLst>
+          </p:cNvPr>
+          <p:cNvSpPr/>
+          <p:nvPr/>
+        </p:nvSpPr>
+        <p:spPr>
+          <a:xfrm>
+            <a:off x="5965942" y="2173845"/>
+            <a:ext cx="2700113" cy="1986785"/>
+          </a:xfrm>
+          <a:prstGeom prst="roundRect">
+            <a:avLst/>
+          </a:prstGeom>
+          <a:noFill/>
+          <a:ln>
+            <a:prstDash val="solid"/>
+          </a:ln>
+        </p:spPr>
+        <p:style>
+          <a:lnRef idx="2">
+            <a:schemeClr val="accent1">
+              <a:shade val="15000"/>
+            </a:schemeClr>
+          </a:lnRef>
+          <a:fillRef idx="1">
+            <a:schemeClr val="accent1"/>
+          </a:fillRef>
+          <a:effectRef idx="0">
+            <a:schemeClr val="accent1"/>
+          </a:effectRef>
+          <a:fontRef idx="minor">
+            <a:schemeClr val="lt1"/>
+          </a:fontRef>
+        </p:style>
+        <p:txBody>
+          <a:bodyPr rtlCol="0" anchor="ctr"/>
+          <a:lstStyle/>
+          <a:p>
+            <a:pPr algn="ctr"/>
+            <a:endParaRPr lang="ko-KR" altLang="en-US"/>
+          </a:p>
+        </p:txBody>
+      </p:sp>
+      <p:sp>
+        <p:nvSpPr>
+          <p:cNvPr id="13" name="TextBox 12">
+            <a:extLst>
+              <a:ext uri="{FF2B5EF4-FFF2-40B4-BE49-F238E27FC236}">
+                <a16:creationId xmlns:a16="http://schemas.microsoft.com/office/drawing/2014/main" id="{3E21B34B-60A0-A276-4515-3F02D339C070}"/>
+              </a:ext>
+            </a:extLst>
+          </p:cNvPr>
+          <p:cNvSpPr txBox="1"/>
+          <p:nvPr/>
+        </p:nvSpPr>
+        <p:spPr>
+          <a:xfrm>
+            <a:off x="6534451" y="2279168"/>
+            <a:ext cx="1699539" cy="369332"/>
+          </a:xfrm>
+          <a:prstGeom prst="rect">
+            <a:avLst/>
+          </a:prstGeom>
+          <a:noFill/>
+        </p:spPr>
+        <p:txBody>
+          <a:bodyPr wrap="square" rtlCol="0">
+            <a:spAutoFit/>
+          </a:bodyPr>
+          <a:lstStyle/>
+          <a:p>
+            <a:r>
+              <a:rPr lang="ko-KR" altLang="en-US" dirty="0"/>
+              <a:t>자식 프로세스</a:t>
+            </a:r>
+          </a:p>
+        </p:txBody>
+      </p:sp>
+      <p:sp>
+        <p:nvSpPr>
+          <p:cNvPr id="14" name="TextBox 13">
+            <a:extLst>
+              <a:ext uri="{FF2B5EF4-FFF2-40B4-BE49-F238E27FC236}">
+                <a16:creationId xmlns:a16="http://schemas.microsoft.com/office/drawing/2014/main" id="{A84536FE-F57D-309E-0EB6-ED9A4AFA133D}"/>
+              </a:ext>
+            </a:extLst>
+          </p:cNvPr>
+          <p:cNvSpPr txBox="1"/>
+          <p:nvPr/>
+        </p:nvSpPr>
+        <p:spPr>
+          <a:xfrm>
+            <a:off x="6409180" y="2973347"/>
+            <a:ext cx="929560" cy="369332"/>
+          </a:xfrm>
+          <a:prstGeom prst="rect">
+            <a:avLst/>
+          </a:prstGeom>
+          <a:noFill/>
+        </p:spPr>
+        <p:txBody>
+          <a:bodyPr wrap="square" rtlCol="0">
+            <a:spAutoFit/>
+          </a:bodyPr>
+          <a:lstStyle/>
+          <a:p>
+            <a:r>
+              <a:rPr lang="en-US" altLang="ko-KR" dirty="0" err="1"/>
+              <a:t>fd</a:t>
+            </a:r>
+            <a:r>
+              <a:rPr lang="en-US" altLang="ko-KR" dirty="0"/>
+              <a:t>[0]</a:t>
+            </a:r>
+            <a:endParaRPr lang="ko-KR" altLang="en-US" dirty="0"/>
+          </a:p>
+        </p:txBody>
+      </p:sp>
+      <p:sp>
+        <p:nvSpPr>
+          <p:cNvPr id="15" name="TextBox 14">
+            <a:extLst>
+              <a:ext uri="{FF2B5EF4-FFF2-40B4-BE49-F238E27FC236}">
+                <a16:creationId xmlns:a16="http://schemas.microsoft.com/office/drawing/2014/main" id="{F86FD313-C6CE-8B46-CC07-593B53DC1AE2}"/>
+              </a:ext>
+            </a:extLst>
+          </p:cNvPr>
+          <p:cNvSpPr txBox="1"/>
+          <p:nvPr/>
+        </p:nvSpPr>
+        <p:spPr>
+          <a:xfrm>
+            <a:off x="6409180" y="3500762"/>
+            <a:ext cx="929560" cy="369332"/>
+          </a:xfrm>
+          <a:prstGeom prst="rect">
+            <a:avLst/>
+          </a:prstGeom>
+          <a:noFill/>
+        </p:spPr>
+        <p:txBody>
+          <a:bodyPr wrap="square" rtlCol="0">
+            <a:spAutoFit/>
+          </a:bodyPr>
+          <a:lstStyle/>
+          <a:p>
+            <a:r>
+              <a:rPr lang="en-US" altLang="ko-KR" dirty="0" err="1"/>
+              <a:t>fd</a:t>
+            </a:r>
+            <a:r>
+              <a:rPr lang="en-US" altLang="ko-KR" dirty="0"/>
+              <a:t>[1]</a:t>
+            </a:r>
+            <a:endParaRPr lang="ko-KR" altLang="en-US" dirty="0"/>
+          </a:p>
+        </p:txBody>
+      </p:sp>
+      <p:sp>
+        <p:nvSpPr>
+          <p:cNvPr id="16" name="직사각형 15">
+            <a:extLst>
+              <a:ext uri="{FF2B5EF4-FFF2-40B4-BE49-F238E27FC236}">
+                <a16:creationId xmlns:a16="http://schemas.microsoft.com/office/drawing/2014/main" id="{0958D5A0-B652-6767-0D43-0E69A8B16BC6}"/>
+              </a:ext>
+            </a:extLst>
+          </p:cNvPr>
+          <p:cNvSpPr/>
+          <p:nvPr/>
+        </p:nvSpPr>
+        <p:spPr>
+          <a:xfrm>
+            <a:off x="7338740" y="2973347"/>
+            <a:ext cx="929560" cy="488318"/>
+          </a:xfrm>
+          <a:prstGeom prst="rect">
+            <a:avLst/>
+          </a:prstGeom>
+          <a:noFill/>
+          <a:ln>
+            <a:solidFill>
+              <a:schemeClr val="tx1"/>
+            </a:solidFill>
+          </a:ln>
+        </p:spPr>
+        <p:style>
+          <a:lnRef idx="2">
+            <a:schemeClr val="accent1">
+              <a:shade val="15000"/>
+            </a:schemeClr>
+          </a:lnRef>
+          <a:fillRef idx="1">
+            <a:schemeClr val="accent1"/>
+          </a:fillRef>
+          <a:effectRef idx="0">
+            <a:schemeClr val="accent1"/>
+          </a:effectRef>
+          <a:fontRef idx="minor">
+            <a:schemeClr val="lt1"/>
+          </a:fontRef>
+        </p:style>
+        <p:txBody>
+          <a:bodyPr rtlCol="0" anchor="ctr"/>
+          <a:lstStyle/>
+          <a:p>
+            <a:pPr algn="ctr"/>
+            <a:r>
+              <a:rPr lang="en-US" altLang="ko-KR" dirty="0">
+                <a:solidFill>
+                  <a:schemeClr val="tx1"/>
+                </a:solidFill>
+              </a:rPr>
+              <a:t>Read</a:t>
+            </a:r>
+            <a:endParaRPr lang="ko-KR" altLang="en-US" dirty="0">
+              <a:solidFill>
+                <a:schemeClr val="tx1"/>
+              </a:solidFill>
+            </a:endParaRPr>
+          </a:p>
+        </p:txBody>
+      </p:sp>
+      <p:sp>
+        <p:nvSpPr>
+          <p:cNvPr id="17" name="직사각형 16">
+            <a:extLst>
+              <a:ext uri="{FF2B5EF4-FFF2-40B4-BE49-F238E27FC236}">
+                <a16:creationId xmlns:a16="http://schemas.microsoft.com/office/drawing/2014/main" id="{6E519779-2122-53A5-F0BC-44019880E380}"/>
+              </a:ext>
+            </a:extLst>
+          </p:cNvPr>
+          <p:cNvSpPr/>
+          <p:nvPr/>
+        </p:nvSpPr>
+        <p:spPr>
+          <a:xfrm>
+            <a:off x="7338740" y="3459721"/>
+            <a:ext cx="929560" cy="488318"/>
+          </a:xfrm>
+          <a:prstGeom prst="rect">
+            <a:avLst/>
+          </a:prstGeom>
+          <a:noFill/>
+          <a:ln>
+            <a:solidFill>
+              <a:schemeClr val="tx1"/>
+            </a:solidFill>
+          </a:ln>
+        </p:spPr>
+        <p:style>
+          <a:lnRef idx="2">
+            <a:schemeClr val="accent1">
+              <a:shade val="15000"/>
+            </a:schemeClr>
+          </a:lnRef>
+          <a:fillRef idx="1">
+            <a:schemeClr val="accent1"/>
+          </a:fillRef>
+          <a:effectRef idx="0">
+            <a:schemeClr val="accent1"/>
+          </a:effectRef>
+          <a:fontRef idx="minor">
+            <a:schemeClr val="lt1"/>
+          </a:fontRef>
+        </p:style>
+        <p:txBody>
+          <a:bodyPr rtlCol="0" anchor="ctr"/>
+          <a:lstStyle/>
+          <a:p>
+            <a:pPr algn="ctr"/>
+            <a:r>
+              <a:rPr lang="en-US" altLang="ko-KR" dirty="0">
+                <a:solidFill>
+                  <a:schemeClr val="tx1"/>
+                </a:solidFill>
+              </a:rPr>
+              <a:t>Write</a:t>
+            </a:r>
+            <a:endParaRPr lang="ko-KR" altLang="en-US" dirty="0">
+              <a:solidFill>
+                <a:schemeClr val="tx1"/>
+              </a:solidFill>
+            </a:endParaRPr>
+          </a:p>
+        </p:txBody>
+      </p:sp>
+      <p:cxnSp>
+        <p:nvCxnSpPr>
+          <p:cNvPr id="19" name="연결선: 구부러짐 18">
+            <a:extLst>
+              <a:ext uri="{FF2B5EF4-FFF2-40B4-BE49-F238E27FC236}">
+                <a16:creationId xmlns:a16="http://schemas.microsoft.com/office/drawing/2014/main" id="{4FA6E74C-6A88-A029-C622-55445D0D8EF5}"/>
+              </a:ext>
+            </a:extLst>
+          </p:cNvPr>
+          <p:cNvCxnSpPr>
+            <a:stCxn id="10" idx="3"/>
+            <a:endCxn id="15" idx="1"/>
+          </p:cNvCxnSpPr>
+          <p:nvPr/>
+        </p:nvCxnSpPr>
+        <p:spPr>
+          <a:xfrm>
+            <a:off x="4319064" y="3226731"/>
+            <a:ext cx="2090116" cy="458697"/>
+          </a:xfrm>
+          <a:prstGeom prst="curvedConnector3">
+            <a:avLst>
+              <a:gd name="adj1" fmla="val 68095"/>
+            </a:avLst>
+          </a:prstGeom>
+          <a:ln w="28575">
+            <a:headEnd type="none" w="med" len="med"/>
+            <a:tailEnd type="triangle" w="med" len="med"/>
+          </a:ln>
+        </p:spPr>
+        <p:style>
+          <a:lnRef idx="1">
+            <a:schemeClr val="accent1"/>
+          </a:lnRef>
+          <a:fillRef idx="0">
+            <a:schemeClr val="accent1"/>
+          </a:fillRef>
+          <a:effectRef idx="0">
+            <a:schemeClr val="accent1"/>
+          </a:effectRef>
+          <a:fontRef idx="minor">
+            <a:schemeClr val="tx1"/>
+          </a:fontRef>
+        </p:style>
+      </p:cxnSp>
+      <p:cxnSp>
+        <p:nvCxnSpPr>
+          <p:cNvPr id="25" name="연결선: 구부러짐 24">
+            <a:extLst>
+              <a:ext uri="{FF2B5EF4-FFF2-40B4-BE49-F238E27FC236}">
+                <a16:creationId xmlns:a16="http://schemas.microsoft.com/office/drawing/2014/main" id="{6A79BD13-45FD-440A-6820-69CB50367DB8}"/>
+              </a:ext>
+            </a:extLst>
+          </p:cNvPr>
+          <p:cNvCxnSpPr>
+            <a:cxnSpLocks/>
+            <a:stCxn id="14" idx="1"/>
+            <a:endCxn id="11" idx="3"/>
+          </p:cNvCxnSpPr>
+          <p:nvPr/>
+        </p:nvCxnSpPr>
+        <p:spPr>
+          <a:xfrm rot="10800000" flipV="1">
+            <a:off x="4319064" y="3158013"/>
+            <a:ext cx="2090116" cy="555092"/>
+          </a:xfrm>
+          <a:prstGeom prst="curvedConnector3">
+            <a:avLst>
+              <a:gd name="adj1" fmla="val 67637"/>
+            </a:avLst>
+          </a:prstGeom>
+          <a:ln w="28575">
+            <a:headEnd type="none" w="med" len="med"/>
+            <a:tailEnd type="triangle" w="med" len="med"/>
+          </a:ln>
+        </p:spPr>
+        <p:style>
+          <a:lnRef idx="1">
+            <a:schemeClr val="accent1"/>
+          </a:lnRef>
+          <a:fillRef idx="0">
+            <a:schemeClr val="accent1"/>
+          </a:fillRef>
+          <a:effectRef idx="0">
+            <a:schemeClr val="accent1"/>
+          </a:effectRef>
+          <a:fontRef idx="minor">
+            <a:schemeClr val="tx1"/>
+          </a:fontRef>
+        </p:style>
+      </p:cxnSp>
+      <p:sp>
+        <p:nvSpPr>
+          <p:cNvPr id="30" name="TextBox 29">
+            <a:extLst>
+              <a:ext uri="{FF2B5EF4-FFF2-40B4-BE49-F238E27FC236}">
+                <a16:creationId xmlns:a16="http://schemas.microsoft.com/office/drawing/2014/main" id="{9FF2DEC2-7E21-37CA-7590-C14573DE5CC0}"/>
+              </a:ext>
+            </a:extLst>
+          </p:cNvPr>
+          <p:cNvSpPr txBox="1"/>
+          <p:nvPr/>
+        </p:nvSpPr>
+        <p:spPr>
+          <a:xfrm>
+            <a:off x="5059124" y="3311659"/>
+            <a:ext cx="509063" cy="369332"/>
+          </a:xfrm>
+          <a:prstGeom prst="rect">
+            <a:avLst/>
+          </a:prstGeom>
+          <a:noFill/>
+        </p:spPr>
+        <p:txBody>
+          <a:bodyPr wrap="square" rtlCol="0">
+            <a:spAutoFit/>
+          </a:bodyPr>
+          <a:lstStyle/>
+          <a:p>
+            <a:r>
+              <a:rPr lang="en-US" altLang="ko-KR" dirty="0"/>
+              <a:t> or</a:t>
+            </a:r>
+            <a:endParaRPr lang="ko-KR" altLang="en-US" dirty="0"/>
+          </a:p>
+        </p:txBody>
+      </p:sp>
+      <p:sp>
+        <p:nvSpPr>
+          <p:cNvPr id="31" name="TextBox 30">
+            <a:extLst>
+              <a:ext uri="{FF2B5EF4-FFF2-40B4-BE49-F238E27FC236}">
+                <a16:creationId xmlns:a16="http://schemas.microsoft.com/office/drawing/2014/main" id="{C06CC990-9F73-76E5-FBAF-8FE38C32849E}"/>
+              </a:ext>
+            </a:extLst>
+          </p:cNvPr>
+          <p:cNvSpPr txBox="1"/>
+          <p:nvPr/>
+        </p:nvSpPr>
+        <p:spPr>
+          <a:xfrm>
+            <a:off x="4642415" y="2815022"/>
+            <a:ext cx="1567887" cy="338554"/>
+          </a:xfrm>
+          <a:prstGeom prst="rect">
+            <a:avLst/>
+          </a:prstGeom>
+          <a:noFill/>
+        </p:spPr>
+        <p:txBody>
+          <a:bodyPr wrap="square" rtlCol="0">
+            <a:spAutoFit/>
+          </a:bodyPr>
+          <a:lstStyle/>
+          <a:p>
+            <a:r>
+              <a:rPr lang="en-US" altLang="ko-KR" sz="1600" dirty="0"/>
+              <a:t>pipe (</a:t>
+            </a:r>
+            <a:r>
+              <a:rPr lang="ko-KR" altLang="en-US" sz="1600" dirty="0"/>
+              <a:t>단방향</a:t>
+            </a:r>
+            <a:r>
+              <a:rPr lang="en-US" altLang="ko-KR" sz="1600" dirty="0"/>
+              <a:t>)</a:t>
+            </a:r>
+            <a:endParaRPr lang="ko-KR" altLang="en-US" sz="1600" dirty="0"/>
+          </a:p>
+        </p:txBody>
+      </p:sp>
+    </p:spTree>
+    <p:extLst>
+      <p:ext uri="{BB962C8B-B14F-4D97-AF65-F5344CB8AC3E}">
+        <p14:creationId xmlns:p14="http://schemas.microsoft.com/office/powerpoint/2010/main" val="648578995"/>
+      </p:ext>
+    </p:extLst>
+  </p:cSld>
+  <p:clrMapOvr>
+    <a:masterClrMapping/>
+  </p:clrMapOvr>
+</p:sld>
+</file>
+
+<file path=ppt/slides/slide6.xml><?xml version="1.0" encoding="utf-8"?>
+<p:sld xmlns:a="http://schemas.openxmlformats.org/drawingml/2006/main" xmlns:r="http://schemas.openxmlformats.org/officeDocument/2006/relationships" xmlns:p="http://schemas.openxmlformats.org/presentationml/2006/main">
+  <p:cSld>
+    <p:spTree>
+      <p:nvGrpSpPr>
+        <p:cNvPr id="1" name=""/>
+        <p:cNvGrpSpPr/>
+        <p:nvPr/>
+      </p:nvGrpSpPr>
+      <p:grpSpPr>
+        <a:xfrm>
+          <a:off x="0" y="0"/>
+          <a:ext cx="0" cy="0"/>
+          <a:chOff x="0" y="0"/>
+          <a:chExt cx="0" cy="0"/>
+        </a:xfrm>
+      </p:grpSpPr>
+      <p:sp>
+        <p:nvSpPr>
+          <p:cNvPr id="4" name="사각형: 둥근 모서리 3">
+            <a:extLst>
+              <a:ext uri="{FF2B5EF4-FFF2-40B4-BE49-F238E27FC236}">
+                <a16:creationId xmlns:a16="http://schemas.microsoft.com/office/drawing/2014/main" id="{F3D35D1D-BC8B-A5AD-3BBB-3967C0CF4D28}"/>
+              </a:ext>
+            </a:extLst>
+          </p:cNvPr>
+          <p:cNvSpPr/>
+          <p:nvPr/>
+        </p:nvSpPr>
+        <p:spPr>
+          <a:xfrm>
+            <a:off x="2282011" y="2183070"/>
+            <a:ext cx="2347438" cy="1986785"/>
+          </a:xfrm>
+          <a:prstGeom prst="roundRect">
+            <a:avLst/>
+          </a:prstGeom>
+          <a:noFill/>
+          <a:ln>
+            <a:prstDash val="solid"/>
+          </a:ln>
+        </p:spPr>
+        <p:style>
+          <a:lnRef idx="2">
+            <a:schemeClr val="accent1">
+              <a:shade val="15000"/>
+            </a:schemeClr>
+          </a:lnRef>
+          <a:fillRef idx="1">
+            <a:schemeClr val="accent1"/>
+          </a:fillRef>
+          <a:effectRef idx="0">
+            <a:schemeClr val="accent1"/>
+          </a:effectRef>
+          <a:fontRef idx="minor">
+            <a:schemeClr val="lt1"/>
+          </a:fontRef>
+        </p:style>
+        <p:txBody>
+          <a:bodyPr rtlCol="0" anchor="ctr"/>
+          <a:lstStyle/>
+          <a:p>
+            <a:pPr algn="ctr"/>
+            <a:endParaRPr lang="ko-KR" altLang="en-US"/>
+          </a:p>
+        </p:txBody>
+      </p:sp>
+      <p:sp>
+        <p:nvSpPr>
+          <p:cNvPr id="5" name="TextBox 4">
+            <a:extLst>
+              <a:ext uri="{FF2B5EF4-FFF2-40B4-BE49-F238E27FC236}">
+                <a16:creationId xmlns:a16="http://schemas.microsoft.com/office/drawing/2014/main" id="{E22DE0CA-446A-7452-96A4-E3CA984AA7B2}"/>
+              </a:ext>
+            </a:extLst>
+          </p:cNvPr>
+          <p:cNvSpPr txBox="1"/>
+          <p:nvPr/>
+        </p:nvSpPr>
+        <p:spPr>
+          <a:xfrm>
+            <a:off x="2439198" y="2288393"/>
+            <a:ext cx="1900611" cy="369332"/>
+          </a:xfrm>
+          <a:prstGeom prst="rect">
+            <a:avLst/>
+          </a:prstGeom>
+          <a:noFill/>
+        </p:spPr>
+        <p:txBody>
+          <a:bodyPr wrap="square" rtlCol="0">
+            <a:spAutoFit/>
+          </a:bodyPr>
+          <a:lstStyle/>
+          <a:p>
+            <a:r>
+              <a:rPr lang="ko-KR" altLang="en-US" dirty="0"/>
+              <a:t>자식 프로세스</a:t>
+            </a:r>
+            <a:r>
+              <a:rPr lang="en-US" altLang="ko-KR" dirty="0"/>
+              <a:t>1</a:t>
+            </a:r>
+            <a:endParaRPr lang="ko-KR" altLang="en-US" dirty="0"/>
+          </a:p>
+        </p:txBody>
+      </p:sp>
+      <p:sp>
+        <p:nvSpPr>
+          <p:cNvPr id="8" name="TextBox 7">
+            <a:extLst>
+              <a:ext uri="{FF2B5EF4-FFF2-40B4-BE49-F238E27FC236}">
+                <a16:creationId xmlns:a16="http://schemas.microsoft.com/office/drawing/2014/main" id="{AC9695CB-7EE8-F1DE-AF9A-77CF46EDAC94}"/>
+              </a:ext>
+            </a:extLst>
+          </p:cNvPr>
+          <p:cNvSpPr txBox="1"/>
+          <p:nvPr/>
+        </p:nvSpPr>
+        <p:spPr>
+          <a:xfrm>
+            <a:off x="2459944" y="2982572"/>
+            <a:ext cx="929560" cy="369332"/>
+          </a:xfrm>
+          <a:prstGeom prst="rect">
+            <a:avLst/>
+          </a:prstGeom>
+          <a:noFill/>
+        </p:spPr>
+        <p:txBody>
+          <a:bodyPr wrap="square" rtlCol="0">
+            <a:spAutoFit/>
+          </a:bodyPr>
+          <a:lstStyle/>
+          <a:p>
+            <a:r>
+              <a:rPr lang="en-US" altLang="ko-KR" dirty="0" err="1"/>
+              <a:t>fd</a:t>
+            </a:r>
+            <a:r>
+              <a:rPr lang="en-US" altLang="ko-KR" dirty="0"/>
+              <a:t>[0]</a:t>
+            </a:r>
+            <a:endParaRPr lang="ko-KR" altLang="en-US" dirty="0"/>
+          </a:p>
+        </p:txBody>
+      </p:sp>
+      <p:sp>
+        <p:nvSpPr>
+          <p:cNvPr id="9" name="TextBox 8">
+            <a:extLst>
+              <a:ext uri="{FF2B5EF4-FFF2-40B4-BE49-F238E27FC236}">
+                <a16:creationId xmlns:a16="http://schemas.microsoft.com/office/drawing/2014/main" id="{DAD1F65A-E23C-3AA2-A010-5C2400C8992F}"/>
+              </a:ext>
+            </a:extLst>
+          </p:cNvPr>
+          <p:cNvSpPr txBox="1"/>
+          <p:nvPr/>
+        </p:nvSpPr>
+        <p:spPr>
+          <a:xfrm>
+            <a:off x="2459944" y="3509987"/>
+            <a:ext cx="929560" cy="369332"/>
+          </a:xfrm>
+          <a:prstGeom prst="rect">
+            <a:avLst/>
+          </a:prstGeom>
+          <a:noFill/>
+        </p:spPr>
+        <p:txBody>
+          <a:bodyPr wrap="square" rtlCol="0">
+            <a:spAutoFit/>
+          </a:bodyPr>
+          <a:lstStyle/>
+          <a:p>
+            <a:r>
+              <a:rPr lang="en-US" altLang="ko-KR" dirty="0" err="1"/>
+              <a:t>fd</a:t>
+            </a:r>
+            <a:r>
+              <a:rPr lang="en-US" altLang="ko-KR" dirty="0"/>
+              <a:t>[1]</a:t>
+            </a:r>
+            <a:endParaRPr lang="ko-KR" altLang="en-US" dirty="0"/>
+          </a:p>
+        </p:txBody>
+      </p:sp>
+      <p:sp>
+        <p:nvSpPr>
+          <p:cNvPr id="10" name="직사각형 9">
+            <a:extLst>
+              <a:ext uri="{FF2B5EF4-FFF2-40B4-BE49-F238E27FC236}">
+                <a16:creationId xmlns:a16="http://schemas.microsoft.com/office/drawing/2014/main" id="{238D1A57-0AFC-73CA-754E-87B8898F7FF2}"/>
+              </a:ext>
+            </a:extLst>
+          </p:cNvPr>
+          <p:cNvSpPr/>
+          <p:nvPr/>
+        </p:nvSpPr>
+        <p:spPr>
+          <a:xfrm>
+            <a:off x="3315697" y="2978684"/>
+            <a:ext cx="929560" cy="488318"/>
+          </a:xfrm>
+          <a:prstGeom prst="rect">
+            <a:avLst/>
+          </a:prstGeom>
+          <a:noFill/>
+          <a:ln>
+            <a:solidFill>
+              <a:schemeClr val="tx1"/>
+            </a:solidFill>
+          </a:ln>
+        </p:spPr>
+        <p:style>
+          <a:lnRef idx="2">
+            <a:schemeClr val="accent1">
+              <a:shade val="15000"/>
+            </a:schemeClr>
+          </a:lnRef>
+          <a:fillRef idx="1">
+            <a:schemeClr val="accent1"/>
+          </a:fillRef>
+          <a:effectRef idx="0">
+            <a:schemeClr val="accent1"/>
+          </a:effectRef>
+          <a:fontRef idx="minor">
+            <a:schemeClr val="lt1"/>
+          </a:fontRef>
+        </p:style>
+        <p:txBody>
+          <a:bodyPr rtlCol="0" anchor="ctr"/>
+          <a:lstStyle/>
+          <a:p>
+            <a:pPr algn="ctr"/>
+            <a:r>
+              <a:rPr lang="en-US" altLang="ko-KR" dirty="0">
+                <a:solidFill>
+                  <a:schemeClr val="tx1"/>
+                </a:solidFill>
+              </a:rPr>
+              <a:t>Read</a:t>
+            </a:r>
+            <a:endParaRPr lang="ko-KR" altLang="en-US" dirty="0">
+              <a:solidFill>
+                <a:schemeClr val="tx1"/>
+              </a:solidFill>
+            </a:endParaRPr>
+          </a:p>
+        </p:txBody>
+      </p:sp>
+      <p:sp>
+        <p:nvSpPr>
+          <p:cNvPr id="11" name="직사각형 10">
+            <a:extLst>
+              <a:ext uri="{FF2B5EF4-FFF2-40B4-BE49-F238E27FC236}">
+                <a16:creationId xmlns:a16="http://schemas.microsoft.com/office/drawing/2014/main" id="{338D7999-436E-F41D-0181-A9E6BF37C44C}"/>
+              </a:ext>
+            </a:extLst>
+          </p:cNvPr>
+          <p:cNvSpPr/>
+          <p:nvPr/>
+        </p:nvSpPr>
+        <p:spPr>
+          <a:xfrm>
+            <a:off x="3315697" y="3465058"/>
+            <a:ext cx="929560" cy="488318"/>
+          </a:xfrm>
+          <a:prstGeom prst="rect">
+            <a:avLst/>
+          </a:prstGeom>
+          <a:noFill/>
+          <a:ln>
+            <a:solidFill>
+              <a:schemeClr val="tx1"/>
+            </a:solidFill>
+          </a:ln>
+        </p:spPr>
+        <p:style>
+          <a:lnRef idx="2">
+            <a:schemeClr val="accent1">
+              <a:shade val="15000"/>
+            </a:schemeClr>
+          </a:lnRef>
+          <a:fillRef idx="1">
+            <a:schemeClr val="accent1"/>
+          </a:fillRef>
+          <a:effectRef idx="0">
+            <a:schemeClr val="accent1"/>
+          </a:effectRef>
+          <a:fontRef idx="minor">
+            <a:schemeClr val="lt1"/>
+          </a:fontRef>
+        </p:style>
+        <p:txBody>
+          <a:bodyPr rtlCol="0" anchor="ctr"/>
+          <a:lstStyle/>
+          <a:p>
+            <a:pPr algn="ctr"/>
+            <a:r>
+              <a:rPr lang="en-US" altLang="ko-KR" dirty="0">
+                <a:solidFill>
+                  <a:schemeClr val="tx1"/>
+                </a:solidFill>
+              </a:rPr>
+              <a:t>Write</a:t>
+            </a:r>
+            <a:endParaRPr lang="ko-KR" altLang="en-US" dirty="0">
+              <a:solidFill>
+                <a:schemeClr val="tx1"/>
+              </a:solidFill>
+            </a:endParaRPr>
+          </a:p>
+        </p:txBody>
+      </p:sp>
+      <p:sp>
+        <p:nvSpPr>
+          <p:cNvPr id="2" name="사각형: 둥근 모서리 1">
+            <a:extLst>
+              <a:ext uri="{FF2B5EF4-FFF2-40B4-BE49-F238E27FC236}">
+                <a16:creationId xmlns:a16="http://schemas.microsoft.com/office/drawing/2014/main" id="{5C4AE898-8DA5-95DD-F9F1-226C041E5F29}"/>
+              </a:ext>
+            </a:extLst>
+          </p:cNvPr>
+          <p:cNvSpPr/>
+          <p:nvPr/>
+        </p:nvSpPr>
+        <p:spPr>
+          <a:xfrm>
+            <a:off x="2282011" y="4327938"/>
+            <a:ext cx="6343748" cy="847279"/>
+          </a:xfrm>
+          <a:prstGeom prst="roundRect">
+            <a:avLst/>
+          </a:prstGeom>
+          <a:noFill/>
+          <a:ln>
+            <a:prstDash val="solid"/>
+          </a:ln>
+        </p:spPr>
+        <p:style>
+          <a:lnRef idx="2">
+            <a:schemeClr val="accent1">
+              <a:shade val="15000"/>
+            </a:schemeClr>
+          </a:lnRef>
+          <a:fillRef idx="1">
+            <a:schemeClr val="accent1"/>
+          </a:fillRef>
+          <a:effectRef idx="0">
+            <a:schemeClr val="accent1"/>
+          </a:effectRef>
+          <a:fontRef idx="minor">
+            <a:schemeClr val="lt1"/>
+          </a:fontRef>
+        </p:style>
+        <p:txBody>
+          <a:bodyPr rtlCol="0" anchor="ctr"/>
+          <a:lstStyle/>
+          <a:p>
+            <a:pPr algn="ctr"/>
+            <a:endParaRPr lang="ko-KR" altLang="en-US"/>
+          </a:p>
+        </p:txBody>
+      </p:sp>
+      <p:sp>
+        <p:nvSpPr>
+          <p:cNvPr id="3" name="사각형: 둥근 모서리 2">
+            <a:extLst>
+              <a:ext uri="{FF2B5EF4-FFF2-40B4-BE49-F238E27FC236}">
+                <a16:creationId xmlns:a16="http://schemas.microsoft.com/office/drawing/2014/main" id="{00A03B98-B92F-019C-032A-527616E81D51}"/>
+              </a:ext>
+            </a:extLst>
+          </p:cNvPr>
+          <p:cNvSpPr/>
+          <p:nvPr/>
+        </p:nvSpPr>
+        <p:spPr>
+          <a:xfrm>
+            <a:off x="6278321" y="2183070"/>
+            <a:ext cx="2347438" cy="1986785"/>
+          </a:xfrm>
+          <a:prstGeom prst="roundRect">
+            <a:avLst/>
+          </a:prstGeom>
+          <a:noFill/>
+          <a:ln>
+            <a:prstDash val="solid"/>
+          </a:ln>
+        </p:spPr>
+        <p:style>
+          <a:lnRef idx="2">
+            <a:schemeClr val="accent1">
+              <a:shade val="15000"/>
+            </a:schemeClr>
+          </a:lnRef>
+          <a:fillRef idx="1">
+            <a:schemeClr val="accent1"/>
+          </a:fillRef>
+          <a:effectRef idx="0">
+            <a:schemeClr val="accent1"/>
+          </a:effectRef>
+          <a:fontRef idx="minor">
+            <a:schemeClr val="lt1"/>
+          </a:fontRef>
+        </p:style>
+        <p:txBody>
+          <a:bodyPr rtlCol="0" anchor="ctr"/>
+          <a:lstStyle/>
+          <a:p>
+            <a:pPr algn="ctr"/>
+            <a:endParaRPr lang="ko-KR" altLang="en-US"/>
+          </a:p>
+        </p:txBody>
+      </p:sp>
+      <p:sp>
+        <p:nvSpPr>
+          <p:cNvPr id="6" name="TextBox 5">
+            <a:extLst>
+              <a:ext uri="{FF2B5EF4-FFF2-40B4-BE49-F238E27FC236}">
+                <a16:creationId xmlns:a16="http://schemas.microsoft.com/office/drawing/2014/main" id="{AE5B20DD-F3A3-70E1-72E8-B31908348249}"/>
+              </a:ext>
+            </a:extLst>
+          </p:cNvPr>
+          <p:cNvSpPr txBox="1"/>
+          <p:nvPr/>
+        </p:nvSpPr>
+        <p:spPr>
+          <a:xfrm>
+            <a:off x="6518492" y="2288393"/>
+            <a:ext cx="1900611" cy="369332"/>
+          </a:xfrm>
+          <a:prstGeom prst="rect">
+            <a:avLst/>
+          </a:prstGeom>
+          <a:noFill/>
+        </p:spPr>
+        <p:txBody>
+          <a:bodyPr wrap="square" rtlCol="0">
+            <a:spAutoFit/>
+          </a:bodyPr>
+          <a:lstStyle/>
+          <a:p>
+            <a:r>
+              <a:rPr lang="ko-KR" altLang="en-US" dirty="0"/>
+              <a:t>자식 프로세스</a:t>
+            </a:r>
+            <a:r>
+              <a:rPr lang="en-US" altLang="ko-KR" dirty="0"/>
+              <a:t>2</a:t>
+            </a:r>
+            <a:endParaRPr lang="ko-KR" altLang="en-US" dirty="0"/>
+          </a:p>
+        </p:txBody>
+      </p:sp>
+      <p:sp>
+        <p:nvSpPr>
+          <p:cNvPr id="7" name="TextBox 6">
+            <a:extLst>
+              <a:ext uri="{FF2B5EF4-FFF2-40B4-BE49-F238E27FC236}">
+                <a16:creationId xmlns:a16="http://schemas.microsoft.com/office/drawing/2014/main" id="{0EB0F971-903B-3480-E3D7-6B7E71E44D45}"/>
+              </a:ext>
+            </a:extLst>
+          </p:cNvPr>
+          <p:cNvSpPr txBox="1"/>
+          <p:nvPr/>
+        </p:nvSpPr>
+        <p:spPr>
+          <a:xfrm>
+            <a:off x="6539238" y="2982572"/>
+            <a:ext cx="929560" cy="369332"/>
+          </a:xfrm>
+          <a:prstGeom prst="rect">
+            <a:avLst/>
+          </a:prstGeom>
+          <a:noFill/>
+        </p:spPr>
+        <p:txBody>
+          <a:bodyPr wrap="square" rtlCol="0">
+            <a:spAutoFit/>
+          </a:bodyPr>
+          <a:lstStyle/>
+          <a:p>
+            <a:r>
+              <a:rPr lang="en-US" altLang="ko-KR" dirty="0" err="1"/>
+              <a:t>fd</a:t>
+            </a:r>
+            <a:r>
+              <a:rPr lang="en-US" altLang="ko-KR" dirty="0"/>
+              <a:t>[0]</a:t>
+            </a:r>
+            <a:endParaRPr lang="ko-KR" altLang="en-US" dirty="0"/>
+          </a:p>
+        </p:txBody>
+      </p:sp>
+      <p:sp>
+        <p:nvSpPr>
+          <p:cNvPr id="18" name="TextBox 17">
+            <a:extLst>
+              <a:ext uri="{FF2B5EF4-FFF2-40B4-BE49-F238E27FC236}">
+                <a16:creationId xmlns:a16="http://schemas.microsoft.com/office/drawing/2014/main" id="{3BC46073-88FE-4C90-FFF6-1E55556B9159}"/>
+              </a:ext>
+            </a:extLst>
+          </p:cNvPr>
+          <p:cNvSpPr txBox="1"/>
+          <p:nvPr/>
+        </p:nvSpPr>
+        <p:spPr>
+          <a:xfrm>
+            <a:off x="6539238" y="3509987"/>
+            <a:ext cx="929560" cy="369332"/>
+          </a:xfrm>
+          <a:prstGeom prst="rect">
+            <a:avLst/>
+          </a:prstGeom>
+          <a:noFill/>
+        </p:spPr>
+        <p:txBody>
+          <a:bodyPr wrap="square" rtlCol="0">
+            <a:spAutoFit/>
+          </a:bodyPr>
+          <a:lstStyle/>
+          <a:p>
+            <a:r>
+              <a:rPr lang="en-US" altLang="ko-KR" dirty="0" err="1"/>
+              <a:t>fd</a:t>
+            </a:r>
+            <a:r>
+              <a:rPr lang="en-US" altLang="ko-KR" dirty="0"/>
+              <a:t>[1]</a:t>
+            </a:r>
+            <a:endParaRPr lang="ko-KR" altLang="en-US" dirty="0"/>
+          </a:p>
+        </p:txBody>
+      </p:sp>
+      <p:sp>
+        <p:nvSpPr>
+          <p:cNvPr id="20" name="직사각형 19">
+            <a:extLst>
+              <a:ext uri="{FF2B5EF4-FFF2-40B4-BE49-F238E27FC236}">
+                <a16:creationId xmlns:a16="http://schemas.microsoft.com/office/drawing/2014/main" id="{69B384F6-5B5C-D3F3-1C95-00857F50DDFE}"/>
+              </a:ext>
+            </a:extLst>
+          </p:cNvPr>
+          <p:cNvSpPr/>
+          <p:nvPr/>
+        </p:nvSpPr>
+        <p:spPr>
+          <a:xfrm>
+            <a:off x="7408157" y="2980628"/>
+            <a:ext cx="929560" cy="488318"/>
+          </a:xfrm>
+          <a:prstGeom prst="rect">
+            <a:avLst/>
+          </a:prstGeom>
+          <a:noFill/>
+          <a:ln>
+            <a:solidFill>
+              <a:schemeClr val="tx1"/>
+            </a:solidFill>
+          </a:ln>
+        </p:spPr>
+        <p:style>
+          <a:lnRef idx="2">
+            <a:schemeClr val="accent1">
+              <a:shade val="15000"/>
+            </a:schemeClr>
+          </a:lnRef>
+          <a:fillRef idx="1">
+            <a:schemeClr val="accent1"/>
+          </a:fillRef>
+          <a:effectRef idx="0">
+            <a:schemeClr val="accent1"/>
+          </a:effectRef>
+          <a:fontRef idx="minor">
+            <a:schemeClr val="lt1"/>
+          </a:fontRef>
+        </p:style>
+        <p:txBody>
+          <a:bodyPr rtlCol="0" anchor="ctr"/>
+          <a:lstStyle/>
+          <a:p>
+            <a:pPr algn="ctr"/>
+            <a:r>
+              <a:rPr lang="en-US" altLang="ko-KR" dirty="0">
+                <a:solidFill>
+                  <a:schemeClr val="tx1"/>
+                </a:solidFill>
+              </a:rPr>
+              <a:t>Read</a:t>
+            </a:r>
+            <a:endParaRPr lang="ko-KR" altLang="en-US" dirty="0">
+              <a:solidFill>
+                <a:schemeClr val="tx1"/>
+              </a:solidFill>
+            </a:endParaRPr>
+          </a:p>
+        </p:txBody>
+      </p:sp>
+      <p:sp>
+        <p:nvSpPr>
+          <p:cNvPr id="21" name="직사각형 20">
+            <a:extLst>
+              <a:ext uri="{FF2B5EF4-FFF2-40B4-BE49-F238E27FC236}">
+                <a16:creationId xmlns:a16="http://schemas.microsoft.com/office/drawing/2014/main" id="{7C8DE764-2A48-9A82-BBC7-CBA48443EAAA}"/>
+              </a:ext>
+            </a:extLst>
+          </p:cNvPr>
+          <p:cNvSpPr/>
+          <p:nvPr/>
+        </p:nvSpPr>
+        <p:spPr>
+          <a:xfrm>
+            <a:off x="7408157" y="3467002"/>
+            <a:ext cx="929560" cy="488318"/>
+          </a:xfrm>
+          <a:prstGeom prst="rect">
+            <a:avLst/>
+          </a:prstGeom>
+          <a:noFill/>
+          <a:ln>
+            <a:solidFill>
+              <a:schemeClr val="tx1"/>
+            </a:solidFill>
+          </a:ln>
+        </p:spPr>
+        <p:style>
+          <a:lnRef idx="2">
+            <a:schemeClr val="accent1">
+              <a:shade val="15000"/>
+            </a:schemeClr>
+          </a:lnRef>
+          <a:fillRef idx="1">
+            <a:schemeClr val="accent1"/>
+          </a:fillRef>
+          <a:effectRef idx="0">
+            <a:schemeClr val="accent1"/>
+          </a:effectRef>
+          <a:fontRef idx="minor">
+            <a:schemeClr val="lt1"/>
+          </a:fontRef>
+        </p:style>
+        <p:txBody>
+          <a:bodyPr rtlCol="0" anchor="ctr"/>
+          <a:lstStyle/>
+          <a:p>
+            <a:pPr algn="ctr"/>
+            <a:r>
+              <a:rPr lang="en-US" altLang="ko-KR" dirty="0">
+                <a:solidFill>
+                  <a:schemeClr val="tx1"/>
+                </a:solidFill>
+              </a:rPr>
+              <a:t>Write</a:t>
+            </a:r>
+            <a:endParaRPr lang="ko-KR" altLang="en-US" dirty="0">
+              <a:solidFill>
+                <a:schemeClr val="tx1"/>
+              </a:solidFill>
+            </a:endParaRPr>
+          </a:p>
+        </p:txBody>
+      </p:sp>
+      <p:sp>
+        <p:nvSpPr>
+          <p:cNvPr id="23" name="TextBox 22">
+            <a:extLst>
+              <a:ext uri="{FF2B5EF4-FFF2-40B4-BE49-F238E27FC236}">
+                <a16:creationId xmlns:a16="http://schemas.microsoft.com/office/drawing/2014/main" id="{D0AAF8A0-3579-C399-6B16-EAE61D4BD0D2}"/>
+              </a:ext>
+            </a:extLst>
+          </p:cNvPr>
+          <p:cNvSpPr txBox="1"/>
+          <p:nvPr/>
+        </p:nvSpPr>
+        <p:spPr>
+          <a:xfrm>
+            <a:off x="2414862" y="4556588"/>
+            <a:ext cx="1439422" cy="369332"/>
+          </a:xfrm>
+          <a:prstGeom prst="rect">
+            <a:avLst/>
+          </a:prstGeom>
+          <a:noFill/>
+        </p:spPr>
+        <p:txBody>
+          <a:bodyPr wrap="square" rtlCol="0">
+            <a:spAutoFit/>
+          </a:bodyPr>
+          <a:lstStyle/>
+          <a:p>
+            <a:r>
+              <a:rPr lang="en-US" altLang="ko-KR" dirty="0"/>
+              <a:t>OS</a:t>
+            </a:r>
+            <a:r>
+              <a:rPr lang="ko-KR" altLang="en-US" dirty="0"/>
+              <a:t> </a:t>
+            </a:r>
+            <a:r>
+              <a:rPr lang="en-US" altLang="ko-KR" dirty="0"/>
+              <a:t>buffer</a:t>
+            </a:r>
+            <a:endParaRPr lang="ko-KR" altLang="en-US" dirty="0"/>
+          </a:p>
+        </p:txBody>
+      </p:sp>
+      <p:sp>
+        <p:nvSpPr>
+          <p:cNvPr id="24" name="직사각형 23">
+            <a:extLst>
+              <a:ext uri="{FF2B5EF4-FFF2-40B4-BE49-F238E27FC236}">
+                <a16:creationId xmlns:a16="http://schemas.microsoft.com/office/drawing/2014/main" id="{70AD4938-DD97-F839-36F0-F23479C4ADFC}"/>
+              </a:ext>
+            </a:extLst>
+          </p:cNvPr>
+          <p:cNvSpPr/>
+          <p:nvPr/>
+        </p:nvSpPr>
+        <p:spPr>
+          <a:xfrm>
+            <a:off x="3854284" y="4613016"/>
+            <a:ext cx="3009700" cy="256476"/>
+          </a:xfrm>
+          <a:prstGeom prst="rect">
+            <a:avLst/>
+          </a:prstGeom>
+          <a:noFill/>
+          <a:ln>
+            <a:solidFill>
+              <a:schemeClr val="tx1"/>
+            </a:solidFill>
+          </a:ln>
+        </p:spPr>
+        <p:style>
+          <a:lnRef idx="2">
+            <a:schemeClr val="accent1">
+              <a:shade val="15000"/>
+            </a:schemeClr>
+          </a:lnRef>
+          <a:fillRef idx="1">
+            <a:schemeClr val="accent1"/>
+          </a:fillRef>
+          <a:effectRef idx="0">
+            <a:schemeClr val="accent1"/>
+          </a:effectRef>
+          <a:fontRef idx="minor">
+            <a:schemeClr val="lt1"/>
+          </a:fontRef>
+        </p:style>
+        <p:txBody>
+          <a:bodyPr rtlCol="0" anchor="ctr"/>
+          <a:lstStyle/>
+          <a:p>
+            <a:pPr algn="ctr"/>
+            <a:r>
+              <a:rPr lang="en-US" altLang="ko-KR" dirty="0">
+                <a:solidFill>
+                  <a:schemeClr val="tx1"/>
+                </a:solidFill>
+              </a:rPr>
+              <a:t>…..</a:t>
+            </a:r>
+            <a:endParaRPr lang="ko-KR" altLang="en-US" dirty="0">
+              <a:solidFill>
+                <a:schemeClr val="tx1"/>
+              </a:solidFill>
+            </a:endParaRPr>
+          </a:p>
+        </p:txBody>
+      </p:sp>
+      <p:cxnSp>
+        <p:nvCxnSpPr>
+          <p:cNvPr id="27" name="직선 화살표 연결선 26">
+            <a:extLst>
+              <a:ext uri="{FF2B5EF4-FFF2-40B4-BE49-F238E27FC236}">
+                <a16:creationId xmlns:a16="http://schemas.microsoft.com/office/drawing/2014/main" id="{95022415-A76E-C885-3052-A305576A561C}"/>
+              </a:ext>
+            </a:extLst>
+          </p:cNvPr>
+          <p:cNvCxnSpPr/>
+          <p:nvPr/>
+        </p:nvCxnSpPr>
+        <p:spPr>
+          <a:xfrm>
+            <a:off x="4375715" y="3815585"/>
+            <a:ext cx="617579" cy="689391"/>
+          </a:xfrm>
+          <a:prstGeom prst="straightConnector1">
+            <a:avLst/>
+          </a:prstGeom>
+          <a:ln w="38100">
+            <a:tailEnd type="triangle"/>
+          </a:ln>
+        </p:spPr>
+        <p:style>
+          <a:lnRef idx="1">
+            <a:schemeClr val="accent1"/>
+          </a:lnRef>
+          <a:fillRef idx="0">
+            <a:schemeClr val="accent1"/>
+          </a:fillRef>
+          <a:effectRef idx="0">
+            <a:schemeClr val="accent1"/>
+          </a:effectRef>
+          <a:fontRef idx="minor">
+            <a:schemeClr val="tx1"/>
+          </a:fontRef>
+        </p:style>
+      </p:cxnSp>
+      <p:cxnSp>
+        <p:nvCxnSpPr>
+          <p:cNvPr id="28" name="직선 화살표 연결선 27">
+            <a:extLst>
+              <a:ext uri="{FF2B5EF4-FFF2-40B4-BE49-F238E27FC236}">
+                <a16:creationId xmlns:a16="http://schemas.microsoft.com/office/drawing/2014/main" id="{B7EC7558-C0F9-5C32-94D2-EEEBB97A39B8}"/>
+              </a:ext>
+            </a:extLst>
+          </p:cNvPr>
+          <p:cNvCxnSpPr>
+            <a:cxnSpLocks/>
+          </p:cNvCxnSpPr>
+          <p:nvPr/>
+        </p:nvCxnSpPr>
+        <p:spPr>
+          <a:xfrm flipV="1">
+            <a:off x="5874182" y="3351904"/>
+            <a:ext cx="665056" cy="1103029"/>
+          </a:xfrm>
+          <a:prstGeom prst="straightConnector1">
+            <a:avLst/>
+          </a:prstGeom>
+          <a:ln w="38100">
+            <a:tailEnd type="triangle"/>
+          </a:ln>
+        </p:spPr>
+        <p:style>
+          <a:lnRef idx="1">
+            <a:schemeClr val="accent1"/>
+          </a:lnRef>
+          <a:fillRef idx="0">
+            <a:schemeClr val="accent1"/>
+          </a:fillRef>
+          <a:effectRef idx="0">
+            <a:schemeClr val="accent1"/>
+          </a:effectRef>
+          <a:fontRef idx="minor">
+            <a:schemeClr val="tx1"/>
+          </a:fontRef>
+        </p:style>
+      </p:cxnSp>
+      <p:sp>
+        <p:nvSpPr>
+          <p:cNvPr id="35" name="TextBox 34">
+            <a:extLst>
+              <a:ext uri="{FF2B5EF4-FFF2-40B4-BE49-F238E27FC236}">
+                <a16:creationId xmlns:a16="http://schemas.microsoft.com/office/drawing/2014/main" id="{6D2E32FD-D746-8ED5-78C9-5065D46AEE59}"/>
+              </a:ext>
+            </a:extLst>
+          </p:cNvPr>
+          <p:cNvSpPr txBox="1"/>
+          <p:nvPr/>
+        </p:nvSpPr>
+        <p:spPr>
+          <a:xfrm>
+            <a:off x="4668147" y="3790948"/>
+            <a:ext cx="753623" cy="369332"/>
+          </a:xfrm>
+          <a:prstGeom prst="rect">
+            <a:avLst/>
+          </a:prstGeom>
+          <a:noFill/>
+        </p:spPr>
+        <p:txBody>
+          <a:bodyPr wrap="square" rtlCol="0">
+            <a:spAutoFit/>
+          </a:bodyPr>
+          <a:lstStyle/>
+          <a:p>
+            <a:r>
+              <a:rPr lang="en-US" altLang="ko-KR" dirty="0"/>
+              <a:t>pipe</a:t>
+            </a:r>
+            <a:endParaRPr lang="ko-KR" altLang="en-US" dirty="0"/>
+          </a:p>
+        </p:txBody>
+      </p:sp>
+      <p:sp>
+        <p:nvSpPr>
+          <p:cNvPr id="36" name="TextBox 35">
+            <a:extLst>
+              <a:ext uri="{FF2B5EF4-FFF2-40B4-BE49-F238E27FC236}">
+                <a16:creationId xmlns:a16="http://schemas.microsoft.com/office/drawing/2014/main" id="{50137D44-7795-93B9-8109-454B0AB82DE5}"/>
+              </a:ext>
+            </a:extLst>
+          </p:cNvPr>
+          <p:cNvSpPr txBox="1"/>
+          <p:nvPr/>
+        </p:nvSpPr>
+        <p:spPr>
+          <a:xfrm>
+            <a:off x="5524698" y="3652881"/>
+            <a:ext cx="753623" cy="369332"/>
+          </a:xfrm>
+          <a:prstGeom prst="rect">
+            <a:avLst/>
+          </a:prstGeom>
+          <a:noFill/>
+        </p:spPr>
+        <p:txBody>
+          <a:bodyPr wrap="square" rtlCol="0">
+            <a:spAutoFit/>
+          </a:bodyPr>
+          <a:lstStyle/>
+          <a:p>
+            <a:r>
+              <a:rPr lang="en-US" altLang="ko-KR" dirty="0"/>
+              <a:t>pipe</a:t>
+            </a:r>
+            <a:endParaRPr lang="ko-KR" altLang="en-US" dirty="0"/>
+          </a:p>
+        </p:txBody>
+      </p:sp>
+      <p:sp>
+        <p:nvSpPr>
+          <p:cNvPr id="38" name="TextBox 37">
+            <a:extLst>
+              <a:ext uri="{FF2B5EF4-FFF2-40B4-BE49-F238E27FC236}">
+                <a16:creationId xmlns:a16="http://schemas.microsoft.com/office/drawing/2014/main" id="{8477CC70-CF4B-7030-E82B-C9B1BB0C7C7C}"/>
+              </a:ext>
+            </a:extLst>
+          </p:cNvPr>
+          <p:cNvSpPr txBox="1"/>
+          <p:nvPr/>
+        </p:nvSpPr>
+        <p:spPr>
+          <a:xfrm>
+            <a:off x="130859" y="2759564"/>
+            <a:ext cx="2041043" cy="369332"/>
+          </a:xfrm>
+          <a:prstGeom prst="rect">
+            <a:avLst/>
+          </a:prstGeom>
+          <a:noFill/>
+        </p:spPr>
+        <p:txBody>
+          <a:bodyPr wrap="square" rtlCol="0">
+            <a:spAutoFit/>
+          </a:bodyPr>
+          <a:lstStyle/>
+          <a:p>
+            <a:r>
+              <a:rPr lang="en-US" altLang="ko-KR" b="1" dirty="0">
+                <a:solidFill>
+                  <a:schemeClr val="accent1">
+                    <a:lumMod val="75000"/>
+                  </a:schemeClr>
+                </a:solidFill>
+              </a:rPr>
+              <a:t>cat /</a:t>
+            </a:r>
+            <a:r>
+              <a:rPr lang="en-US" altLang="ko-KR" b="1" dirty="0" err="1">
+                <a:solidFill>
+                  <a:schemeClr val="accent1">
+                    <a:lumMod val="75000"/>
+                  </a:schemeClr>
+                </a:solidFill>
+              </a:rPr>
+              <a:t>etc</a:t>
+            </a:r>
+            <a:r>
+              <a:rPr lang="en-US" altLang="ko-KR" b="1" dirty="0">
+                <a:solidFill>
+                  <a:schemeClr val="accent1">
+                    <a:lumMod val="75000"/>
+                  </a:schemeClr>
+                </a:solidFill>
+              </a:rPr>
+              <a:t>/passwd</a:t>
+            </a:r>
+            <a:endParaRPr lang="ko-KR" altLang="en-US" b="1" dirty="0">
+              <a:solidFill>
+                <a:schemeClr val="accent1">
+                  <a:lumMod val="75000"/>
+                </a:schemeClr>
+              </a:solidFill>
+            </a:endParaRPr>
+          </a:p>
+        </p:txBody>
+      </p:sp>
+      <p:sp>
+        <p:nvSpPr>
+          <p:cNvPr id="40" name="TextBox 39">
+            <a:extLst>
+              <a:ext uri="{FF2B5EF4-FFF2-40B4-BE49-F238E27FC236}">
+                <a16:creationId xmlns:a16="http://schemas.microsoft.com/office/drawing/2014/main" id="{6A6657B9-49F3-A43E-FFE6-5AAA31FD6B37}"/>
+              </a:ext>
+            </a:extLst>
+          </p:cNvPr>
+          <p:cNvSpPr txBox="1"/>
+          <p:nvPr/>
+        </p:nvSpPr>
+        <p:spPr>
+          <a:xfrm>
+            <a:off x="9376589" y="2657725"/>
+            <a:ext cx="996983" cy="369332"/>
+          </a:xfrm>
+          <a:prstGeom prst="rect">
+            <a:avLst/>
+          </a:prstGeom>
+          <a:noFill/>
+        </p:spPr>
+        <p:txBody>
+          <a:bodyPr wrap="square" rtlCol="0">
+            <a:spAutoFit/>
+          </a:bodyPr>
+          <a:lstStyle/>
+          <a:p>
+            <a:r>
+              <a:rPr lang="en-US" altLang="ko-KR" b="1" dirty="0" err="1">
+                <a:solidFill>
+                  <a:schemeClr val="accent1">
+                    <a:lumMod val="75000"/>
+                  </a:schemeClr>
+                </a:solidFill>
+              </a:rPr>
+              <a:t>wc</a:t>
+            </a:r>
+            <a:r>
+              <a:rPr lang="en-US" altLang="ko-KR" b="1" dirty="0">
+                <a:solidFill>
+                  <a:schemeClr val="accent1">
+                    <a:lumMod val="75000"/>
+                  </a:schemeClr>
+                </a:solidFill>
+              </a:rPr>
+              <a:t> -l</a:t>
+            </a:r>
+            <a:endParaRPr lang="ko-KR" altLang="en-US" b="1" dirty="0">
+              <a:solidFill>
+                <a:schemeClr val="accent1">
+                  <a:lumMod val="75000"/>
+                </a:schemeClr>
+              </a:solidFill>
+            </a:endParaRPr>
+          </a:p>
+        </p:txBody>
+      </p:sp>
+      <p:sp>
+        <p:nvSpPr>
+          <p:cNvPr id="41" name="TextBox 40">
+            <a:extLst>
+              <a:ext uri="{FF2B5EF4-FFF2-40B4-BE49-F238E27FC236}">
+                <a16:creationId xmlns:a16="http://schemas.microsoft.com/office/drawing/2014/main" id="{00F01FD5-304D-C46B-2D50-D89B533BC499}"/>
+              </a:ext>
+            </a:extLst>
+          </p:cNvPr>
+          <p:cNvSpPr txBox="1"/>
+          <p:nvPr/>
+        </p:nvSpPr>
+        <p:spPr>
+          <a:xfrm>
+            <a:off x="276877" y="3198821"/>
+            <a:ext cx="1639694" cy="307777"/>
+          </a:xfrm>
+          <a:prstGeom prst="rect">
+            <a:avLst/>
+          </a:prstGeom>
+          <a:noFill/>
+        </p:spPr>
+        <p:txBody>
+          <a:bodyPr wrap="square" rtlCol="0">
+            <a:spAutoFit/>
+          </a:bodyPr>
+          <a:lstStyle/>
+          <a:p>
+            <a:r>
+              <a:rPr lang="en-US" altLang="ko-KR" sz="1400" b="1" dirty="0"/>
+              <a:t>STDOUT_FILENO</a:t>
+            </a:r>
+            <a:endParaRPr lang="ko-KR" altLang="en-US" sz="1400" b="1" dirty="0"/>
+          </a:p>
+        </p:txBody>
+      </p:sp>
+      <p:sp>
+        <p:nvSpPr>
+          <p:cNvPr id="42" name="TextBox 41">
+            <a:extLst>
+              <a:ext uri="{FF2B5EF4-FFF2-40B4-BE49-F238E27FC236}">
+                <a16:creationId xmlns:a16="http://schemas.microsoft.com/office/drawing/2014/main" id="{FB2E309C-47C2-A83A-5BA4-9270874CC9C0}"/>
+              </a:ext>
+            </a:extLst>
+          </p:cNvPr>
+          <p:cNvSpPr txBox="1"/>
+          <p:nvPr/>
+        </p:nvSpPr>
+        <p:spPr>
+          <a:xfrm>
+            <a:off x="9055233" y="3044127"/>
+            <a:ext cx="1639694" cy="307777"/>
+          </a:xfrm>
+          <a:prstGeom prst="rect">
+            <a:avLst/>
+          </a:prstGeom>
+          <a:noFill/>
+        </p:spPr>
+        <p:txBody>
+          <a:bodyPr wrap="square" rtlCol="0">
+            <a:spAutoFit/>
+          </a:bodyPr>
+          <a:lstStyle/>
+          <a:p>
+            <a:r>
+              <a:rPr lang="en-US" altLang="ko-KR" sz="1400" b="1" dirty="0"/>
+              <a:t>STDIN_FILENO</a:t>
+            </a:r>
+            <a:endParaRPr lang="ko-KR" altLang="en-US" sz="1400" b="1" dirty="0"/>
+          </a:p>
+        </p:txBody>
+      </p:sp>
+      <p:cxnSp>
+        <p:nvCxnSpPr>
+          <p:cNvPr id="50" name="직선 화살표 연결선 49">
+            <a:extLst>
+              <a:ext uri="{FF2B5EF4-FFF2-40B4-BE49-F238E27FC236}">
+                <a16:creationId xmlns:a16="http://schemas.microsoft.com/office/drawing/2014/main" id="{B8B8DA63-7B51-D736-DDAA-870DD0578D0B}"/>
+              </a:ext>
+            </a:extLst>
+          </p:cNvPr>
+          <p:cNvCxnSpPr>
+            <a:stCxn id="41" idx="3"/>
+            <a:endCxn id="11" idx="1"/>
+          </p:cNvCxnSpPr>
+          <p:nvPr/>
+        </p:nvCxnSpPr>
+        <p:spPr>
+          <a:xfrm>
+            <a:off x="1916571" y="3352710"/>
+            <a:ext cx="1472933" cy="341943"/>
+          </a:xfrm>
+          <a:prstGeom prst="straightConnector1">
+            <a:avLst/>
+          </a:prstGeom>
+          <a:ln w="19050">
+            <a:solidFill>
+              <a:schemeClr val="tx2"/>
+            </a:solidFill>
+            <a:tailEnd type="triangle"/>
+          </a:ln>
+        </p:spPr>
+        <p:style>
+          <a:lnRef idx="1">
+            <a:schemeClr val="accent1"/>
+          </a:lnRef>
+          <a:fillRef idx="0">
+            <a:schemeClr val="accent1"/>
+          </a:fillRef>
+          <a:effectRef idx="0">
+            <a:schemeClr val="accent1"/>
+          </a:effectRef>
+          <a:fontRef idx="minor">
+            <a:schemeClr val="tx1"/>
+          </a:fontRef>
+        </p:style>
+      </p:cxnSp>
+      <p:cxnSp>
+        <p:nvCxnSpPr>
+          <p:cNvPr id="51" name="직선 화살표 연결선 50">
+            <a:extLst>
+              <a:ext uri="{FF2B5EF4-FFF2-40B4-BE49-F238E27FC236}">
+                <a16:creationId xmlns:a16="http://schemas.microsoft.com/office/drawing/2014/main" id="{9CDCF7E2-7BD3-8583-0B9B-425886B0B019}"/>
+              </a:ext>
+            </a:extLst>
+          </p:cNvPr>
+          <p:cNvCxnSpPr>
+            <a:cxnSpLocks/>
+            <a:stCxn id="20" idx="3"/>
+          </p:cNvCxnSpPr>
+          <p:nvPr/>
+        </p:nvCxnSpPr>
+        <p:spPr>
+          <a:xfrm flipV="1">
+            <a:off x="8337717" y="3205343"/>
+            <a:ext cx="648298" cy="19444"/>
+          </a:xfrm>
+          <a:prstGeom prst="straightConnector1">
+            <a:avLst/>
+          </a:prstGeom>
+          <a:ln w="19050">
+            <a:solidFill>
+              <a:schemeClr val="tx2"/>
+            </a:solidFill>
+            <a:tailEnd type="triangle"/>
+          </a:ln>
+        </p:spPr>
+        <p:style>
+          <a:lnRef idx="1">
+            <a:schemeClr val="accent1"/>
+          </a:lnRef>
+          <a:fillRef idx="0">
+            <a:schemeClr val="accent1"/>
+          </a:fillRef>
+          <a:effectRef idx="0">
+            <a:schemeClr val="accent1"/>
+          </a:effectRef>
+          <a:fontRef idx="minor">
+            <a:schemeClr val="tx1"/>
+          </a:fontRef>
+        </p:style>
+      </p:cxnSp>
+    </p:spTree>
+    <p:extLst>
+      <p:ext uri="{BB962C8B-B14F-4D97-AF65-F5344CB8AC3E}">
+        <p14:creationId xmlns:p14="http://schemas.microsoft.com/office/powerpoint/2010/main" val="1747599767"/>
+      </p:ext>
+    </p:extLst>
+  </p:cSld>
+  <p:clrMapOvr>
+    <a:masterClrMapping/>
+  </p:clrMapOvr>
+</p:sld>
+</file>
+
 <file path=ppt/theme/theme1.xml><?xml version="1.0" encoding="utf-8"?>
 <a:theme xmlns:a="http://schemas.openxmlformats.org/drawingml/2006/main" name="Office 테마">
   <a:themeElements>

</xml_diff>

<commit_message>
Post 추가 : Deep Q-Network + ML-agents 구현
</commit_message>
<xml_diff>
--- a/_site/assets/docu/genserver.pptx
+++ b/_site/assets/docu/genserver.pptx
@@ -11,6 +11,8 @@
     <p:sldId id="259" r:id="rId5"/>
     <p:sldId id="260" r:id="rId6"/>
     <p:sldId id="261" r:id="rId7"/>
+    <p:sldId id="262" r:id="rId8"/>
+    <p:sldId id="263" r:id="rId9"/>
   </p:sldIdLst>
   <p:sldSz cx="12192000" cy="6858000"/>
   <p:notesSz cx="6858000" cy="9144000"/>
@@ -264,7 +266,7 @@
           <a:p>
             <a:fld id="{AAC9601E-31FD-458B-B714-EFF76A516D36}" type="datetimeFigureOut">
               <a:rPr lang="ko-KR" altLang="en-US" smtClean="0"/>
-              <a:t>2024-03-20</a:t>
+              <a:t>2024-05-04</a:t>
             </a:fld>
             <a:endParaRPr lang="ko-KR" altLang="en-US"/>
           </a:p>
@@ -462,7 +464,7 @@
           <a:p>
             <a:fld id="{AAC9601E-31FD-458B-B714-EFF76A516D36}" type="datetimeFigureOut">
               <a:rPr lang="ko-KR" altLang="en-US" smtClean="0"/>
-              <a:t>2024-03-20</a:t>
+              <a:t>2024-05-04</a:t>
             </a:fld>
             <a:endParaRPr lang="ko-KR" altLang="en-US"/>
           </a:p>
@@ -670,7 +672,7 @@
           <a:p>
             <a:fld id="{AAC9601E-31FD-458B-B714-EFF76A516D36}" type="datetimeFigureOut">
               <a:rPr lang="ko-KR" altLang="en-US" smtClean="0"/>
-              <a:t>2024-03-20</a:t>
+              <a:t>2024-05-04</a:t>
             </a:fld>
             <a:endParaRPr lang="ko-KR" altLang="en-US"/>
           </a:p>
@@ -868,7 +870,7 @@
           <a:p>
             <a:fld id="{AAC9601E-31FD-458B-B714-EFF76A516D36}" type="datetimeFigureOut">
               <a:rPr lang="ko-KR" altLang="en-US" smtClean="0"/>
-              <a:t>2024-03-20</a:t>
+              <a:t>2024-05-04</a:t>
             </a:fld>
             <a:endParaRPr lang="ko-KR" altLang="en-US"/>
           </a:p>
@@ -1143,7 +1145,7 @@
           <a:p>
             <a:fld id="{AAC9601E-31FD-458B-B714-EFF76A516D36}" type="datetimeFigureOut">
               <a:rPr lang="ko-KR" altLang="en-US" smtClean="0"/>
-              <a:t>2024-03-20</a:t>
+              <a:t>2024-05-04</a:t>
             </a:fld>
             <a:endParaRPr lang="ko-KR" altLang="en-US"/>
           </a:p>
@@ -1408,7 +1410,7 @@
           <a:p>
             <a:fld id="{AAC9601E-31FD-458B-B714-EFF76A516D36}" type="datetimeFigureOut">
               <a:rPr lang="ko-KR" altLang="en-US" smtClean="0"/>
-              <a:t>2024-03-20</a:t>
+              <a:t>2024-05-04</a:t>
             </a:fld>
             <a:endParaRPr lang="ko-KR" altLang="en-US"/>
           </a:p>
@@ -1820,7 +1822,7 @@
           <a:p>
             <a:fld id="{AAC9601E-31FD-458B-B714-EFF76A516D36}" type="datetimeFigureOut">
               <a:rPr lang="ko-KR" altLang="en-US" smtClean="0"/>
-              <a:t>2024-03-20</a:t>
+              <a:t>2024-05-04</a:t>
             </a:fld>
             <a:endParaRPr lang="ko-KR" altLang="en-US"/>
           </a:p>
@@ -1961,7 +1963,7 @@
           <a:p>
             <a:fld id="{AAC9601E-31FD-458B-B714-EFF76A516D36}" type="datetimeFigureOut">
               <a:rPr lang="ko-KR" altLang="en-US" smtClean="0"/>
-              <a:t>2024-03-20</a:t>
+              <a:t>2024-05-04</a:t>
             </a:fld>
             <a:endParaRPr lang="ko-KR" altLang="en-US"/>
           </a:p>
@@ -2074,7 +2076,7 @@
           <a:p>
             <a:fld id="{AAC9601E-31FD-458B-B714-EFF76A516D36}" type="datetimeFigureOut">
               <a:rPr lang="ko-KR" altLang="en-US" smtClean="0"/>
-              <a:t>2024-03-20</a:t>
+              <a:t>2024-05-04</a:t>
             </a:fld>
             <a:endParaRPr lang="ko-KR" altLang="en-US"/>
           </a:p>
@@ -2385,7 +2387,7 @@
           <a:p>
             <a:fld id="{AAC9601E-31FD-458B-B714-EFF76A516D36}" type="datetimeFigureOut">
               <a:rPr lang="ko-KR" altLang="en-US" smtClean="0"/>
-              <a:t>2024-03-20</a:t>
+              <a:t>2024-05-04</a:t>
             </a:fld>
             <a:endParaRPr lang="ko-KR" altLang="en-US"/>
           </a:p>
@@ -2673,7 +2675,7 @@
           <a:p>
             <a:fld id="{AAC9601E-31FD-458B-B714-EFF76A516D36}" type="datetimeFigureOut">
               <a:rPr lang="ko-KR" altLang="en-US" smtClean="0"/>
-              <a:t>2024-03-20</a:t>
+              <a:t>2024-05-04</a:t>
             </a:fld>
             <a:endParaRPr lang="ko-KR" altLang="en-US"/>
           </a:p>
@@ -2914,7 +2916,7 @@
           <a:p>
             <a:fld id="{AAC9601E-31FD-458B-B714-EFF76A516D36}" type="datetimeFigureOut">
               <a:rPr lang="ko-KR" altLang="en-US" smtClean="0"/>
-              <a:t>2024-03-20</a:t>
+              <a:t>2024-05-04</a:t>
             </a:fld>
             <a:endParaRPr lang="ko-KR" altLang="en-US"/>
           </a:p>
@@ -7902,6 +7904,443 @@
 </p:sld>
 </file>
 
+<file path=ppt/slides/slide7.xml><?xml version="1.0" encoding="utf-8"?>
+<p:sld xmlns:a="http://schemas.openxmlformats.org/drawingml/2006/main" xmlns:r="http://schemas.openxmlformats.org/officeDocument/2006/relationships" xmlns:p="http://schemas.openxmlformats.org/presentationml/2006/main">
+  <p:cSld>
+    <p:spTree>
+      <p:nvGrpSpPr>
+        <p:cNvPr id="1" name=""/>
+        <p:cNvGrpSpPr/>
+        <p:nvPr/>
+      </p:nvGrpSpPr>
+      <p:grpSpPr>
+        <a:xfrm>
+          <a:off x="0" y="0"/>
+          <a:ext cx="0" cy="0"/>
+          <a:chOff x="0" y="0"/>
+          <a:chExt cx="0" cy="0"/>
+        </a:xfrm>
+      </p:grpSpPr>
+      <p:pic>
+        <p:nvPicPr>
+          <p:cNvPr id="5" name="그림 4">
+            <a:extLst>
+              <a:ext uri="{FF2B5EF4-FFF2-40B4-BE49-F238E27FC236}">
+                <a16:creationId xmlns:a16="http://schemas.microsoft.com/office/drawing/2014/main" id="{D3789D2B-87FE-5BD5-2139-067682811D1D}"/>
+              </a:ext>
+            </a:extLst>
+          </p:cNvPr>
+          <p:cNvPicPr>
+            <a:picLocks noChangeAspect="1"/>
+          </p:cNvPicPr>
+          <p:nvPr/>
+        </p:nvPicPr>
+        <p:blipFill>
+          <a:blip r:embed="rId2"/>
+          <a:stretch>
+            <a:fillRect/>
+          </a:stretch>
+        </p:blipFill>
+        <p:spPr>
+          <a:xfrm>
+            <a:off x="1115472" y="628680"/>
+            <a:ext cx="9814241" cy="4284851"/>
+          </a:xfrm>
+          <a:prstGeom prst="rect">
+            <a:avLst/>
+          </a:prstGeom>
+        </p:spPr>
+      </p:pic>
+      <p:grpSp>
+        <p:nvGrpSpPr>
+          <p:cNvPr id="8" name="그룹 7">
+            <a:extLst>
+              <a:ext uri="{FF2B5EF4-FFF2-40B4-BE49-F238E27FC236}">
+                <a16:creationId xmlns:a16="http://schemas.microsoft.com/office/drawing/2014/main" id="{EBCD5ABF-F77D-9468-3709-DA5010A3BA02}"/>
+              </a:ext>
+            </a:extLst>
+          </p:cNvPr>
+          <p:cNvGrpSpPr/>
+          <p:nvPr/>
+        </p:nvGrpSpPr>
+        <p:grpSpPr>
+          <a:xfrm>
+            <a:off x="1129835" y="550554"/>
+            <a:ext cx="1733052" cy="1838375"/>
+            <a:chOff x="1129834" y="550555"/>
+            <a:chExt cx="1790501" cy="1776138"/>
+          </a:xfrm>
+        </p:grpSpPr>
+        <p:sp>
+          <p:nvSpPr>
+            <p:cNvPr id="7" name="직사각형 6">
+              <a:extLst>
+                <a:ext uri="{FF2B5EF4-FFF2-40B4-BE49-F238E27FC236}">
+                  <a16:creationId xmlns:a16="http://schemas.microsoft.com/office/drawing/2014/main" id="{6203C43D-AF65-1E14-14AA-3FF2345E92A0}"/>
+                </a:ext>
+              </a:extLst>
+            </p:cNvPr>
+            <p:cNvSpPr/>
+            <p:nvPr/>
+          </p:nvSpPr>
+          <p:spPr>
+            <a:xfrm>
+              <a:off x="1311757" y="708540"/>
+              <a:ext cx="1608578" cy="1618153"/>
+            </a:xfrm>
+            <a:prstGeom prst="rect">
+              <a:avLst/>
+            </a:prstGeom>
+            <a:noFill/>
+            <a:ln>
+              <a:solidFill>
+                <a:srgbClr val="FF493B"/>
+              </a:solidFill>
+            </a:ln>
+            <a:effectLst>
+              <a:outerShdw blurRad="50800" dist="38100" dir="2700000" algn="tl" rotWithShape="0">
+                <a:prstClr val="black">
+                  <a:alpha val="40000"/>
+                </a:prstClr>
+              </a:outerShdw>
+            </a:effectLst>
+          </p:spPr>
+          <p:style>
+            <a:lnRef idx="2">
+              <a:schemeClr val="accent1">
+                <a:shade val="15000"/>
+              </a:schemeClr>
+            </a:lnRef>
+            <a:fillRef idx="1">
+              <a:schemeClr val="accent1"/>
+            </a:fillRef>
+            <a:effectRef idx="0">
+              <a:schemeClr val="accent1"/>
+            </a:effectRef>
+            <a:fontRef idx="minor">
+              <a:schemeClr val="lt1"/>
+            </a:fontRef>
+          </p:style>
+          <p:txBody>
+            <a:bodyPr rtlCol="0" anchor="ctr"/>
+            <a:lstStyle/>
+            <a:p>
+              <a:pPr algn="ctr"/>
+              <a:endParaRPr lang="ko-KR" altLang="en-US"/>
+            </a:p>
+          </p:txBody>
+        </p:sp>
+        <p:sp>
+          <p:nvSpPr>
+            <p:cNvPr id="6" name="TextBox 5">
+              <a:extLst>
+                <a:ext uri="{FF2B5EF4-FFF2-40B4-BE49-F238E27FC236}">
+                  <a16:creationId xmlns:a16="http://schemas.microsoft.com/office/drawing/2014/main" id="{345EB639-49ED-27A1-D2EA-0030473E452B}"/>
+                </a:ext>
+              </a:extLst>
+            </p:cNvPr>
+            <p:cNvSpPr txBox="1"/>
+            <p:nvPr/>
+          </p:nvSpPr>
+          <p:spPr>
+            <a:xfrm>
+              <a:off x="1129834" y="550555"/>
+              <a:ext cx="373419" cy="369332"/>
+            </a:xfrm>
+            <a:prstGeom prst="rect">
+              <a:avLst/>
+            </a:prstGeom>
+            <a:solidFill>
+              <a:schemeClr val="bg1"/>
+            </a:solidFill>
+          </p:spPr>
+          <p:txBody>
+            <a:bodyPr wrap="square" rtlCol="0">
+              <a:spAutoFit/>
+            </a:bodyPr>
+            <a:lstStyle/>
+            <a:p>
+              <a:r>
+                <a:rPr lang="en-US" altLang="ko-KR" b="1" dirty="0">
+                  <a:solidFill>
+                    <a:srgbClr val="FF0000"/>
+                  </a:solidFill>
+                </a:rPr>
+                <a:t>A.</a:t>
+              </a:r>
+              <a:endParaRPr lang="ko-KR" altLang="en-US" b="1" dirty="0">
+                <a:solidFill>
+                  <a:srgbClr val="FF0000"/>
+                </a:solidFill>
+              </a:endParaRPr>
+            </a:p>
+          </p:txBody>
+        </p:sp>
+      </p:grpSp>
+      <p:grpSp>
+        <p:nvGrpSpPr>
+          <p:cNvPr id="9" name="그룹 8">
+            <a:extLst>
+              <a:ext uri="{FF2B5EF4-FFF2-40B4-BE49-F238E27FC236}">
+                <a16:creationId xmlns:a16="http://schemas.microsoft.com/office/drawing/2014/main" id="{040FE74E-7601-6D78-1986-7D797F53ACFA}"/>
+              </a:ext>
+            </a:extLst>
+          </p:cNvPr>
+          <p:cNvGrpSpPr/>
+          <p:nvPr/>
+        </p:nvGrpSpPr>
+        <p:grpSpPr>
+          <a:xfrm>
+            <a:off x="1129836" y="2668198"/>
+            <a:ext cx="1733052" cy="1800874"/>
+            <a:chOff x="1129834" y="550555"/>
+            <a:chExt cx="1790501" cy="1776138"/>
+          </a:xfrm>
+        </p:grpSpPr>
+        <p:sp>
+          <p:nvSpPr>
+            <p:cNvPr id="10" name="직사각형 9">
+              <a:extLst>
+                <a:ext uri="{FF2B5EF4-FFF2-40B4-BE49-F238E27FC236}">
+                  <a16:creationId xmlns:a16="http://schemas.microsoft.com/office/drawing/2014/main" id="{45CCE0ED-0397-AB57-8018-A0B424CB860A}"/>
+                </a:ext>
+              </a:extLst>
+            </p:cNvPr>
+            <p:cNvSpPr/>
+            <p:nvPr/>
+          </p:nvSpPr>
+          <p:spPr>
+            <a:xfrm>
+              <a:off x="1311757" y="708540"/>
+              <a:ext cx="1608578" cy="1618153"/>
+            </a:xfrm>
+            <a:prstGeom prst="rect">
+              <a:avLst/>
+            </a:prstGeom>
+            <a:noFill/>
+            <a:ln>
+              <a:solidFill>
+                <a:srgbClr val="FF493B"/>
+              </a:solidFill>
+            </a:ln>
+            <a:effectLst>
+              <a:outerShdw blurRad="50800" dist="38100" dir="2700000" algn="tl" rotWithShape="0">
+                <a:prstClr val="black">
+                  <a:alpha val="40000"/>
+                </a:prstClr>
+              </a:outerShdw>
+            </a:effectLst>
+          </p:spPr>
+          <p:style>
+            <a:lnRef idx="2">
+              <a:schemeClr val="accent1">
+                <a:shade val="15000"/>
+              </a:schemeClr>
+            </a:lnRef>
+            <a:fillRef idx="1">
+              <a:schemeClr val="accent1"/>
+            </a:fillRef>
+            <a:effectRef idx="0">
+              <a:schemeClr val="accent1"/>
+            </a:effectRef>
+            <a:fontRef idx="minor">
+              <a:schemeClr val="lt1"/>
+            </a:fontRef>
+          </p:style>
+          <p:txBody>
+            <a:bodyPr rtlCol="0" anchor="ctr"/>
+            <a:lstStyle/>
+            <a:p>
+              <a:pPr algn="ctr"/>
+              <a:endParaRPr lang="ko-KR" altLang="en-US"/>
+            </a:p>
+          </p:txBody>
+        </p:sp>
+        <p:sp>
+          <p:nvSpPr>
+            <p:cNvPr id="11" name="TextBox 10">
+              <a:extLst>
+                <a:ext uri="{FF2B5EF4-FFF2-40B4-BE49-F238E27FC236}">
+                  <a16:creationId xmlns:a16="http://schemas.microsoft.com/office/drawing/2014/main" id="{C2C17388-16BC-3A13-9263-FB1E9D69D6F8}"/>
+                </a:ext>
+              </a:extLst>
+            </p:cNvPr>
+            <p:cNvSpPr txBox="1"/>
+            <p:nvPr/>
+          </p:nvSpPr>
+          <p:spPr>
+            <a:xfrm>
+              <a:off x="1129834" y="550555"/>
+              <a:ext cx="373419" cy="369332"/>
+            </a:xfrm>
+            <a:prstGeom prst="rect">
+              <a:avLst/>
+            </a:prstGeom>
+            <a:solidFill>
+              <a:schemeClr val="bg1"/>
+            </a:solidFill>
+          </p:spPr>
+          <p:txBody>
+            <a:bodyPr wrap="square" rtlCol="0">
+              <a:spAutoFit/>
+            </a:bodyPr>
+            <a:lstStyle/>
+            <a:p>
+              <a:r>
+                <a:rPr lang="en-US" altLang="ko-KR" b="1" dirty="0">
+                  <a:solidFill>
+                    <a:srgbClr val="FF0000"/>
+                  </a:solidFill>
+                </a:rPr>
+                <a:t>0.</a:t>
+              </a:r>
+              <a:endParaRPr lang="ko-KR" altLang="en-US" b="1" dirty="0">
+                <a:solidFill>
+                  <a:srgbClr val="FF0000"/>
+                </a:solidFill>
+              </a:endParaRPr>
+            </a:p>
+          </p:txBody>
+        </p:sp>
+      </p:grpSp>
+      <p:sp>
+        <p:nvSpPr>
+          <p:cNvPr id="13" name="TextBox 12">
+            <a:extLst>
+              <a:ext uri="{FF2B5EF4-FFF2-40B4-BE49-F238E27FC236}">
+                <a16:creationId xmlns:a16="http://schemas.microsoft.com/office/drawing/2014/main" id="{8C81180C-C7A0-7299-FD42-CF86A75E0B1B}"/>
+              </a:ext>
+            </a:extLst>
+          </p:cNvPr>
+          <p:cNvSpPr txBox="1"/>
+          <p:nvPr/>
+        </p:nvSpPr>
+        <p:spPr>
+          <a:xfrm>
+            <a:off x="1819225" y="3169282"/>
+            <a:ext cx="885676" cy="1754326"/>
+          </a:xfrm>
+          <a:prstGeom prst="rect">
+            <a:avLst/>
+          </a:prstGeom>
+          <a:noFill/>
+        </p:spPr>
+        <p:txBody>
+          <a:bodyPr wrap="square" rtlCol="0">
+            <a:spAutoFit/>
+          </a:bodyPr>
+          <a:lstStyle/>
+          <a:p>
+            <a:r>
+              <a:rPr lang="ko-KR" altLang="en-US" dirty="0"/>
+              <a:t>라이브러리 </a:t>
+            </a:r>
+            <a:r>
+              <a:rPr lang="en-US" altLang="ko-KR"/>
+              <a:t>&amp; </a:t>
+            </a:r>
+          </a:p>
+          <a:p>
+            <a:r>
+              <a:rPr lang="ko-KR" altLang="en-US"/>
+              <a:t>파라미터 설정</a:t>
+            </a:r>
+          </a:p>
+        </p:txBody>
+      </p:sp>
+    </p:spTree>
+    <p:extLst>
+      <p:ext uri="{BB962C8B-B14F-4D97-AF65-F5344CB8AC3E}">
+        <p14:creationId xmlns:p14="http://schemas.microsoft.com/office/powerpoint/2010/main" val="2662644682"/>
+      </p:ext>
+    </p:extLst>
+  </p:cSld>
+  <p:clrMapOvr>
+    <a:masterClrMapping/>
+  </p:clrMapOvr>
+</p:sld>
+</file>
+
+<file path=ppt/slides/slide8.xml><?xml version="1.0" encoding="utf-8"?>
+<p:sld xmlns:a="http://schemas.openxmlformats.org/drawingml/2006/main" xmlns:r="http://schemas.openxmlformats.org/officeDocument/2006/relationships" xmlns:p="http://schemas.openxmlformats.org/presentationml/2006/main">
+  <p:cSld>
+    <p:spTree>
+      <p:nvGrpSpPr>
+        <p:cNvPr id="1" name=""/>
+        <p:cNvGrpSpPr/>
+        <p:nvPr/>
+      </p:nvGrpSpPr>
+      <p:grpSpPr>
+        <a:xfrm>
+          <a:off x="0" y="0"/>
+          <a:ext cx="0" cy="0"/>
+          <a:chOff x="0" y="0"/>
+          <a:chExt cx="0" cy="0"/>
+        </a:xfrm>
+      </p:grpSpPr>
+      <p:sp>
+        <p:nvSpPr>
+          <p:cNvPr id="2" name="제목 1">
+            <a:extLst>
+              <a:ext uri="{FF2B5EF4-FFF2-40B4-BE49-F238E27FC236}">
+                <a16:creationId xmlns:a16="http://schemas.microsoft.com/office/drawing/2014/main" id="{F304101F-BC36-120D-6060-FF33674FB1E7}"/>
+              </a:ext>
+            </a:extLst>
+          </p:cNvPr>
+          <p:cNvSpPr>
+            <a:spLocks noGrp="1"/>
+          </p:cNvSpPr>
+          <p:nvPr>
+            <p:ph type="title"/>
+          </p:nvPr>
+        </p:nvSpPr>
+        <p:spPr/>
+        <p:txBody>
+          <a:bodyPr/>
+          <a:lstStyle/>
+          <a:p>
+            <a:endParaRPr lang="ko-KR" altLang="en-US"/>
+          </a:p>
+        </p:txBody>
+      </p:sp>
+      <p:sp>
+        <p:nvSpPr>
+          <p:cNvPr id="3" name="내용 개체 틀 2">
+            <a:extLst>
+              <a:ext uri="{FF2B5EF4-FFF2-40B4-BE49-F238E27FC236}">
+                <a16:creationId xmlns:a16="http://schemas.microsoft.com/office/drawing/2014/main" id="{FE810312-BE88-401B-C378-0AC5D8345556}"/>
+              </a:ext>
+            </a:extLst>
+          </p:cNvPr>
+          <p:cNvSpPr>
+            <a:spLocks noGrp="1"/>
+          </p:cNvSpPr>
+          <p:nvPr>
+            <p:ph idx="1"/>
+          </p:nvPr>
+        </p:nvSpPr>
+        <p:spPr/>
+        <p:txBody>
+          <a:bodyPr/>
+          <a:lstStyle/>
+          <a:p>
+            <a:endParaRPr lang="ko-KR" altLang="en-US"/>
+          </a:p>
+        </p:txBody>
+      </p:sp>
+    </p:spTree>
+    <p:extLst>
+      <p:ext uri="{BB962C8B-B14F-4D97-AF65-F5344CB8AC3E}">
+        <p14:creationId xmlns:p14="http://schemas.microsoft.com/office/powerpoint/2010/main" val="3014454544"/>
+      </p:ext>
+    </p:extLst>
+  </p:cSld>
+  <p:clrMapOvr>
+    <a:masterClrMapping/>
+  </p:clrMapOvr>
+</p:sld>
+</file>
+
 <file path=ppt/theme/theme1.xml><?xml version="1.0" encoding="utf-8"?>
 <a:theme xmlns:a="http://schemas.openxmlformats.org/drawingml/2006/main" name="Office 테마">
   <a:themeElements>

</xml_diff>

<commit_message>
Post 추가 DDPG(Deep Deterministic Policy Gradient) Algorithm 이해
</commit_message>
<xml_diff>
--- a/_site/assets/docu/genserver.pptx
+++ b/_site/assets/docu/genserver.pptx
@@ -266,7 +266,7 @@
           <a:p>
             <a:fld id="{AAC9601E-31FD-458B-B714-EFF76A516D36}" type="datetimeFigureOut">
               <a:rPr lang="ko-KR" altLang="en-US" smtClean="0"/>
-              <a:t>2024-05-04</a:t>
+              <a:t>2024-05-07</a:t>
             </a:fld>
             <a:endParaRPr lang="ko-KR" altLang="en-US"/>
           </a:p>
@@ -464,7 +464,7 @@
           <a:p>
             <a:fld id="{AAC9601E-31FD-458B-B714-EFF76A516D36}" type="datetimeFigureOut">
               <a:rPr lang="ko-KR" altLang="en-US" smtClean="0"/>
-              <a:t>2024-05-04</a:t>
+              <a:t>2024-05-07</a:t>
             </a:fld>
             <a:endParaRPr lang="ko-KR" altLang="en-US"/>
           </a:p>
@@ -672,7 +672,7 @@
           <a:p>
             <a:fld id="{AAC9601E-31FD-458B-B714-EFF76A516D36}" type="datetimeFigureOut">
               <a:rPr lang="ko-KR" altLang="en-US" smtClean="0"/>
-              <a:t>2024-05-04</a:t>
+              <a:t>2024-05-07</a:t>
             </a:fld>
             <a:endParaRPr lang="ko-KR" altLang="en-US"/>
           </a:p>
@@ -870,7 +870,7 @@
           <a:p>
             <a:fld id="{AAC9601E-31FD-458B-B714-EFF76A516D36}" type="datetimeFigureOut">
               <a:rPr lang="ko-KR" altLang="en-US" smtClean="0"/>
-              <a:t>2024-05-04</a:t>
+              <a:t>2024-05-07</a:t>
             </a:fld>
             <a:endParaRPr lang="ko-KR" altLang="en-US"/>
           </a:p>
@@ -1145,7 +1145,7 @@
           <a:p>
             <a:fld id="{AAC9601E-31FD-458B-B714-EFF76A516D36}" type="datetimeFigureOut">
               <a:rPr lang="ko-KR" altLang="en-US" smtClean="0"/>
-              <a:t>2024-05-04</a:t>
+              <a:t>2024-05-07</a:t>
             </a:fld>
             <a:endParaRPr lang="ko-KR" altLang="en-US"/>
           </a:p>
@@ -1410,7 +1410,7 @@
           <a:p>
             <a:fld id="{AAC9601E-31FD-458B-B714-EFF76A516D36}" type="datetimeFigureOut">
               <a:rPr lang="ko-KR" altLang="en-US" smtClean="0"/>
-              <a:t>2024-05-04</a:t>
+              <a:t>2024-05-07</a:t>
             </a:fld>
             <a:endParaRPr lang="ko-KR" altLang="en-US"/>
           </a:p>
@@ -1822,7 +1822,7 @@
           <a:p>
             <a:fld id="{AAC9601E-31FD-458B-B714-EFF76A516D36}" type="datetimeFigureOut">
               <a:rPr lang="ko-KR" altLang="en-US" smtClean="0"/>
-              <a:t>2024-05-04</a:t>
+              <a:t>2024-05-07</a:t>
             </a:fld>
             <a:endParaRPr lang="ko-KR" altLang="en-US"/>
           </a:p>
@@ -1963,7 +1963,7 @@
           <a:p>
             <a:fld id="{AAC9601E-31FD-458B-B714-EFF76A516D36}" type="datetimeFigureOut">
               <a:rPr lang="ko-KR" altLang="en-US" smtClean="0"/>
-              <a:t>2024-05-04</a:t>
+              <a:t>2024-05-07</a:t>
             </a:fld>
             <a:endParaRPr lang="ko-KR" altLang="en-US"/>
           </a:p>
@@ -2076,7 +2076,7 @@
           <a:p>
             <a:fld id="{AAC9601E-31FD-458B-B714-EFF76A516D36}" type="datetimeFigureOut">
               <a:rPr lang="ko-KR" altLang="en-US" smtClean="0"/>
-              <a:t>2024-05-04</a:t>
+              <a:t>2024-05-07</a:t>
             </a:fld>
             <a:endParaRPr lang="ko-KR" altLang="en-US"/>
           </a:p>
@@ -2387,7 +2387,7 @@
           <a:p>
             <a:fld id="{AAC9601E-31FD-458B-B714-EFF76A516D36}" type="datetimeFigureOut">
               <a:rPr lang="ko-KR" altLang="en-US" smtClean="0"/>
-              <a:t>2024-05-04</a:t>
+              <a:t>2024-05-07</a:t>
             </a:fld>
             <a:endParaRPr lang="ko-KR" altLang="en-US"/>
           </a:p>
@@ -2675,7 +2675,7 @@
           <a:p>
             <a:fld id="{AAC9601E-31FD-458B-B714-EFF76A516D36}" type="datetimeFigureOut">
               <a:rPr lang="ko-KR" altLang="en-US" smtClean="0"/>
-              <a:t>2024-05-04</a:t>
+              <a:t>2024-05-07</a:t>
             </a:fld>
             <a:endParaRPr lang="ko-KR" altLang="en-US"/>
           </a:p>
@@ -2916,7 +2916,7 @@
           <a:p>
             <a:fld id="{AAC9601E-31FD-458B-B714-EFF76A516D36}" type="datetimeFigureOut">
               <a:rPr lang="ko-KR" altLang="en-US" smtClean="0"/>
-              <a:t>2024-05-04</a:t>
+              <a:t>2024-05-07</a:t>
             </a:fld>
             <a:endParaRPr lang="ko-KR" altLang="en-US"/>
           </a:p>
@@ -8278,53 +8278,673 @@
           <a:chExt cx="0" cy="0"/>
         </a:xfrm>
       </p:grpSpPr>
-      <p:sp>
-        <p:nvSpPr>
-          <p:cNvPr id="2" name="제목 1">
-            <a:extLst>
-              <a:ext uri="{FF2B5EF4-FFF2-40B4-BE49-F238E27FC236}">
-                <a16:creationId xmlns:a16="http://schemas.microsoft.com/office/drawing/2014/main" id="{F304101F-BC36-120D-6060-FF33674FB1E7}"/>
-              </a:ext>
-            </a:extLst>
-          </p:cNvPr>
-          <p:cNvSpPr>
-            <a:spLocks noGrp="1"/>
-          </p:cNvSpPr>
-          <p:nvPr>
-            <p:ph type="title"/>
-          </p:nvPr>
-        </p:nvSpPr>
-        <p:spPr/>
-        <p:txBody>
-          <a:bodyPr/>
-          <a:lstStyle/>
-          <a:p>
+      <p:pic>
+        <p:nvPicPr>
+          <p:cNvPr id="5" name="그림 4">
+            <a:extLst>
+              <a:ext uri="{FF2B5EF4-FFF2-40B4-BE49-F238E27FC236}">
+                <a16:creationId xmlns:a16="http://schemas.microsoft.com/office/drawing/2014/main" id="{FCE83F24-4F74-DB99-B130-8A6A5BD5B0D4}"/>
+              </a:ext>
+            </a:extLst>
+          </p:cNvPr>
+          <p:cNvPicPr>
+            <a:picLocks noChangeAspect="1"/>
+          </p:cNvPicPr>
+          <p:nvPr/>
+        </p:nvPicPr>
+        <p:blipFill>
+          <a:blip r:embed="rId2">
+            <a:extLst>
+              <a:ext uri="{28A0092B-C50C-407E-A947-70E740481C1C}">
+                <a14:useLocalDpi xmlns:a14="http://schemas.microsoft.com/office/drawing/2010/main" val="0"/>
+              </a:ext>
+            </a:extLst>
+          </a:blip>
+          <a:stretch>
+            <a:fillRect/>
+          </a:stretch>
+        </p:blipFill>
+        <p:spPr>
+          <a:xfrm>
+            <a:off x="103939" y="799733"/>
+            <a:ext cx="11984122" cy="5258534"/>
+          </a:xfrm>
+          <a:prstGeom prst="rect">
+            <a:avLst/>
+          </a:prstGeom>
+          <a:ln>
+            <a:noFill/>
+          </a:ln>
+        </p:spPr>
+      </p:pic>
+      <p:sp>
+        <p:nvSpPr>
+          <p:cNvPr id="18" name="TextBox 17">
+            <a:extLst>
+              <a:ext uri="{FF2B5EF4-FFF2-40B4-BE49-F238E27FC236}">
+                <a16:creationId xmlns:a16="http://schemas.microsoft.com/office/drawing/2014/main" id="{5A64C3EF-7955-D0C5-9CF2-79067638EFB5}"/>
+              </a:ext>
+            </a:extLst>
+          </p:cNvPr>
+          <p:cNvSpPr txBox="1"/>
+          <p:nvPr/>
+        </p:nvSpPr>
+        <p:spPr>
+          <a:xfrm>
+            <a:off x="4175612" y="5585160"/>
+            <a:ext cx="410818" cy="369332"/>
+          </a:xfrm>
+          <a:prstGeom prst="rect">
+            <a:avLst/>
+          </a:prstGeom>
+          <a:noFill/>
+        </p:spPr>
+        <p:txBody>
+          <a:bodyPr wrap="square" rtlCol="0">
+            <a:spAutoFit/>
+          </a:bodyPr>
+          <a:lstStyle/>
+          <a:p>
+            <a:r>
+              <a:rPr lang="en-US" altLang="ko-KR" b="1" dirty="0">
+                <a:solidFill>
+                  <a:srgbClr val="FF0000"/>
+                </a:solidFill>
+              </a:rPr>
+              <a:t>2</a:t>
+            </a:r>
+            <a:endParaRPr lang="ko-KR" altLang="en-US" b="1" dirty="0">
+              <a:solidFill>
+                <a:srgbClr val="FF0000"/>
+              </a:solidFill>
+            </a:endParaRPr>
+          </a:p>
+        </p:txBody>
+      </p:sp>
+      <p:sp>
+        <p:nvSpPr>
+          <p:cNvPr id="20" name="TextBox 19">
+            <a:extLst>
+              <a:ext uri="{FF2B5EF4-FFF2-40B4-BE49-F238E27FC236}">
+                <a16:creationId xmlns:a16="http://schemas.microsoft.com/office/drawing/2014/main" id="{D925D781-00A4-D888-4DFA-F705941E0551}"/>
+              </a:ext>
+            </a:extLst>
+          </p:cNvPr>
+          <p:cNvSpPr txBox="1"/>
+          <p:nvPr/>
+        </p:nvSpPr>
+        <p:spPr>
+          <a:xfrm>
+            <a:off x="1876065" y="4714789"/>
+            <a:ext cx="410818" cy="369332"/>
+          </a:xfrm>
+          <a:prstGeom prst="rect">
+            <a:avLst/>
+          </a:prstGeom>
+          <a:noFill/>
+        </p:spPr>
+        <p:txBody>
+          <a:bodyPr wrap="square" rtlCol="0">
+            <a:spAutoFit/>
+          </a:bodyPr>
+          <a:lstStyle/>
+          <a:p>
+            <a:r>
+              <a:rPr lang="en-US" altLang="ko-KR" b="1" dirty="0">
+                <a:solidFill>
+                  <a:srgbClr val="FF0000"/>
+                </a:solidFill>
+              </a:rPr>
+              <a:t>1</a:t>
+            </a:r>
+            <a:endParaRPr lang="ko-KR" altLang="en-US" b="1" dirty="0">
+              <a:solidFill>
+                <a:srgbClr val="FF0000"/>
+              </a:solidFill>
+            </a:endParaRPr>
+          </a:p>
+        </p:txBody>
+      </p:sp>
+      <p:sp>
+        <p:nvSpPr>
+          <p:cNvPr id="21" name="TextBox 20">
+            <a:extLst>
+              <a:ext uri="{FF2B5EF4-FFF2-40B4-BE49-F238E27FC236}">
+                <a16:creationId xmlns:a16="http://schemas.microsoft.com/office/drawing/2014/main" id="{1E3C706F-2673-3117-6D14-9958C449A026}"/>
+              </a:ext>
+            </a:extLst>
+          </p:cNvPr>
+          <p:cNvSpPr txBox="1"/>
+          <p:nvPr/>
+        </p:nvSpPr>
+        <p:spPr>
+          <a:xfrm>
+            <a:off x="3326587" y="340237"/>
+            <a:ext cx="515805" cy="369332"/>
+          </a:xfrm>
+          <a:prstGeom prst="rect">
+            <a:avLst/>
+          </a:prstGeom>
+          <a:noFill/>
+        </p:spPr>
+        <p:txBody>
+          <a:bodyPr wrap="square" rtlCol="0">
+            <a:spAutoFit/>
+          </a:bodyPr>
+          <a:lstStyle/>
+          <a:p>
+            <a:r>
+              <a:rPr lang="en-US" altLang="ko-KR" b="1" dirty="0">
+                <a:solidFill>
+                  <a:schemeClr val="accent2"/>
+                </a:solidFill>
+              </a:rPr>
+              <a:t>6</a:t>
+            </a:r>
+            <a:endParaRPr lang="ko-KR" altLang="en-US" b="1" dirty="0">
+              <a:solidFill>
+                <a:schemeClr val="accent2"/>
+              </a:solidFill>
+            </a:endParaRPr>
+          </a:p>
+        </p:txBody>
+      </p:sp>
+      <p:sp>
+        <p:nvSpPr>
+          <p:cNvPr id="22" name="TextBox 21">
+            <a:extLst>
+              <a:ext uri="{FF2B5EF4-FFF2-40B4-BE49-F238E27FC236}">
+                <a16:creationId xmlns:a16="http://schemas.microsoft.com/office/drawing/2014/main" id="{9A71F737-682A-534E-466F-C95FEDE6051A}"/>
+              </a:ext>
+            </a:extLst>
+          </p:cNvPr>
+          <p:cNvSpPr txBox="1"/>
+          <p:nvPr/>
+        </p:nvSpPr>
+        <p:spPr>
+          <a:xfrm>
+            <a:off x="1195346" y="1670176"/>
+            <a:ext cx="410818" cy="369332"/>
+          </a:xfrm>
+          <a:prstGeom prst="rect">
+            <a:avLst/>
+          </a:prstGeom>
+          <a:noFill/>
+        </p:spPr>
+        <p:txBody>
+          <a:bodyPr wrap="square" rtlCol="0">
+            <a:spAutoFit/>
+          </a:bodyPr>
+          <a:lstStyle/>
+          <a:p>
+            <a:r>
+              <a:rPr lang="en-US" altLang="ko-KR" b="1" dirty="0">
+                <a:solidFill>
+                  <a:srgbClr val="FF0000"/>
+                </a:solidFill>
+              </a:rPr>
+              <a:t>5</a:t>
+            </a:r>
+            <a:endParaRPr lang="ko-KR" altLang="en-US" b="1" dirty="0">
+              <a:solidFill>
+                <a:srgbClr val="FF0000"/>
+              </a:solidFill>
+            </a:endParaRPr>
+          </a:p>
+        </p:txBody>
+      </p:sp>
+      <p:sp>
+        <p:nvSpPr>
+          <p:cNvPr id="23" name="TextBox 22">
+            <a:extLst>
+              <a:ext uri="{FF2B5EF4-FFF2-40B4-BE49-F238E27FC236}">
+                <a16:creationId xmlns:a16="http://schemas.microsoft.com/office/drawing/2014/main" id="{B3E684D4-7DE3-88D3-60F2-CEFD42E9D201}"/>
+              </a:ext>
+            </a:extLst>
+          </p:cNvPr>
+          <p:cNvSpPr txBox="1"/>
+          <p:nvPr/>
+        </p:nvSpPr>
+        <p:spPr>
+          <a:xfrm>
+            <a:off x="989937" y="2638449"/>
+            <a:ext cx="410818" cy="369332"/>
+          </a:xfrm>
+          <a:prstGeom prst="rect">
+            <a:avLst/>
+          </a:prstGeom>
+          <a:noFill/>
+        </p:spPr>
+        <p:txBody>
+          <a:bodyPr wrap="square" rtlCol="0">
+            <a:spAutoFit/>
+          </a:bodyPr>
+          <a:lstStyle/>
+          <a:p>
+            <a:r>
+              <a:rPr lang="en-US" altLang="ko-KR" b="1" dirty="0">
+                <a:solidFill>
+                  <a:srgbClr val="FF0000"/>
+                </a:solidFill>
+              </a:rPr>
+              <a:t>4</a:t>
+            </a:r>
+            <a:endParaRPr lang="ko-KR" altLang="en-US" b="1" dirty="0">
+              <a:solidFill>
+                <a:srgbClr val="FF0000"/>
+              </a:solidFill>
+            </a:endParaRPr>
+          </a:p>
+        </p:txBody>
+      </p:sp>
+      <p:sp>
+        <p:nvSpPr>
+          <p:cNvPr id="24" name="TextBox 23">
+            <a:extLst>
+              <a:ext uri="{FF2B5EF4-FFF2-40B4-BE49-F238E27FC236}">
+                <a16:creationId xmlns:a16="http://schemas.microsoft.com/office/drawing/2014/main" id="{63B087B8-8F64-40A6-A726-7B06B169E519}"/>
+              </a:ext>
+            </a:extLst>
+          </p:cNvPr>
+          <p:cNvSpPr txBox="1"/>
+          <p:nvPr/>
+        </p:nvSpPr>
+        <p:spPr>
+          <a:xfrm>
+            <a:off x="1195346" y="3526068"/>
+            <a:ext cx="410818" cy="369332"/>
+          </a:xfrm>
+          <a:prstGeom prst="rect">
+            <a:avLst/>
+          </a:prstGeom>
+          <a:noFill/>
+        </p:spPr>
+        <p:txBody>
+          <a:bodyPr wrap="square" rtlCol="0">
+            <a:spAutoFit/>
+          </a:bodyPr>
+          <a:lstStyle/>
+          <a:p>
+            <a:r>
+              <a:rPr lang="en-US" altLang="ko-KR" b="1" dirty="0">
+                <a:solidFill>
+                  <a:srgbClr val="FF0000"/>
+                </a:solidFill>
+              </a:rPr>
+              <a:t>3</a:t>
+            </a:r>
+            <a:endParaRPr lang="ko-KR" altLang="en-US" b="1" dirty="0">
+              <a:solidFill>
+                <a:srgbClr val="FF0000"/>
+              </a:solidFill>
+            </a:endParaRPr>
+          </a:p>
+        </p:txBody>
+      </p:sp>
+      <p:sp>
+        <p:nvSpPr>
+          <p:cNvPr id="25" name="TextBox 24">
+            <a:extLst>
+              <a:ext uri="{FF2B5EF4-FFF2-40B4-BE49-F238E27FC236}">
+                <a16:creationId xmlns:a16="http://schemas.microsoft.com/office/drawing/2014/main" id="{F21A1E77-8BC0-1E1E-6C91-3A895D0A88D2}"/>
+              </a:ext>
+            </a:extLst>
+          </p:cNvPr>
+          <p:cNvSpPr txBox="1"/>
+          <p:nvPr/>
+        </p:nvSpPr>
+        <p:spPr>
+          <a:xfrm>
+            <a:off x="9076710" y="3678696"/>
+            <a:ext cx="410818" cy="369332"/>
+          </a:xfrm>
+          <a:prstGeom prst="rect">
+            <a:avLst/>
+          </a:prstGeom>
+          <a:noFill/>
+        </p:spPr>
+        <p:txBody>
+          <a:bodyPr wrap="square" rtlCol="0">
+            <a:spAutoFit/>
+          </a:bodyPr>
+          <a:lstStyle/>
+          <a:p>
+            <a:r>
+              <a:rPr lang="en-US" altLang="ko-KR" b="1" dirty="0">
+                <a:solidFill>
+                  <a:srgbClr val="00B050"/>
+                </a:solidFill>
+              </a:rPr>
+              <a:t>7</a:t>
+            </a:r>
+            <a:endParaRPr lang="ko-KR" altLang="en-US" b="1" dirty="0">
+              <a:solidFill>
+                <a:srgbClr val="00B050"/>
+              </a:solidFill>
+            </a:endParaRPr>
+          </a:p>
+        </p:txBody>
+      </p:sp>
+      <p:sp>
+        <p:nvSpPr>
+          <p:cNvPr id="28" name="직사각형 27">
+            <a:extLst>
+              <a:ext uri="{FF2B5EF4-FFF2-40B4-BE49-F238E27FC236}">
+                <a16:creationId xmlns:a16="http://schemas.microsoft.com/office/drawing/2014/main" id="{0880ADC3-EACF-2A32-DC31-4C64C9DF7294}"/>
+              </a:ext>
+            </a:extLst>
+          </p:cNvPr>
+          <p:cNvSpPr/>
+          <p:nvPr/>
+        </p:nvSpPr>
+        <p:spPr>
+          <a:xfrm>
+            <a:off x="3309656" y="351825"/>
+            <a:ext cx="7459944" cy="3077175"/>
+          </a:xfrm>
+          <a:prstGeom prst="rect">
+            <a:avLst/>
+          </a:prstGeom>
+          <a:noFill/>
+          <a:ln>
+            <a:solidFill>
+              <a:schemeClr val="accent2"/>
+            </a:solidFill>
+          </a:ln>
+          <a:effectLst>
+            <a:outerShdw blurRad="50800" dist="38100" dir="2700000" algn="tl" rotWithShape="0">
+              <a:prstClr val="black">
+                <a:alpha val="40000"/>
+              </a:prstClr>
+            </a:outerShdw>
+          </a:effectLst>
+        </p:spPr>
+        <p:style>
+          <a:lnRef idx="2">
+            <a:schemeClr val="accent1">
+              <a:shade val="15000"/>
+            </a:schemeClr>
+          </a:lnRef>
+          <a:fillRef idx="1">
+            <a:schemeClr val="accent1"/>
+          </a:fillRef>
+          <a:effectRef idx="0">
+            <a:schemeClr val="accent1"/>
+          </a:effectRef>
+          <a:fontRef idx="minor">
+            <a:schemeClr val="lt1"/>
+          </a:fontRef>
+        </p:style>
+        <p:txBody>
+          <a:bodyPr rtlCol="0" anchor="ctr"/>
+          <a:lstStyle/>
+          <a:p>
+            <a:pPr algn="ctr"/>
             <a:endParaRPr lang="ko-KR" altLang="en-US"/>
           </a:p>
         </p:txBody>
       </p:sp>
       <p:sp>
         <p:nvSpPr>
-          <p:cNvPr id="3" name="내용 개체 틀 2">
-            <a:extLst>
-              <a:ext uri="{FF2B5EF4-FFF2-40B4-BE49-F238E27FC236}">
-                <a16:creationId xmlns:a16="http://schemas.microsoft.com/office/drawing/2014/main" id="{FE810312-BE88-401B-C378-0AC5D8345556}"/>
-              </a:ext>
-            </a:extLst>
-          </p:cNvPr>
-          <p:cNvSpPr>
-            <a:spLocks noGrp="1"/>
-          </p:cNvSpPr>
-          <p:nvPr>
-            <p:ph idx="1"/>
-          </p:nvPr>
-        </p:nvSpPr>
-        <p:spPr/>
-        <p:txBody>
-          <a:bodyPr/>
-          <a:lstStyle/>
-          <a:p>
-            <a:endParaRPr lang="ko-KR" altLang="en-US"/>
+          <p:cNvPr id="29" name="TextBox 28">
+            <a:extLst>
+              <a:ext uri="{FF2B5EF4-FFF2-40B4-BE49-F238E27FC236}">
+                <a16:creationId xmlns:a16="http://schemas.microsoft.com/office/drawing/2014/main" id="{36A279FA-41AD-6310-B98C-BD5D4B44CE53}"/>
+              </a:ext>
+            </a:extLst>
+          </p:cNvPr>
+          <p:cNvSpPr txBox="1"/>
+          <p:nvPr/>
+        </p:nvSpPr>
+        <p:spPr>
+          <a:xfrm>
+            <a:off x="6010631" y="1449065"/>
+            <a:ext cx="743458" cy="307777"/>
+          </a:xfrm>
+          <a:prstGeom prst="rect">
+            <a:avLst/>
+          </a:prstGeom>
+          <a:noFill/>
+        </p:spPr>
+        <p:txBody>
+          <a:bodyPr wrap="square" rtlCol="0">
+            <a:spAutoFit/>
+          </a:bodyPr>
+          <a:lstStyle/>
+          <a:p>
+            <a:r>
+              <a:rPr lang="en-US" altLang="ko-KR" sz="1400" b="1" dirty="0">
+                <a:solidFill>
+                  <a:schemeClr val="accent2"/>
+                </a:solidFill>
+              </a:rPr>
+              <a:t>6.5</a:t>
+            </a:r>
+            <a:endParaRPr lang="ko-KR" altLang="en-US" sz="1400" b="1" dirty="0">
+              <a:solidFill>
+                <a:schemeClr val="accent2"/>
+              </a:solidFill>
+            </a:endParaRPr>
+          </a:p>
+        </p:txBody>
+      </p:sp>
+      <p:sp>
+        <p:nvSpPr>
+          <p:cNvPr id="30" name="TextBox 29">
+            <a:extLst>
+              <a:ext uri="{FF2B5EF4-FFF2-40B4-BE49-F238E27FC236}">
+                <a16:creationId xmlns:a16="http://schemas.microsoft.com/office/drawing/2014/main" id="{8D75E77D-A453-4030-D8D0-A0A27AB055E0}"/>
+              </a:ext>
+            </a:extLst>
+          </p:cNvPr>
+          <p:cNvSpPr txBox="1"/>
+          <p:nvPr/>
+        </p:nvSpPr>
+        <p:spPr>
+          <a:xfrm>
+            <a:off x="3963436" y="1700953"/>
+            <a:ext cx="743458" cy="307777"/>
+          </a:xfrm>
+          <a:prstGeom prst="rect">
+            <a:avLst/>
+          </a:prstGeom>
+          <a:noFill/>
+        </p:spPr>
+        <p:txBody>
+          <a:bodyPr wrap="square" rtlCol="0">
+            <a:spAutoFit/>
+          </a:bodyPr>
+          <a:lstStyle/>
+          <a:p>
+            <a:r>
+              <a:rPr lang="en-US" altLang="ko-KR" sz="1400" b="1" dirty="0">
+                <a:solidFill>
+                  <a:schemeClr val="accent2"/>
+                </a:solidFill>
+              </a:rPr>
+              <a:t>6.2</a:t>
+            </a:r>
+            <a:endParaRPr lang="ko-KR" altLang="en-US" sz="1400" b="1" dirty="0">
+              <a:solidFill>
+                <a:schemeClr val="accent2"/>
+              </a:solidFill>
+            </a:endParaRPr>
+          </a:p>
+        </p:txBody>
+      </p:sp>
+      <p:sp>
+        <p:nvSpPr>
+          <p:cNvPr id="31" name="TextBox 30">
+            <a:extLst>
+              <a:ext uri="{FF2B5EF4-FFF2-40B4-BE49-F238E27FC236}">
+                <a16:creationId xmlns:a16="http://schemas.microsoft.com/office/drawing/2014/main" id="{51649500-5859-39DE-2945-B0D34CD7790F}"/>
+              </a:ext>
+            </a:extLst>
+          </p:cNvPr>
+          <p:cNvSpPr txBox="1"/>
+          <p:nvPr/>
+        </p:nvSpPr>
+        <p:spPr>
+          <a:xfrm>
+            <a:off x="4202704" y="3073811"/>
+            <a:ext cx="743458" cy="307777"/>
+          </a:xfrm>
+          <a:prstGeom prst="rect">
+            <a:avLst/>
+          </a:prstGeom>
+          <a:noFill/>
+        </p:spPr>
+        <p:txBody>
+          <a:bodyPr wrap="square" rtlCol="0">
+            <a:spAutoFit/>
+          </a:bodyPr>
+          <a:lstStyle/>
+          <a:p>
+            <a:r>
+              <a:rPr lang="en-US" altLang="ko-KR" sz="1400" b="1" dirty="0">
+                <a:solidFill>
+                  <a:schemeClr val="accent2"/>
+                </a:solidFill>
+              </a:rPr>
+              <a:t>6.1</a:t>
+            </a:r>
+            <a:endParaRPr lang="ko-KR" altLang="en-US" sz="1400" b="1" dirty="0">
+              <a:solidFill>
+                <a:schemeClr val="accent2"/>
+              </a:solidFill>
+            </a:endParaRPr>
+          </a:p>
+        </p:txBody>
+      </p:sp>
+      <p:sp>
+        <p:nvSpPr>
+          <p:cNvPr id="32" name="TextBox 31">
+            <a:extLst>
+              <a:ext uri="{FF2B5EF4-FFF2-40B4-BE49-F238E27FC236}">
+                <a16:creationId xmlns:a16="http://schemas.microsoft.com/office/drawing/2014/main" id="{F03F607D-7F30-2502-5531-E7E9ABADE14E}"/>
+              </a:ext>
+            </a:extLst>
+          </p:cNvPr>
+          <p:cNvSpPr txBox="1"/>
+          <p:nvPr/>
+        </p:nvSpPr>
+        <p:spPr>
+          <a:xfrm>
+            <a:off x="7475981" y="2420219"/>
+            <a:ext cx="743458" cy="307777"/>
+          </a:xfrm>
+          <a:prstGeom prst="rect">
+            <a:avLst/>
+          </a:prstGeom>
+          <a:noFill/>
+        </p:spPr>
+        <p:txBody>
+          <a:bodyPr wrap="square" rtlCol="0">
+            <a:spAutoFit/>
+          </a:bodyPr>
+          <a:lstStyle/>
+          <a:p>
+            <a:r>
+              <a:rPr lang="en-US" altLang="ko-KR" sz="1400" b="1" dirty="0">
+                <a:solidFill>
+                  <a:schemeClr val="accent2"/>
+                </a:solidFill>
+              </a:rPr>
+              <a:t>6.4</a:t>
+            </a:r>
+            <a:endParaRPr lang="ko-KR" altLang="en-US" sz="1400" b="1" dirty="0">
+              <a:solidFill>
+                <a:schemeClr val="accent2"/>
+              </a:solidFill>
+            </a:endParaRPr>
+          </a:p>
+        </p:txBody>
+      </p:sp>
+      <p:sp>
+        <p:nvSpPr>
+          <p:cNvPr id="33" name="TextBox 32">
+            <a:extLst>
+              <a:ext uri="{FF2B5EF4-FFF2-40B4-BE49-F238E27FC236}">
+                <a16:creationId xmlns:a16="http://schemas.microsoft.com/office/drawing/2014/main" id="{30415E38-AB1D-B892-09DC-E89AED415FB1}"/>
+              </a:ext>
+            </a:extLst>
+          </p:cNvPr>
+          <p:cNvSpPr txBox="1"/>
+          <p:nvPr/>
+        </p:nvSpPr>
+        <p:spPr>
+          <a:xfrm>
+            <a:off x="8793392" y="1750070"/>
+            <a:ext cx="743458" cy="307777"/>
+          </a:xfrm>
+          <a:prstGeom prst="rect">
+            <a:avLst/>
+          </a:prstGeom>
+          <a:noFill/>
+        </p:spPr>
+        <p:txBody>
+          <a:bodyPr wrap="square" rtlCol="0">
+            <a:spAutoFit/>
+          </a:bodyPr>
+          <a:lstStyle/>
+          <a:p>
+            <a:r>
+              <a:rPr lang="en-US" altLang="ko-KR" sz="1400" b="1" dirty="0">
+                <a:solidFill>
+                  <a:schemeClr val="accent2"/>
+                </a:solidFill>
+              </a:rPr>
+              <a:t>6.3</a:t>
+            </a:r>
+            <a:endParaRPr lang="ko-KR" altLang="en-US" sz="1400" b="1" dirty="0">
+              <a:solidFill>
+                <a:schemeClr val="accent2"/>
+              </a:solidFill>
+            </a:endParaRPr>
+          </a:p>
+        </p:txBody>
+      </p:sp>
+      <p:sp>
+        <p:nvSpPr>
+          <p:cNvPr id="36" name="TextBox 35">
+            <a:extLst>
+              <a:ext uri="{FF2B5EF4-FFF2-40B4-BE49-F238E27FC236}">
+                <a16:creationId xmlns:a16="http://schemas.microsoft.com/office/drawing/2014/main" id="{2D082E9D-94F8-E1B4-182E-1A43CD9596DF}"/>
+              </a:ext>
+            </a:extLst>
+          </p:cNvPr>
+          <p:cNvSpPr txBox="1"/>
+          <p:nvPr/>
+        </p:nvSpPr>
+        <p:spPr>
+          <a:xfrm>
+            <a:off x="6709868" y="4413712"/>
+            <a:ext cx="410818" cy="369332"/>
+          </a:xfrm>
+          <a:prstGeom prst="rect">
+            <a:avLst/>
+          </a:prstGeom>
+          <a:noFill/>
+        </p:spPr>
+        <p:txBody>
+          <a:bodyPr wrap="square" rtlCol="0">
+            <a:spAutoFit/>
+          </a:bodyPr>
+          <a:lstStyle/>
+          <a:p>
+            <a:r>
+              <a:rPr lang="en-US" altLang="ko-KR" b="1" dirty="0">
+                <a:solidFill>
+                  <a:schemeClr val="accent1"/>
+                </a:solidFill>
+              </a:rPr>
+              <a:t>8</a:t>
+            </a:r>
+            <a:endParaRPr lang="ko-KR" altLang="en-US" b="1" dirty="0">
+              <a:solidFill>
+                <a:schemeClr val="accent1"/>
+              </a:solidFill>
+            </a:endParaRPr>
           </a:p>
         </p:txBody>
       </p:sp>

</xml_diff>

<commit_message>
Post 추가 DDPG(Deep Deterministic Policy Gradient) 구현
</commit_message>
<xml_diff>
--- a/_site/assets/docu/genserver.pptx
+++ b/_site/assets/docu/genserver.pptx
@@ -13,6 +13,8 @@
     <p:sldId id="261" r:id="rId7"/>
     <p:sldId id="262" r:id="rId8"/>
     <p:sldId id="263" r:id="rId9"/>
+    <p:sldId id="264" r:id="rId10"/>
+    <p:sldId id="265" r:id="rId11"/>
   </p:sldIdLst>
   <p:sldSz cx="12192000" cy="6858000"/>
   <p:notesSz cx="6858000" cy="9144000"/>
@@ -266,7 +268,7 @@
           <a:p>
             <a:fld id="{AAC9601E-31FD-458B-B714-EFF76A516D36}" type="datetimeFigureOut">
               <a:rPr lang="ko-KR" altLang="en-US" smtClean="0"/>
-              <a:t>2024-05-07</a:t>
+              <a:t>2024-05-08</a:t>
             </a:fld>
             <a:endParaRPr lang="ko-KR" altLang="en-US"/>
           </a:p>
@@ -464,7 +466,7 @@
           <a:p>
             <a:fld id="{AAC9601E-31FD-458B-B714-EFF76A516D36}" type="datetimeFigureOut">
               <a:rPr lang="ko-KR" altLang="en-US" smtClean="0"/>
-              <a:t>2024-05-07</a:t>
+              <a:t>2024-05-08</a:t>
             </a:fld>
             <a:endParaRPr lang="ko-KR" altLang="en-US"/>
           </a:p>
@@ -672,7 +674,7 @@
           <a:p>
             <a:fld id="{AAC9601E-31FD-458B-B714-EFF76A516D36}" type="datetimeFigureOut">
               <a:rPr lang="ko-KR" altLang="en-US" smtClean="0"/>
-              <a:t>2024-05-07</a:t>
+              <a:t>2024-05-08</a:t>
             </a:fld>
             <a:endParaRPr lang="ko-KR" altLang="en-US"/>
           </a:p>
@@ -870,7 +872,7 @@
           <a:p>
             <a:fld id="{AAC9601E-31FD-458B-B714-EFF76A516D36}" type="datetimeFigureOut">
               <a:rPr lang="ko-KR" altLang="en-US" smtClean="0"/>
-              <a:t>2024-05-07</a:t>
+              <a:t>2024-05-08</a:t>
             </a:fld>
             <a:endParaRPr lang="ko-KR" altLang="en-US"/>
           </a:p>
@@ -1145,7 +1147,7 @@
           <a:p>
             <a:fld id="{AAC9601E-31FD-458B-B714-EFF76A516D36}" type="datetimeFigureOut">
               <a:rPr lang="ko-KR" altLang="en-US" smtClean="0"/>
-              <a:t>2024-05-07</a:t>
+              <a:t>2024-05-08</a:t>
             </a:fld>
             <a:endParaRPr lang="ko-KR" altLang="en-US"/>
           </a:p>
@@ -1410,7 +1412,7 @@
           <a:p>
             <a:fld id="{AAC9601E-31FD-458B-B714-EFF76A516D36}" type="datetimeFigureOut">
               <a:rPr lang="ko-KR" altLang="en-US" smtClean="0"/>
-              <a:t>2024-05-07</a:t>
+              <a:t>2024-05-08</a:t>
             </a:fld>
             <a:endParaRPr lang="ko-KR" altLang="en-US"/>
           </a:p>
@@ -1822,7 +1824,7 @@
           <a:p>
             <a:fld id="{AAC9601E-31FD-458B-B714-EFF76A516D36}" type="datetimeFigureOut">
               <a:rPr lang="ko-KR" altLang="en-US" smtClean="0"/>
-              <a:t>2024-05-07</a:t>
+              <a:t>2024-05-08</a:t>
             </a:fld>
             <a:endParaRPr lang="ko-KR" altLang="en-US"/>
           </a:p>
@@ -1963,7 +1965,7 @@
           <a:p>
             <a:fld id="{AAC9601E-31FD-458B-B714-EFF76A516D36}" type="datetimeFigureOut">
               <a:rPr lang="ko-KR" altLang="en-US" smtClean="0"/>
-              <a:t>2024-05-07</a:t>
+              <a:t>2024-05-08</a:t>
             </a:fld>
             <a:endParaRPr lang="ko-KR" altLang="en-US"/>
           </a:p>
@@ -2076,7 +2078,7 @@
           <a:p>
             <a:fld id="{AAC9601E-31FD-458B-B714-EFF76A516D36}" type="datetimeFigureOut">
               <a:rPr lang="ko-KR" altLang="en-US" smtClean="0"/>
-              <a:t>2024-05-07</a:t>
+              <a:t>2024-05-08</a:t>
             </a:fld>
             <a:endParaRPr lang="ko-KR" altLang="en-US"/>
           </a:p>
@@ -2387,7 +2389,7 @@
           <a:p>
             <a:fld id="{AAC9601E-31FD-458B-B714-EFF76A516D36}" type="datetimeFigureOut">
               <a:rPr lang="ko-KR" altLang="en-US" smtClean="0"/>
-              <a:t>2024-05-07</a:t>
+              <a:t>2024-05-08</a:t>
             </a:fld>
             <a:endParaRPr lang="ko-KR" altLang="en-US"/>
           </a:p>
@@ -2675,7 +2677,7 @@
           <a:p>
             <a:fld id="{AAC9601E-31FD-458B-B714-EFF76A516D36}" type="datetimeFigureOut">
               <a:rPr lang="ko-KR" altLang="en-US" smtClean="0"/>
-              <a:t>2024-05-07</a:t>
+              <a:t>2024-05-08</a:t>
             </a:fld>
             <a:endParaRPr lang="ko-KR" altLang="en-US"/>
           </a:p>
@@ -2916,7 +2918,7 @@
           <a:p>
             <a:fld id="{AAC9601E-31FD-458B-B714-EFF76A516D36}" type="datetimeFigureOut">
               <a:rPr lang="ko-KR" altLang="en-US" smtClean="0"/>
-              <a:t>2024-05-07</a:t>
+              <a:t>2024-05-08</a:t>
             </a:fld>
             <a:endParaRPr lang="ko-KR" altLang="en-US"/>
           </a:p>
@@ -4384,6 +4386,1439 @@
 </p:sld>
 </file>
 
+<file path=ppt/slides/slide10.xml><?xml version="1.0" encoding="utf-8"?>
+<p:sld xmlns:a="http://schemas.openxmlformats.org/drawingml/2006/main" xmlns:r="http://schemas.openxmlformats.org/officeDocument/2006/relationships" xmlns:p="http://schemas.openxmlformats.org/presentationml/2006/main">
+  <p:cSld>
+    <p:spTree>
+      <p:nvGrpSpPr>
+        <p:cNvPr id="1" name=""/>
+        <p:cNvGrpSpPr/>
+        <p:nvPr/>
+      </p:nvGrpSpPr>
+      <p:grpSpPr>
+        <a:xfrm>
+          <a:off x="0" y="0"/>
+          <a:ext cx="0" cy="0"/>
+          <a:chOff x="0" y="0"/>
+          <a:chExt cx="0" cy="0"/>
+        </a:xfrm>
+      </p:grpSpPr>
+      <p:pic>
+        <p:nvPicPr>
+          <p:cNvPr id="4" name="그림 3">
+            <a:extLst>
+              <a:ext uri="{FF2B5EF4-FFF2-40B4-BE49-F238E27FC236}">
+                <a16:creationId xmlns:a16="http://schemas.microsoft.com/office/drawing/2014/main" id="{79D9A381-609D-E90C-1B26-E775CD6D4244}"/>
+              </a:ext>
+            </a:extLst>
+          </p:cNvPr>
+          <p:cNvPicPr>
+            <a:picLocks noChangeAspect="1"/>
+          </p:cNvPicPr>
+          <p:nvPr/>
+        </p:nvPicPr>
+        <p:blipFill>
+          <a:blip r:embed="rId2">
+            <a:extLst>
+              <a:ext uri="{28A0092B-C50C-407E-A947-70E740481C1C}">
+                <a14:useLocalDpi xmlns:a14="http://schemas.microsoft.com/office/drawing/2010/main" val="0"/>
+              </a:ext>
+            </a:extLst>
+          </a:blip>
+          <a:stretch>
+            <a:fillRect/>
+          </a:stretch>
+        </p:blipFill>
+        <p:spPr>
+          <a:xfrm>
+            <a:off x="143450" y="1008579"/>
+            <a:ext cx="11984122" cy="5258534"/>
+          </a:xfrm>
+          <a:prstGeom prst="rect">
+            <a:avLst/>
+          </a:prstGeom>
+          <a:ln>
+            <a:noFill/>
+          </a:ln>
+        </p:spPr>
+      </p:pic>
+      <p:grpSp>
+        <p:nvGrpSpPr>
+          <p:cNvPr id="8" name="그룹 7">
+            <a:extLst>
+              <a:ext uri="{FF2B5EF4-FFF2-40B4-BE49-F238E27FC236}">
+                <a16:creationId xmlns:a16="http://schemas.microsoft.com/office/drawing/2014/main" id="{838DDD8F-8313-C307-5D1B-C79EF7FB0526}"/>
+              </a:ext>
+            </a:extLst>
+          </p:cNvPr>
+          <p:cNvGrpSpPr/>
+          <p:nvPr/>
+        </p:nvGrpSpPr>
+        <p:grpSpPr>
+          <a:xfrm>
+            <a:off x="1246161" y="4605929"/>
+            <a:ext cx="1081770" cy="342304"/>
+            <a:chOff x="4072363" y="344386"/>
+            <a:chExt cx="1081770" cy="342304"/>
+          </a:xfrm>
+        </p:grpSpPr>
+        <p:cxnSp>
+          <p:nvCxnSpPr>
+            <p:cNvPr id="9" name="직선 화살표 연결선 8">
+              <a:extLst>
+                <a:ext uri="{FF2B5EF4-FFF2-40B4-BE49-F238E27FC236}">
+                  <a16:creationId xmlns:a16="http://schemas.microsoft.com/office/drawing/2014/main" id="{54F3AA37-4584-3631-79B5-9C63EE03384A}"/>
+                </a:ext>
+              </a:extLst>
+            </p:cNvPr>
+            <p:cNvCxnSpPr>
+              <a:cxnSpLocks/>
+            </p:cNvCxnSpPr>
+            <p:nvPr/>
+          </p:nvCxnSpPr>
+          <p:spPr>
+            <a:xfrm>
+              <a:off x="4586109" y="686690"/>
+              <a:ext cx="568024" cy="0"/>
+            </a:xfrm>
+            <a:prstGeom prst="straightConnector1">
+              <a:avLst/>
+            </a:prstGeom>
+            <a:ln w="12700">
+              <a:solidFill>
+                <a:srgbClr val="FF0000"/>
+              </a:solidFill>
+              <a:tailEnd type="triangle"/>
+            </a:ln>
+          </p:spPr>
+          <p:style>
+            <a:lnRef idx="1">
+              <a:schemeClr val="accent2"/>
+            </a:lnRef>
+            <a:fillRef idx="0">
+              <a:schemeClr val="accent2"/>
+            </a:fillRef>
+            <a:effectRef idx="0">
+              <a:schemeClr val="accent2"/>
+            </a:effectRef>
+            <a:fontRef idx="minor">
+              <a:schemeClr val="tx1"/>
+            </a:fontRef>
+          </p:style>
+        </p:cxnSp>
+        <p:sp>
+          <p:nvSpPr>
+            <p:cNvPr id="10" name="TextBox 9">
+              <a:extLst>
+                <a:ext uri="{FF2B5EF4-FFF2-40B4-BE49-F238E27FC236}">
+                  <a16:creationId xmlns:a16="http://schemas.microsoft.com/office/drawing/2014/main" id="{11ADE25A-D16F-C340-F39C-5F3F2E746A57}"/>
+                </a:ext>
+              </a:extLst>
+            </p:cNvPr>
+            <p:cNvSpPr txBox="1"/>
+            <p:nvPr/>
+          </p:nvSpPr>
+          <p:spPr>
+            <a:xfrm>
+              <a:off x="4072363" y="344386"/>
+              <a:ext cx="650674" cy="307777"/>
+            </a:xfrm>
+            <a:prstGeom prst="rect">
+              <a:avLst/>
+            </a:prstGeom>
+            <a:noFill/>
+          </p:spPr>
+          <p:txBody>
+            <a:bodyPr wrap="square" rtlCol="0">
+              <a:spAutoFit/>
+            </a:bodyPr>
+            <a:lstStyle/>
+            <a:p>
+              <a:r>
+                <a:rPr lang="en-US" altLang="ko-KR" sz="1400" b="1" dirty="0">
+                  <a:solidFill>
+                    <a:srgbClr val="FF0000"/>
+                  </a:solidFill>
+                </a:rPr>
+                <a:t>(1) (5)</a:t>
+              </a:r>
+              <a:endParaRPr lang="ko-KR" altLang="en-US" sz="1400" b="1" dirty="0">
+                <a:solidFill>
+                  <a:srgbClr val="FF0000"/>
+                </a:solidFill>
+              </a:endParaRPr>
+            </a:p>
+          </p:txBody>
+        </p:sp>
+      </p:grpSp>
+      <p:grpSp>
+        <p:nvGrpSpPr>
+          <p:cNvPr id="11" name="그룹 10">
+            <a:extLst>
+              <a:ext uri="{FF2B5EF4-FFF2-40B4-BE49-F238E27FC236}">
+                <a16:creationId xmlns:a16="http://schemas.microsoft.com/office/drawing/2014/main" id="{6E4A2C45-ACCB-976D-90D0-EF95D2C0429C}"/>
+              </a:ext>
+            </a:extLst>
+          </p:cNvPr>
+          <p:cNvGrpSpPr/>
+          <p:nvPr/>
+        </p:nvGrpSpPr>
+        <p:grpSpPr>
+          <a:xfrm>
+            <a:off x="3924327" y="5026490"/>
+            <a:ext cx="2038815" cy="307777"/>
+            <a:chOff x="3978163" y="339274"/>
+            <a:chExt cx="2038815" cy="307777"/>
+          </a:xfrm>
+        </p:grpSpPr>
+        <p:cxnSp>
+          <p:nvCxnSpPr>
+            <p:cNvPr id="12" name="직선 화살표 연결선 11">
+              <a:extLst>
+                <a:ext uri="{FF2B5EF4-FFF2-40B4-BE49-F238E27FC236}">
+                  <a16:creationId xmlns:a16="http://schemas.microsoft.com/office/drawing/2014/main" id="{1AB6EC3B-A42A-5170-BE06-A21A30345F60}"/>
+                </a:ext>
+              </a:extLst>
+            </p:cNvPr>
+            <p:cNvCxnSpPr>
+              <a:cxnSpLocks/>
+              <a:stCxn id="13" idx="3"/>
+            </p:cNvCxnSpPr>
+            <p:nvPr/>
+          </p:nvCxnSpPr>
+          <p:spPr>
+            <a:xfrm flipV="1">
+              <a:off x="4418430" y="491067"/>
+              <a:ext cx="1598548" cy="2096"/>
+            </a:xfrm>
+            <a:prstGeom prst="straightConnector1">
+              <a:avLst/>
+            </a:prstGeom>
+            <a:ln w="12700">
+              <a:solidFill>
+                <a:srgbClr val="FF0000"/>
+              </a:solidFill>
+              <a:tailEnd type="triangle"/>
+            </a:ln>
+          </p:spPr>
+          <p:style>
+            <a:lnRef idx="1">
+              <a:schemeClr val="accent2"/>
+            </a:lnRef>
+            <a:fillRef idx="0">
+              <a:schemeClr val="accent2"/>
+            </a:fillRef>
+            <a:effectRef idx="0">
+              <a:schemeClr val="accent2"/>
+            </a:effectRef>
+            <a:fontRef idx="minor">
+              <a:schemeClr val="tx1"/>
+            </a:fontRef>
+          </p:style>
+        </p:cxnSp>
+        <p:sp>
+          <p:nvSpPr>
+            <p:cNvPr id="13" name="TextBox 12">
+              <a:extLst>
+                <a:ext uri="{FF2B5EF4-FFF2-40B4-BE49-F238E27FC236}">
+                  <a16:creationId xmlns:a16="http://schemas.microsoft.com/office/drawing/2014/main" id="{275DE69F-C11D-C7A9-B45D-12019654683B}"/>
+                </a:ext>
+              </a:extLst>
+            </p:cNvPr>
+            <p:cNvSpPr txBox="1"/>
+            <p:nvPr/>
+          </p:nvSpPr>
+          <p:spPr>
+            <a:xfrm>
+              <a:off x="3978163" y="339274"/>
+              <a:ext cx="440267" cy="307777"/>
+            </a:xfrm>
+            <a:prstGeom prst="rect">
+              <a:avLst/>
+            </a:prstGeom>
+            <a:noFill/>
+          </p:spPr>
+          <p:txBody>
+            <a:bodyPr wrap="square" rtlCol="0">
+              <a:spAutoFit/>
+            </a:bodyPr>
+            <a:lstStyle/>
+            <a:p>
+              <a:r>
+                <a:rPr lang="en-US" altLang="ko-KR" sz="1400" b="1" dirty="0">
+                  <a:solidFill>
+                    <a:srgbClr val="FF0000"/>
+                  </a:solidFill>
+                </a:rPr>
+                <a:t>(2)</a:t>
+              </a:r>
+              <a:endParaRPr lang="ko-KR" altLang="en-US" sz="1400" b="1" dirty="0">
+                <a:solidFill>
+                  <a:srgbClr val="FF0000"/>
+                </a:solidFill>
+              </a:endParaRPr>
+            </a:p>
+          </p:txBody>
+        </p:sp>
+      </p:grpSp>
+      <p:grpSp>
+        <p:nvGrpSpPr>
+          <p:cNvPr id="14" name="그룹 13">
+            <a:extLst>
+              <a:ext uri="{FF2B5EF4-FFF2-40B4-BE49-F238E27FC236}">
+                <a16:creationId xmlns:a16="http://schemas.microsoft.com/office/drawing/2014/main" id="{F87A45B5-5EA4-04C2-80A7-E3891E3D4A67}"/>
+              </a:ext>
+            </a:extLst>
+          </p:cNvPr>
+          <p:cNvGrpSpPr/>
+          <p:nvPr/>
+        </p:nvGrpSpPr>
+        <p:grpSpPr>
+          <a:xfrm>
+            <a:off x="3267585" y="5695532"/>
+            <a:ext cx="582791" cy="307777"/>
+            <a:chOff x="3776545" y="576258"/>
+            <a:chExt cx="582791" cy="307777"/>
+          </a:xfrm>
+        </p:grpSpPr>
+        <p:cxnSp>
+          <p:nvCxnSpPr>
+            <p:cNvPr id="15" name="직선 화살표 연결선 14">
+              <a:extLst>
+                <a:ext uri="{FF2B5EF4-FFF2-40B4-BE49-F238E27FC236}">
+                  <a16:creationId xmlns:a16="http://schemas.microsoft.com/office/drawing/2014/main" id="{05C5D21A-0587-568A-7E15-84FCC46CEB08}"/>
+                </a:ext>
+              </a:extLst>
+            </p:cNvPr>
+            <p:cNvCxnSpPr>
+              <a:cxnSpLocks/>
+            </p:cNvCxnSpPr>
+            <p:nvPr/>
+          </p:nvCxnSpPr>
+          <p:spPr>
+            <a:xfrm flipH="1">
+              <a:off x="3776545" y="644955"/>
+              <a:ext cx="496299" cy="0"/>
+            </a:xfrm>
+            <a:prstGeom prst="straightConnector1">
+              <a:avLst/>
+            </a:prstGeom>
+            <a:ln w="12700">
+              <a:solidFill>
+                <a:srgbClr val="FF0000"/>
+              </a:solidFill>
+              <a:tailEnd type="triangle"/>
+            </a:ln>
+          </p:spPr>
+          <p:style>
+            <a:lnRef idx="1">
+              <a:schemeClr val="accent2"/>
+            </a:lnRef>
+            <a:fillRef idx="0">
+              <a:schemeClr val="accent2"/>
+            </a:fillRef>
+            <a:effectRef idx="0">
+              <a:schemeClr val="accent2"/>
+            </a:effectRef>
+            <a:fontRef idx="minor">
+              <a:schemeClr val="tx1"/>
+            </a:fontRef>
+          </p:style>
+        </p:cxnSp>
+        <p:sp>
+          <p:nvSpPr>
+            <p:cNvPr id="16" name="TextBox 15">
+              <a:extLst>
+                <a:ext uri="{FF2B5EF4-FFF2-40B4-BE49-F238E27FC236}">
+                  <a16:creationId xmlns:a16="http://schemas.microsoft.com/office/drawing/2014/main" id="{801F3D39-5012-6817-B759-EEBE06EEA2AB}"/>
+                </a:ext>
+              </a:extLst>
+            </p:cNvPr>
+            <p:cNvSpPr txBox="1"/>
+            <p:nvPr/>
+          </p:nvSpPr>
+          <p:spPr>
+            <a:xfrm>
+              <a:off x="3919069" y="576258"/>
+              <a:ext cx="440267" cy="307777"/>
+            </a:xfrm>
+            <a:prstGeom prst="rect">
+              <a:avLst/>
+            </a:prstGeom>
+            <a:noFill/>
+          </p:spPr>
+          <p:txBody>
+            <a:bodyPr wrap="square" rtlCol="0">
+              <a:spAutoFit/>
+            </a:bodyPr>
+            <a:lstStyle/>
+            <a:p>
+              <a:r>
+                <a:rPr lang="en-US" altLang="ko-KR" sz="1400" b="1" dirty="0">
+                  <a:solidFill>
+                    <a:srgbClr val="FF0000"/>
+                  </a:solidFill>
+                </a:rPr>
+                <a:t>(2)</a:t>
+              </a:r>
+              <a:endParaRPr lang="ko-KR" altLang="en-US" sz="1400" b="1" dirty="0">
+                <a:solidFill>
+                  <a:srgbClr val="FF0000"/>
+                </a:solidFill>
+              </a:endParaRPr>
+            </a:p>
+          </p:txBody>
+        </p:sp>
+      </p:grpSp>
+      <p:grpSp>
+        <p:nvGrpSpPr>
+          <p:cNvPr id="18" name="그룹 17">
+            <a:extLst>
+              <a:ext uri="{FF2B5EF4-FFF2-40B4-BE49-F238E27FC236}">
+                <a16:creationId xmlns:a16="http://schemas.microsoft.com/office/drawing/2014/main" id="{4A0B0F2D-008C-69EB-DB52-E244F1D57A3A}"/>
+              </a:ext>
+            </a:extLst>
+          </p:cNvPr>
+          <p:cNvGrpSpPr/>
+          <p:nvPr/>
+        </p:nvGrpSpPr>
+        <p:grpSpPr>
+          <a:xfrm>
+            <a:off x="1775697" y="5272520"/>
+            <a:ext cx="792174" cy="326898"/>
+            <a:chOff x="3776545" y="644955"/>
+            <a:chExt cx="792174" cy="326898"/>
+          </a:xfrm>
+        </p:grpSpPr>
+        <p:cxnSp>
+          <p:nvCxnSpPr>
+            <p:cNvPr id="19" name="직선 화살표 연결선 18">
+              <a:extLst>
+                <a:ext uri="{FF2B5EF4-FFF2-40B4-BE49-F238E27FC236}">
+                  <a16:creationId xmlns:a16="http://schemas.microsoft.com/office/drawing/2014/main" id="{D1104CD0-12FC-2C46-A788-6779A363CBE4}"/>
+                </a:ext>
+              </a:extLst>
+            </p:cNvPr>
+            <p:cNvCxnSpPr>
+              <a:cxnSpLocks/>
+            </p:cNvCxnSpPr>
+            <p:nvPr/>
+          </p:nvCxnSpPr>
+          <p:spPr>
+            <a:xfrm flipH="1">
+              <a:off x="3776545" y="644955"/>
+              <a:ext cx="496299" cy="0"/>
+            </a:xfrm>
+            <a:prstGeom prst="straightConnector1">
+              <a:avLst/>
+            </a:prstGeom>
+            <a:ln w="12700">
+              <a:solidFill>
+                <a:srgbClr val="FF0000"/>
+              </a:solidFill>
+              <a:tailEnd type="triangle"/>
+            </a:ln>
+          </p:spPr>
+          <p:style>
+            <a:lnRef idx="1">
+              <a:schemeClr val="accent2"/>
+            </a:lnRef>
+            <a:fillRef idx="0">
+              <a:schemeClr val="accent2"/>
+            </a:fillRef>
+            <a:effectRef idx="0">
+              <a:schemeClr val="accent2"/>
+            </a:effectRef>
+            <a:fontRef idx="minor">
+              <a:schemeClr val="tx1"/>
+            </a:fontRef>
+          </p:style>
+        </p:cxnSp>
+        <p:sp>
+          <p:nvSpPr>
+            <p:cNvPr id="20" name="TextBox 19">
+              <a:extLst>
+                <a:ext uri="{FF2B5EF4-FFF2-40B4-BE49-F238E27FC236}">
+                  <a16:creationId xmlns:a16="http://schemas.microsoft.com/office/drawing/2014/main" id="{FA181E14-330A-7C69-7254-459E84ED5B62}"/>
+                </a:ext>
+              </a:extLst>
+            </p:cNvPr>
+            <p:cNvSpPr txBox="1"/>
+            <p:nvPr/>
+          </p:nvSpPr>
+          <p:spPr>
+            <a:xfrm>
+              <a:off x="4128452" y="664076"/>
+              <a:ext cx="440267" cy="307777"/>
+            </a:xfrm>
+            <a:prstGeom prst="rect">
+              <a:avLst/>
+            </a:prstGeom>
+            <a:noFill/>
+          </p:spPr>
+          <p:txBody>
+            <a:bodyPr wrap="square" rtlCol="0">
+              <a:spAutoFit/>
+            </a:bodyPr>
+            <a:lstStyle/>
+            <a:p>
+              <a:r>
+                <a:rPr lang="en-US" altLang="ko-KR" sz="1400" b="1" dirty="0">
+                  <a:solidFill>
+                    <a:srgbClr val="FF0000"/>
+                  </a:solidFill>
+                </a:rPr>
+                <a:t>(3)</a:t>
+              </a:r>
+              <a:endParaRPr lang="ko-KR" altLang="en-US" sz="1400" b="1" dirty="0">
+                <a:solidFill>
+                  <a:srgbClr val="FF0000"/>
+                </a:solidFill>
+              </a:endParaRPr>
+            </a:p>
+          </p:txBody>
+        </p:sp>
+      </p:grpSp>
+      <p:grpSp>
+        <p:nvGrpSpPr>
+          <p:cNvPr id="21" name="그룹 20">
+            <a:extLst>
+              <a:ext uri="{FF2B5EF4-FFF2-40B4-BE49-F238E27FC236}">
+                <a16:creationId xmlns:a16="http://schemas.microsoft.com/office/drawing/2014/main" id="{79E94EA5-1B85-FFB9-44E4-A0BA93D13F43}"/>
+              </a:ext>
+            </a:extLst>
+          </p:cNvPr>
+          <p:cNvGrpSpPr/>
+          <p:nvPr/>
+        </p:nvGrpSpPr>
+        <p:grpSpPr>
+          <a:xfrm>
+            <a:off x="3545303" y="5141440"/>
+            <a:ext cx="638352" cy="307777"/>
+            <a:chOff x="4357126" y="336300"/>
+            <a:chExt cx="638352" cy="307777"/>
+          </a:xfrm>
+        </p:grpSpPr>
+        <p:cxnSp>
+          <p:nvCxnSpPr>
+            <p:cNvPr id="22" name="직선 화살표 연결선 21">
+              <a:extLst>
+                <a:ext uri="{FF2B5EF4-FFF2-40B4-BE49-F238E27FC236}">
+                  <a16:creationId xmlns:a16="http://schemas.microsoft.com/office/drawing/2014/main" id="{93B5AF49-3670-44BB-291A-DFF30AC8462F}"/>
+                </a:ext>
+              </a:extLst>
+            </p:cNvPr>
+            <p:cNvCxnSpPr>
+              <a:cxnSpLocks/>
+            </p:cNvCxnSpPr>
+            <p:nvPr/>
+          </p:nvCxnSpPr>
+          <p:spPr>
+            <a:xfrm>
+              <a:off x="4558896" y="624104"/>
+              <a:ext cx="436582" cy="0"/>
+            </a:xfrm>
+            <a:prstGeom prst="straightConnector1">
+              <a:avLst/>
+            </a:prstGeom>
+            <a:ln w="12700">
+              <a:solidFill>
+                <a:srgbClr val="FF0000"/>
+              </a:solidFill>
+              <a:tailEnd type="triangle"/>
+            </a:ln>
+          </p:spPr>
+          <p:style>
+            <a:lnRef idx="1">
+              <a:schemeClr val="accent2"/>
+            </a:lnRef>
+            <a:fillRef idx="0">
+              <a:schemeClr val="accent2"/>
+            </a:fillRef>
+            <a:effectRef idx="0">
+              <a:schemeClr val="accent2"/>
+            </a:effectRef>
+            <a:fontRef idx="minor">
+              <a:schemeClr val="tx1"/>
+            </a:fontRef>
+          </p:style>
+        </p:cxnSp>
+        <p:sp>
+          <p:nvSpPr>
+            <p:cNvPr id="23" name="TextBox 22">
+              <a:extLst>
+                <a:ext uri="{FF2B5EF4-FFF2-40B4-BE49-F238E27FC236}">
+                  <a16:creationId xmlns:a16="http://schemas.microsoft.com/office/drawing/2014/main" id="{DE47E42A-4507-3851-819A-B5C41F540476}"/>
+                </a:ext>
+              </a:extLst>
+            </p:cNvPr>
+            <p:cNvSpPr txBox="1"/>
+            <p:nvPr/>
+          </p:nvSpPr>
+          <p:spPr>
+            <a:xfrm>
+              <a:off x="4357126" y="336300"/>
+              <a:ext cx="440267" cy="307777"/>
+            </a:xfrm>
+            <a:prstGeom prst="rect">
+              <a:avLst/>
+            </a:prstGeom>
+            <a:noFill/>
+          </p:spPr>
+          <p:txBody>
+            <a:bodyPr wrap="square" rtlCol="0">
+              <a:spAutoFit/>
+            </a:bodyPr>
+            <a:lstStyle/>
+            <a:p>
+              <a:r>
+                <a:rPr lang="en-US" altLang="ko-KR" sz="1400" b="1" dirty="0">
+                  <a:solidFill>
+                    <a:srgbClr val="FF0000"/>
+                  </a:solidFill>
+                </a:rPr>
+                <a:t>(1)</a:t>
+              </a:r>
+              <a:endParaRPr lang="ko-KR" altLang="en-US" sz="1400" b="1" dirty="0">
+                <a:solidFill>
+                  <a:srgbClr val="FF0000"/>
+                </a:solidFill>
+              </a:endParaRPr>
+            </a:p>
+          </p:txBody>
+        </p:sp>
+      </p:grpSp>
+      <p:sp>
+        <p:nvSpPr>
+          <p:cNvPr id="29" name="TextBox 28">
+            <a:extLst>
+              <a:ext uri="{FF2B5EF4-FFF2-40B4-BE49-F238E27FC236}">
+                <a16:creationId xmlns:a16="http://schemas.microsoft.com/office/drawing/2014/main" id="{559C0AA9-6AB3-DAE2-9D21-24D8BD1EA39D}"/>
+              </a:ext>
+            </a:extLst>
+          </p:cNvPr>
+          <p:cNvSpPr txBox="1"/>
+          <p:nvPr/>
+        </p:nvSpPr>
+        <p:spPr>
+          <a:xfrm>
+            <a:off x="756003" y="4945518"/>
+            <a:ext cx="440267" cy="307777"/>
+          </a:xfrm>
+          <a:prstGeom prst="rect">
+            <a:avLst/>
+          </a:prstGeom>
+          <a:noFill/>
+        </p:spPr>
+        <p:txBody>
+          <a:bodyPr wrap="square" rtlCol="0">
+            <a:spAutoFit/>
+          </a:bodyPr>
+          <a:lstStyle/>
+          <a:p>
+            <a:r>
+              <a:rPr lang="en-US" altLang="ko-KR" sz="1400" b="1" dirty="0">
+                <a:solidFill>
+                  <a:srgbClr val="FF0000"/>
+                </a:solidFill>
+              </a:rPr>
+              <a:t>(4)</a:t>
+            </a:r>
+            <a:endParaRPr lang="ko-KR" altLang="en-US" sz="1400" b="1" dirty="0">
+              <a:solidFill>
+                <a:srgbClr val="FF0000"/>
+              </a:solidFill>
+            </a:endParaRPr>
+          </a:p>
+        </p:txBody>
+      </p:sp>
+      <p:sp>
+        <p:nvSpPr>
+          <p:cNvPr id="32" name="TextBox 31">
+            <a:extLst>
+              <a:ext uri="{FF2B5EF4-FFF2-40B4-BE49-F238E27FC236}">
+                <a16:creationId xmlns:a16="http://schemas.microsoft.com/office/drawing/2014/main" id="{A6DB6FD2-0906-9535-1F0B-5A1505CBEEB8}"/>
+              </a:ext>
+            </a:extLst>
+          </p:cNvPr>
+          <p:cNvSpPr txBox="1"/>
+          <p:nvPr/>
+        </p:nvSpPr>
+        <p:spPr>
+          <a:xfrm>
+            <a:off x="1297567" y="2853297"/>
+            <a:ext cx="440267" cy="307777"/>
+          </a:xfrm>
+          <a:prstGeom prst="rect">
+            <a:avLst/>
+          </a:prstGeom>
+          <a:noFill/>
+        </p:spPr>
+        <p:txBody>
+          <a:bodyPr wrap="square" rtlCol="0">
+            <a:spAutoFit/>
+          </a:bodyPr>
+          <a:lstStyle/>
+          <a:p>
+            <a:r>
+              <a:rPr lang="en-US" altLang="ko-KR" sz="1400" b="1" dirty="0">
+                <a:solidFill>
+                  <a:srgbClr val="FF0000"/>
+                </a:solidFill>
+              </a:rPr>
+              <a:t>(6)</a:t>
+            </a:r>
+            <a:endParaRPr lang="ko-KR" altLang="en-US" sz="1400" b="1" dirty="0">
+              <a:solidFill>
+                <a:srgbClr val="FF0000"/>
+              </a:solidFill>
+            </a:endParaRPr>
+          </a:p>
+        </p:txBody>
+      </p:sp>
+      <p:sp>
+        <p:nvSpPr>
+          <p:cNvPr id="33" name="직사각형 32">
+            <a:extLst>
+              <a:ext uri="{FF2B5EF4-FFF2-40B4-BE49-F238E27FC236}">
+                <a16:creationId xmlns:a16="http://schemas.microsoft.com/office/drawing/2014/main" id="{664D6B6E-E8A6-9E81-271E-E55B86A7BAC5}"/>
+              </a:ext>
+            </a:extLst>
+          </p:cNvPr>
+          <p:cNvSpPr/>
+          <p:nvPr/>
+        </p:nvSpPr>
+        <p:spPr>
+          <a:xfrm>
+            <a:off x="4245868" y="623222"/>
+            <a:ext cx="6627639" cy="5643891"/>
+          </a:xfrm>
+          <a:prstGeom prst="rect">
+            <a:avLst/>
+          </a:prstGeom>
+          <a:noFill/>
+          <a:ln>
+            <a:solidFill>
+              <a:srgbClr val="FF0000"/>
+            </a:solidFill>
+          </a:ln>
+        </p:spPr>
+        <p:style>
+          <a:lnRef idx="2">
+            <a:schemeClr val="accent1">
+              <a:shade val="15000"/>
+            </a:schemeClr>
+          </a:lnRef>
+          <a:fillRef idx="1">
+            <a:schemeClr val="accent1"/>
+          </a:fillRef>
+          <a:effectRef idx="0">
+            <a:schemeClr val="accent1"/>
+          </a:effectRef>
+          <a:fontRef idx="minor">
+            <a:schemeClr val="lt1"/>
+          </a:fontRef>
+        </p:style>
+        <p:txBody>
+          <a:bodyPr rtlCol="0" anchor="ctr"/>
+          <a:lstStyle/>
+          <a:p>
+            <a:pPr algn="ctr"/>
+            <a:endParaRPr lang="ko-KR" altLang="en-US"/>
+          </a:p>
+        </p:txBody>
+      </p:sp>
+      <p:sp>
+        <p:nvSpPr>
+          <p:cNvPr id="34" name="TextBox 33">
+            <a:extLst>
+              <a:ext uri="{FF2B5EF4-FFF2-40B4-BE49-F238E27FC236}">
+                <a16:creationId xmlns:a16="http://schemas.microsoft.com/office/drawing/2014/main" id="{F5ACC08A-10AF-1E21-1A52-0C052BF42BDB}"/>
+              </a:ext>
+            </a:extLst>
+          </p:cNvPr>
+          <p:cNvSpPr txBox="1"/>
+          <p:nvPr/>
+        </p:nvSpPr>
+        <p:spPr>
+          <a:xfrm>
+            <a:off x="7339553" y="623222"/>
+            <a:ext cx="440267" cy="307777"/>
+          </a:xfrm>
+          <a:prstGeom prst="rect">
+            <a:avLst/>
+          </a:prstGeom>
+          <a:noFill/>
+        </p:spPr>
+        <p:txBody>
+          <a:bodyPr wrap="square" rtlCol="0">
+            <a:spAutoFit/>
+          </a:bodyPr>
+          <a:lstStyle/>
+          <a:p>
+            <a:r>
+              <a:rPr lang="en-US" altLang="ko-KR" sz="1400" b="1" dirty="0">
+                <a:solidFill>
+                  <a:srgbClr val="FF0000"/>
+                </a:solidFill>
+              </a:rPr>
+              <a:t>(7)</a:t>
+            </a:r>
+            <a:endParaRPr lang="ko-KR" altLang="en-US" sz="1400" b="1" dirty="0">
+              <a:solidFill>
+                <a:srgbClr val="FF0000"/>
+              </a:solidFill>
+            </a:endParaRPr>
+          </a:p>
+        </p:txBody>
+      </p:sp>
+      <p:sp>
+        <p:nvSpPr>
+          <p:cNvPr id="35" name="TextBox 34">
+            <a:extLst>
+              <a:ext uri="{FF2B5EF4-FFF2-40B4-BE49-F238E27FC236}">
+                <a16:creationId xmlns:a16="http://schemas.microsoft.com/office/drawing/2014/main" id="{6DF64A70-4F38-C15D-C38E-545FF71E20EA}"/>
+              </a:ext>
+            </a:extLst>
+          </p:cNvPr>
+          <p:cNvSpPr txBox="1"/>
+          <p:nvPr/>
+        </p:nvSpPr>
+        <p:spPr>
+          <a:xfrm>
+            <a:off x="8755858" y="2519240"/>
+            <a:ext cx="2262916" cy="307777"/>
+          </a:xfrm>
+          <a:prstGeom prst="rect">
+            <a:avLst/>
+          </a:prstGeom>
+          <a:noFill/>
+        </p:spPr>
+        <p:txBody>
+          <a:bodyPr wrap="square" rtlCol="0">
+            <a:spAutoFit/>
+          </a:bodyPr>
+          <a:lstStyle/>
+          <a:p>
+            <a:r>
+              <a:rPr lang="en-US" altLang="ko-KR" sz="1400" b="1" dirty="0">
+                <a:solidFill>
+                  <a:srgbClr val="FF0000"/>
+                </a:solidFill>
+              </a:rPr>
+              <a:t>(7) </a:t>
+            </a:r>
+            <a:r>
+              <a:rPr lang="ko-KR" altLang="en-US" sz="1400" b="1" dirty="0" err="1">
+                <a:solidFill>
+                  <a:srgbClr val="FF0000"/>
+                </a:solidFill>
+              </a:rPr>
+              <a:t>반환값</a:t>
+            </a:r>
+            <a:r>
+              <a:rPr lang="ko-KR" altLang="en-US" sz="1400" b="1" dirty="0">
+                <a:solidFill>
+                  <a:srgbClr val="FF0000"/>
+                </a:solidFill>
+              </a:rPr>
+              <a:t> </a:t>
+            </a:r>
+            <a:r>
+              <a:rPr lang="en-US" altLang="ko-KR" sz="1400" b="1" dirty="0">
+                <a:solidFill>
+                  <a:srgbClr val="FF0000"/>
+                </a:solidFill>
+              </a:rPr>
+              <a:t>: </a:t>
+            </a:r>
+            <a:r>
+              <a:rPr lang="en-US" altLang="ko-KR" sz="1400" b="1" dirty="0" err="1">
+                <a:solidFill>
+                  <a:srgbClr val="FF0000"/>
+                </a:solidFill>
+              </a:rPr>
+              <a:t>critic_loss</a:t>
+            </a:r>
+            <a:endParaRPr lang="ko-KR" altLang="en-US" sz="1400" b="1" dirty="0">
+              <a:solidFill>
+                <a:srgbClr val="FF0000"/>
+              </a:solidFill>
+            </a:endParaRPr>
+          </a:p>
+        </p:txBody>
+      </p:sp>
+      <p:cxnSp>
+        <p:nvCxnSpPr>
+          <p:cNvPr id="36" name="직선 화살표 연결선 35">
+            <a:extLst>
+              <a:ext uri="{FF2B5EF4-FFF2-40B4-BE49-F238E27FC236}">
+                <a16:creationId xmlns:a16="http://schemas.microsoft.com/office/drawing/2014/main" id="{A0154720-7C8E-6691-30BF-4612AD5D7C01}"/>
+              </a:ext>
+            </a:extLst>
+          </p:cNvPr>
+          <p:cNvCxnSpPr>
+            <a:cxnSpLocks/>
+          </p:cNvCxnSpPr>
+          <p:nvPr/>
+        </p:nvCxnSpPr>
+        <p:spPr>
+          <a:xfrm>
+            <a:off x="9129403" y="1846150"/>
+            <a:ext cx="0" cy="637083"/>
+          </a:xfrm>
+          <a:prstGeom prst="straightConnector1">
+            <a:avLst/>
+          </a:prstGeom>
+          <a:ln w="12700">
+            <a:solidFill>
+              <a:srgbClr val="FF0000"/>
+            </a:solidFill>
+            <a:tailEnd type="triangle"/>
+          </a:ln>
+        </p:spPr>
+        <p:style>
+          <a:lnRef idx="1">
+            <a:schemeClr val="accent2"/>
+          </a:lnRef>
+          <a:fillRef idx="0">
+            <a:schemeClr val="accent2"/>
+          </a:fillRef>
+          <a:effectRef idx="0">
+            <a:schemeClr val="accent2"/>
+          </a:effectRef>
+          <a:fontRef idx="minor">
+            <a:schemeClr val="tx1"/>
+          </a:fontRef>
+        </p:style>
+      </p:cxnSp>
+      <p:sp>
+        <p:nvSpPr>
+          <p:cNvPr id="37" name="TextBox 36">
+            <a:extLst>
+              <a:ext uri="{FF2B5EF4-FFF2-40B4-BE49-F238E27FC236}">
+                <a16:creationId xmlns:a16="http://schemas.microsoft.com/office/drawing/2014/main" id="{344CA00F-B79E-A555-C23A-A48A4362E710}"/>
+              </a:ext>
+            </a:extLst>
+          </p:cNvPr>
+          <p:cNvSpPr txBox="1"/>
+          <p:nvPr/>
+        </p:nvSpPr>
+        <p:spPr>
+          <a:xfrm>
+            <a:off x="8808386" y="4337678"/>
+            <a:ext cx="2262916" cy="307777"/>
+          </a:xfrm>
+          <a:prstGeom prst="rect">
+            <a:avLst/>
+          </a:prstGeom>
+          <a:noFill/>
+        </p:spPr>
+        <p:txBody>
+          <a:bodyPr wrap="square" rtlCol="0">
+            <a:spAutoFit/>
+          </a:bodyPr>
+          <a:lstStyle/>
+          <a:p>
+            <a:r>
+              <a:rPr lang="en-US" altLang="ko-KR" sz="1400" b="1" dirty="0">
+                <a:solidFill>
+                  <a:srgbClr val="FF0000"/>
+                </a:solidFill>
+              </a:rPr>
+              <a:t>(7) </a:t>
+            </a:r>
+            <a:r>
+              <a:rPr lang="ko-KR" altLang="en-US" sz="1400" b="1" dirty="0" err="1">
+                <a:solidFill>
+                  <a:srgbClr val="FF0000"/>
+                </a:solidFill>
+              </a:rPr>
+              <a:t>반환값</a:t>
+            </a:r>
+            <a:r>
+              <a:rPr lang="ko-KR" altLang="en-US" sz="1400" b="1" dirty="0">
+                <a:solidFill>
+                  <a:srgbClr val="FF0000"/>
+                </a:solidFill>
+              </a:rPr>
+              <a:t> </a:t>
+            </a:r>
+            <a:r>
+              <a:rPr lang="en-US" altLang="ko-KR" sz="1400" b="1" dirty="0">
+                <a:solidFill>
+                  <a:srgbClr val="FF0000"/>
+                </a:solidFill>
+              </a:rPr>
+              <a:t>: </a:t>
+            </a:r>
+            <a:r>
+              <a:rPr lang="en-US" altLang="ko-KR" sz="1400" b="1" dirty="0" err="1">
+                <a:solidFill>
+                  <a:srgbClr val="FF0000"/>
+                </a:solidFill>
+              </a:rPr>
+              <a:t>action_loss</a:t>
+            </a:r>
+            <a:endParaRPr lang="ko-KR" altLang="en-US" sz="1400" b="1" dirty="0">
+              <a:solidFill>
+                <a:srgbClr val="FF0000"/>
+              </a:solidFill>
+            </a:endParaRPr>
+          </a:p>
+        </p:txBody>
+      </p:sp>
+      <p:cxnSp>
+        <p:nvCxnSpPr>
+          <p:cNvPr id="38" name="직선 화살표 연결선 37">
+            <a:extLst>
+              <a:ext uri="{FF2B5EF4-FFF2-40B4-BE49-F238E27FC236}">
+                <a16:creationId xmlns:a16="http://schemas.microsoft.com/office/drawing/2014/main" id="{717A4A29-A787-3BF9-E8E0-6F2E400D5C99}"/>
+              </a:ext>
+            </a:extLst>
+          </p:cNvPr>
+          <p:cNvCxnSpPr>
+            <a:cxnSpLocks/>
+          </p:cNvCxnSpPr>
+          <p:nvPr/>
+        </p:nvCxnSpPr>
+        <p:spPr>
+          <a:xfrm>
+            <a:off x="9301375" y="3623015"/>
+            <a:ext cx="0" cy="637083"/>
+          </a:xfrm>
+          <a:prstGeom prst="straightConnector1">
+            <a:avLst/>
+          </a:prstGeom>
+          <a:ln w="12700">
+            <a:solidFill>
+              <a:srgbClr val="FF0000"/>
+            </a:solidFill>
+            <a:tailEnd type="triangle"/>
+          </a:ln>
+        </p:spPr>
+        <p:style>
+          <a:lnRef idx="1">
+            <a:schemeClr val="accent2"/>
+          </a:lnRef>
+          <a:fillRef idx="0">
+            <a:schemeClr val="accent2"/>
+          </a:fillRef>
+          <a:effectRef idx="0">
+            <a:schemeClr val="accent2"/>
+          </a:effectRef>
+          <a:fontRef idx="minor">
+            <a:schemeClr val="tx1"/>
+          </a:fontRef>
+        </p:style>
+      </p:cxnSp>
+      <p:grpSp>
+        <p:nvGrpSpPr>
+          <p:cNvPr id="39" name="그룹 38">
+            <a:extLst>
+              <a:ext uri="{FF2B5EF4-FFF2-40B4-BE49-F238E27FC236}">
+                <a16:creationId xmlns:a16="http://schemas.microsoft.com/office/drawing/2014/main" id="{2D91774D-9FFC-47C8-DD7B-2A02767AD561}"/>
+              </a:ext>
+            </a:extLst>
+          </p:cNvPr>
+          <p:cNvGrpSpPr/>
+          <p:nvPr/>
+        </p:nvGrpSpPr>
+        <p:grpSpPr>
+          <a:xfrm>
+            <a:off x="6912429" y="4427226"/>
+            <a:ext cx="468021" cy="514990"/>
+            <a:chOff x="4209252" y="662203"/>
+            <a:chExt cx="466638" cy="326898"/>
+          </a:xfrm>
+        </p:grpSpPr>
+        <p:cxnSp>
+          <p:nvCxnSpPr>
+            <p:cNvPr id="40" name="직선 화살표 연결선 39">
+              <a:extLst>
+                <a:ext uri="{FF2B5EF4-FFF2-40B4-BE49-F238E27FC236}">
+                  <a16:creationId xmlns:a16="http://schemas.microsoft.com/office/drawing/2014/main" id="{A77F3680-4992-3014-24EA-32FFE203FBF0}"/>
+                </a:ext>
+              </a:extLst>
+            </p:cNvPr>
+            <p:cNvCxnSpPr>
+              <a:cxnSpLocks/>
+            </p:cNvCxnSpPr>
+            <p:nvPr/>
+          </p:nvCxnSpPr>
+          <p:spPr>
+            <a:xfrm flipV="1">
+              <a:off x="4209252" y="662203"/>
+              <a:ext cx="0" cy="326898"/>
+            </a:xfrm>
+            <a:prstGeom prst="straightConnector1">
+              <a:avLst/>
+            </a:prstGeom>
+            <a:ln w="12700">
+              <a:solidFill>
+                <a:srgbClr val="FF0000"/>
+              </a:solidFill>
+              <a:tailEnd type="triangle"/>
+            </a:ln>
+          </p:spPr>
+          <p:style>
+            <a:lnRef idx="1">
+              <a:schemeClr val="accent2"/>
+            </a:lnRef>
+            <a:fillRef idx="0">
+              <a:schemeClr val="accent2"/>
+            </a:fillRef>
+            <a:effectRef idx="0">
+              <a:schemeClr val="accent2"/>
+            </a:effectRef>
+            <a:fontRef idx="minor">
+              <a:schemeClr val="tx1"/>
+            </a:fontRef>
+          </p:style>
+        </p:cxnSp>
+        <p:sp>
+          <p:nvSpPr>
+            <p:cNvPr id="41" name="TextBox 40">
+              <a:extLst>
+                <a:ext uri="{FF2B5EF4-FFF2-40B4-BE49-F238E27FC236}">
+                  <a16:creationId xmlns:a16="http://schemas.microsoft.com/office/drawing/2014/main" id="{1E74DDE7-7F50-40B0-E803-B2199D2AFEE3}"/>
+                </a:ext>
+              </a:extLst>
+            </p:cNvPr>
+            <p:cNvSpPr txBox="1"/>
+            <p:nvPr/>
+          </p:nvSpPr>
+          <p:spPr>
+            <a:xfrm>
+              <a:off x="4235623" y="663227"/>
+              <a:ext cx="440267" cy="195366"/>
+            </a:xfrm>
+            <a:prstGeom prst="rect">
+              <a:avLst/>
+            </a:prstGeom>
+            <a:noFill/>
+          </p:spPr>
+          <p:txBody>
+            <a:bodyPr wrap="square" rtlCol="0">
+              <a:spAutoFit/>
+            </a:bodyPr>
+            <a:lstStyle/>
+            <a:p>
+              <a:r>
+                <a:rPr lang="en-US" altLang="ko-KR" sz="1400" b="1" dirty="0">
+                  <a:solidFill>
+                    <a:srgbClr val="FF0000"/>
+                  </a:solidFill>
+                </a:rPr>
+                <a:t>(8)</a:t>
+              </a:r>
+              <a:endParaRPr lang="ko-KR" altLang="en-US" sz="1400" b="1" dirty="0">
+                <a:solidFill>
+                  <a:srgbClr val="FF0000"/>
+                </a:solidFill>
+              </a:endParaRPr>
+            </a:p>
+          </p:txBody>
+        </p:sp>
+      </p:grpSp>
+      <p:grpSp>
+        <p:nvGrpSpPr>
+          <p:cNvPr id="42" name="그룹 41">
+            <a:extLst>
+              <a:ext uri="{FF2B5EF4-FFF2-40B4-BE49-F238E27FC236}">
+                <a16:creationId xmlns:a16="http://schemas.microsoft.com/office/drawing/2014/main" id="{0FE54477-C985-A613-2C3F-4AB19D133229}"/>
+              </a:ext>
+            </a:extLst>
+          </p:cNvPr>
+          <p:cNvGrpSpPr/>
+          <p:nvPr/>
+        </p:nvGrpSpPr>
+        <p:grpSpPr>
+          <a:xfrm>
+            <a:off x="6350073" y="1649701"/>
+            <a:ext cx="441572" cy="519792"/>
+            <a:chOff x="4178821" y="662203"/>
+            <a:chExt cx="440267" cy="329946"/>
+          </a:xfrm>
+        </p:grpSpPr>
+        <p:cxnSp>
+          <p:nvCxnSpPr>
+            <p:cNvPr id="43" name="직선 화살표 연결선 42">
+              <a:extLst>
+                <a:ext uri="{FF2B5EF4-FFF2-40B4-BE49-F238E27FC236}">
+                  <a16:creationId xmlns:a16="http://schemas.microsoft.com/office/drawing/2014/main" id="{20BCAE55-2C2F-53D3-3B2D-1E2C6DB6F984}"/>
+                </a:ext>
+              </a:extLst>
+            </p:cNvPr>
+            <p:cNvCxnSpPr>
+              <a:cxnSpLocks/>
+            </p:cNvCxnSpPr>
+            <p:nvPr/>
+          </p:nvCxnSpPr>
+          <p:spPr>
+            <a:xfrm flipV="1">
+              <a:off x="4209252" y="662203"/>
+              <a:ext cx="0" cy="326898"/>
+            </a:xfrm>
+            <a:prstGeom prst="straightConnector1">
+              <a:avLst/>
+            </a:prstGeom>
+            <a:ln w="12700">
+              <a:solidFill>
+                <a:srgbClr val="FF0000"/>
+              </a:solidFill>
+              <a:tailEnd type="triangle"/>
+            </a:ln>
+          </p:spPr>
+          <p:style>
+            <a:lnRef idx="1">
+              <a:schemeClr val="accent2"/>
+            </a:lnRef>
+            <a:fillRef idx="0">
+              <a:schemeClr val="accent2"/>
+            </a:fillRef>
+            <a:effectRef idx="0">
+              <a:schemeClr val="accent2"/>
+            </a:effectRef>
+            <a:fontRef idx="minor">
+              <a:schemeClr val="tx1"/>
+            </a:fontRef>
+          </p:style>
+        </p:cxnSp>
+        <p:sp>
+          <p:nvSpPr>
+            <p:cNvPr id="44" name="TextBox 43">
+              <a:extLst>
+                <a:ext uri="{FF2B5EF4-FFF2-40B4-BE49-F238E27FC236}">
+                  <a16:creationId xmlns:a16="http://schemas.microsoft.com/office/drawing/2014/main" id="{FC8CC7F0-C2C8-F34A-B7F5-F21A9E540F94}"/>
+                </a:ext>
+              </a:extLst>
+            </p:cNvPr>
+            <p:cNvSpPr txBox="1"/>
+            <p:nvPr/>
+          </p:nvSpPr>
+          <p:spPr>
+            <a:xfrm>
+              <a:off x="4178821" y="796783"/>
+              <a:ext cx="440267" cy="195366"/>
+            </a:xfrm>
+            <a:prstGeom prst="rect">
+              <a:avLst/>
+            </a:prstGeom>
+            <a:noFill/>
+          </p:spPr>
+          <p:txBody>
+            <a:bodyPr wrap="square" rtlCol="0">
+              <a:spAutoFit/>
+            </a:bodyPr>
+            <a:lstStyle/>
+            <a:p>
+              <a:r>
+                <a:rPr lang="en-US" altLang="ko-KR" sz="1400" b="1" dirty="0">
+                  <a:solidFill>
+                    <a:srgbClr val="FF0000"/>
+                  </a:solidFill>
+                </a:rPr>
+                <a:t>(8)</a:t>
+              </a:r>
+              <a:endParaRPr lang="ko-KR" altLang="en-US" sz="1400" b="1" dirty="0">
+                <a:solidFill>
+                  <a:srgbClr val="FF0000"/>
+                </a:solidFill>
+              </a:endParaRPr>
+            </a:p>
+          </p:txBody>
+        </p:sp>
+      </p:grpSp>
+      <p:cxnSp>
+        <p:nvCxnSpPr>
+          <p:cNvPr id="46" name="직선 화살표 연결선 45">
+            <a:extLst>
+              <a:ext uri="{FF2B5EF4-FFF2-40B4-BE49-F238E27FC236}">
+                <a16:creationId xmlns:a16="http://schemas.microsoft.com/office/drawing/2014/main" id="{DFA411E8-4631-AF02-E83A-011A5C2B012D}"/>
+              </a:ext>
+            </a:extLst>
+          </p:cNvPr>
+          <p:cNvCxnSpPr>
+            <a:cxnSpLocks/>
+          </p:cNvCxnSpPr>
+          <p:nvPr/>
+        </p:nvCxnSpPr>
+        <p:spPr>
+          <a:xfrm flipV="1">
+            <a:off x="1465567" y="4020295"/>
+            <a:ext cx="215090" cy="673266"/>
+          </a:xfrm>
+          <a:prstGeom prst="straightConnector1">
+            <a:avLst/>
+          </a:prstGeom>
+          <a:ln>
+            <a:solidFill>
+              <a:srgbClr val="FF0000"/>
+            </a:solidFill>
+            <a:tailEnd type="triangle"/>
+          </a:ln>
+        </p:spPr>
+        <p:style>
+          <a:lnRef idx="1">
+            <a:schemeClr val="accent1"/>
+          </a:lnRef>
+          <a:fillRef idx="0">
+            <a:schemeClr val="accent1"/>
+          </a:fillRef>
+          <a:effectRef idx="0">
+            <a:schemeClr val="accent1"/>
+          </a:effectRef>
+          <a:fontRef idx="minor">
+            <a:schemeClr val="tx1"/>
+          </a:fontRef>
+        </p:style>
+      </p:cxnSp>
+      <p:cxnSp>
+        <p:nvCxnSpPr>
+          <p:cNvPr id="52" name="직선 화살표 연결선 51">
+            <a:extLst>
+              <a:ext uri="{FF2B5EF4-FFF2-40B4-BE49-F238E27FC236}">
+                <a16:creationId xmlns:a16="http://schemas.microsoft.com/office/drawing/2014/main" id="{49B21570-1209-71F7-B933-D159BDFDF5FD}"/>
+              </a:ext>
+            </a:extLst>
+          </p:cNvPr>
+          <p:cNvCxnSpPr>
+            <a:cxnSpLocks/>
+          </p:cNvCxnSpPr>
+          <p:nvPr/>
+        </p:nvCxnSpPr>
+        <p:spPr>
+          <a:xfrm flipH="1" flipV="1">
+            <a:off x="1931874" y="3993992"/>
+            <a:ext cx="3920193" cy="1158721"/>
+          </a:xfrm>
+          <a:prstGeom prst="straightConnector1">
+            <a:avLst/>
+          </a:prstGeom>
+          <a:ln>
+            <a:solidFill>
+              <a:srgbClr val="FF0000"/>
+            </a:solidFill>
+            <a:tailEnd type="triangle"/>
+          </a:ln>
+        </p:spPr>
+        <p:style>
+          <a:lnRef idx="1">
+            <a:schemeClr val="accent1"/>
+          </a:lnRef>
+          <a:fillRef idx="0">
+            <a:schemeClr val="accent1"/>
+          </a:fillRef>
+          <a:effectRef idx="0">
+            <a:schemeClr val="accent1"/>
+          </a:effectRef>
+          <a:fontRef idx="minor">
+            <a:schemeClr val="tx1"/>
+          </a:fontRef>
+        </p:style>
+      </p:cxnSp>
+      <p:cxnSp>
+        <p:nvCxnSpPr>
+          <p:cNvPr id="54" name="직선 화살표 연결선 53">
+            <a:extLst>
+              <a:ext uri="{FF2B5EF4-FFF2-40B4-BE49-F238E27FC236}">
+                <a16:creationId xmlns:a16="http://schemas.microsoft.com/office/drawing/2014/main" id="{02F2EA05-47FA-A3FB-1D2A-91AF56B2E06C}"/>
+              </a:ext>
+            </a:extLst>
+          </p:cNvPr>
+          <p:cNvCxnSpPr>
+            <a:cxnSpLocks/>
+          </p:cNvCxnSpPr>
+          <p:nvPr/>
+        </p:nvCxnSpPr>
+        <p:spPr>
+          <a:xfrm flipV="1">
+            <a:off x="1775697" y="3985768"/>
+            <a:ext cx="351907" cy="698953"/>
+          </a:xfrm>
+          <a:prstGeom prst="straightConnector1">
+            <a:avLst/>
+          </a:prstGeom>
+          <a:ln>
+            <a:solidFill>
+              <a:srgbClr val="FF0000"/>
+            </a:solidFill>
+            <a:tailEnd type="triangle"/>
+          </a:ln>
+        </p:spPr>
+        <p:style>
+          <a:lnRef idx="1">
+            <a:schemeClr val="accent1"/>
+          </a:lnRef>
+          <a:fillRef idx="0">
+            <a:schemeClr val="accent1"/>
+          </a:fillRef>
+          <a:effectRef idx="0">
+            <a:schemeClr val="accent1"/>
+          </a:effectRef>
+          <a:fontRef idx="minor">
+            <a:schemeClr val="tx1"/>
+          </a:fontRef>
+        </p:style>
+      </p:cxnSp>
+      <p:cxnSp>
+        <p:nvCxnSpPr>
+          <p:cNvPr id="57" name="직선 화살표 연결선 56">
+            <a:extLst>
+              <a:ext uri="{FF2B5EF4-FFF2-40B4-BE49-F238E27FC236}">
+                <a16:creationId xmlns:a16="http://schemas.microsoft.com/office/drawing/2014/main" id="{C9451318-90A7-F7EA-547B-900939848C28}"/>
+              </a:ext>
+            </a:extLst>
+          </p:cNvPr>
+          <p:cNvCxnSpPr>
+            <a:cxnSpLocks/>
+          </p:cNvCxnSpPr>
+          <p:nvPr/>
+        </p:nvCxnSpPr>
+        <p:spPr>
+          <a:xfrm flipV="1">
+            <a:off x="1775697" y="3985768"/>
+            <a:ext cx="572040" cy="707793"/>
+          </a:xfrm>
+          <a:prstGeom prst="straightConnector1">
+            <a:avLst/>
+          </a:prstGeom>
+          <a:ln>
+            <a:solidFill>
+              <a:srgbClr val="FF0000"/>
+            </a:solidFill>
+            <a:tailEnd type="triangle"/>
+          </a:ln>
+        </p:spPr>
+        <p:style>
+          <a:lnRef idx="1">
+            <a:schemeClr val="accent1"/>
+          </a:lnRef>
+          <a:fillRef idx="0">
+            <a:schemeClr val="accent1"/>
+          </a:fillRef>
+          <a:effectRef idx="0">
+            <a:schemeClr val="accent1"/>
+          </a:effectRef>
+          <a:fontRef idx="minor">
+            <a:schemeClr val="tx1"/>
+          </a:fontRef>
+        </p:style>
+      </p:cxnSp>
+    </p:spTree>
+    <p:extLst>
+      <p:ext uri="{BB962C8B-B14F-4D97-AF65-F5344CB8AC3E}">
+        <p14:creationId xmlns:p14="http://schemas.microsoft.com/office/powerpoint/2010/main" val="799727205"/>
+      </p:ext>
+    </p:extLst>
+  </p:cSld>
+  <p:clrMapOvr>
+    <a:masterClrMapping/>
+  </p:clrMapOvr>
+</p:sld>
+</file>
+
 <file path=ppt/slides/slide2.xml><?xml version="1.0" encoding="utf-8"?>
 <p:sld xmlns:a="http://schemas.openxmlformats.org/drawingml/2006/main" xmlns:r="http://schemas.openxmlformats.org/officeDocument/2006/relationships" xmlns:p="http://schemas.openxmlformats.org/presentationml/2006/main">
   <p:cSld>
@@ -8952,6 +10387,1632 @@
     <p:extLst>
       <p:ext uri="{BB962C8B-B14F-4D97-AF65-F5344CB8AC3E}">
         <p14:creationId xmlns:p14="http://schemas.microsoft.com/office/powerpoint/2010/main" val="3014454544"/>
+      </p:ext>
+    </p:extLst>
+  </p:cSld>
+  <p:clrMapOvr>
+    <a:masterClrMapping/>
+  </p:clrMapOvr>
+</p:sld>
+</file>
+
+<file path=ppt/slides/slide9.xml><?xml version="1.0" encoding="utf-8"?>
+<p:sld xmlns:a="http://schemas.openxmlformats.org/drawingml/2006/main" xmlns:r="http://schemas.openxmlformats.org/officeDocument/2006/relationships" xmlns:p="http://schemas.openxmlformats.org/presentationml/2006/main">
+  <p:cSld>
+    <p:spTree>
+      <p:nvGrpSpPr>
+        <p:cNvPr id="1" name=""/>
+        <p:cNvGrpSpPr/>
+        <p:nvPr/>
+      </p:nvGrpSpPr>
+      <p:grpSpPr>
+        <a:xfrm>
+          <a:off x="0" y="0"/>
+          <a:ext cx="0" cy="0"/>
+          <a:chOff x="0" y="0"/>
+          <a:chExt cx="0" cy="0"/>
+        </a:xfrm>
+      </p:grpSpPr>
+      <p:pic>
+        <p:nvPicPr>
+          <p:cNvPr id="4" name="그림 3">
+            <a:extLst>
+              <a:ext uri="{FF2B5EF4-FFF2-40B4-BE49-F238E27FC236}">
+                <a16:creationId xmlns:a16="http://schemas.microsoft.com/office/drawing/2014/main" id="{8FD75C06-B8BD-D796-B1A4-1EDB151775ED}"/>
+              </a:ext>
+            </a:extLst>
+          </p:cNvPr>
+          <p:cNvPicPr>
+            <a:picLocks noChangeAspect="1"/>
+          </p:cNvPicPr>
+          <p:nvPr/>
+        </p:nvPicPr>
+        <p:blipFill>
+          <a:blip r:embed="rId2">
+            <a:extLst>
+              <a:ext uri="{28A0092B-C50C-407E-A947-70E740481C1C}">
+                <a14:useLocalDpi xmlns:a14="http://schemas.microsoft.com/office/drawing/2010/main" val="0"/>
+              </a:ext>
+            </a:extLst>
+          </a:blip>
+          <a:stretch>
+            <a:fillRect/>
+          </a:stretch>
+        </p:blipFill>
+        <p:spPr>
+          <a:xfrm>
+            <a:off x="103939" y="839245"/>
+            <a:ext cx="11984122" cy="5258534"/>
+          </a:xfrm>
+          <a:prstGeom prst="rect">
+            <a:avLst/>
+          </a:prstGeom>
+          <a:ln>
+            <a:noFill/>
+          </a:ln>
+        </p:spPr>
+      </p:pic>
+      <p:grpSp>
+        <p:nvGrpSpPr>
+          <p:cNvPr id="8" name="그룹 7">
+            <a:extLst>
+              <a:ext uri="{FF2B5EF4-FFF2-40B4-BE49-F238E27FC236}">
+                <a16:creationId xmlns:a16="http://schemas.microsoft.com/office/drawing/2014/main" id="{36E38BFE-CAC9-C12F-1C59-907F9871D926}"/>
+              </a:ext>
+            </a:extLst>
+          </p:cNvPr>
+          <p:cNvGrpSpPr/>
+          <p:nvPr/>
+        </p:nvGrpSpPr>
+        <p:grpSpPr>
+          <a:xfrm>
+            <a:off x="3961230" y="3666073"/>
+            <a:ext cx="2038815" cy="307777"/>
+            <a:chOff x="3978163" y="339274"/>
+            <a:chExt cx="2038815" cy="307777"/>
+          </a:xfrm>
+        </p:grpSpPr>
+        <p:cxnSp>
+          <p:nvCxnSpPr>
+            <p:cNvPr id="6" name="직선 화살표 연결선 5">
+              <a:extLst>
+                <a:ext uri="{FF2B5EF4-FFF2-40B4-BE49-F238E27FC236}">
+                  <a16:creationId xmlns:a16="http://schemas.microsoft.com/office/drawing/2014/main" id="{BBF94569-E27A-22CB-22AC-2A7C45CE0156}"/>
+                </a:ext>
+              </a:extLst>
+            </p:cNvPr>
+            <p:cNvCxnSpPr>
+              <a:cxnSpLocks/>
+              <a:stCxn id="7" idx="3"/>
+            </p:cNvCxnSpPr>
+            <p:nvPr/>
+          </p:nvCxnSpPr>
+          <p:spPr>
+            <a:xfrm flipV="1">
+              <a:off x="4418430" y="491067"/>
+              <a:ext cx="1598548" cy="2096"/>
+            </a:xfrm>
+            <a:prstGeom prst="straightConnector1">
+              <a:avLst/>
+            </a:prstGeom>
+            <a:ln w="12700">
+              <a:solidFill>
+                <a:srgbClr val="FF0000"/>
+              </a:solidFill>
+              <a:tailEnd type="triangle"/>
+            </a:ln>
+          </p:spPr>
+          <p:style>
+            <a:lnRef idx="1">
+              <a:schemeClr val="accent2"/>
+            </a:lnRef>
+            <a:fillRef idx="0">
+              <a:schemeClr val="accent2"/>
+            </a:fillRef>
+            <a:effectRef idx="0">
+              <a:schemeClr val="accent2"/>
+            </a:effectRef>
+            <a:fontRef idx="minor">
+              <a:schemeClr val="tx1"/>
+            </a:fontRef>
+          </p:style>
+        </p:cxnSp>
+        <p:sp>
+          <p:nvSpPr>
+            <p:cNvPr id="7" name="TextBox 6">
+              <a:extLst>
+                <a:ext uri="{FF2B5EF4-FFF2-40B4-BE49-F238E27FC236}">
+                  <a16:creationId xmlns:a16="http://schemas.microsoft.com/office/drawing/2014/main" id="{E80B77CF-92FB-F703-59EF-13A13E35A87B}"/>
+                </a:ext>
+              </a:extLst>
+            </p:cNvPr>
+            <p:cNvSpPr txBox="1"/>
+            <p:nvPr/>
+          </p:nvSpPr>
+          <p:spPr>
+            <a:xfrm>
+              <a:off x="3978163" y="339274"/>
+              <a:ext cx="440267" cy="307777"/>
+            </a:xfrm>
+            <a:prstGeom prst="rect">
+              <a:avLst/>
+            </a:prstGeom>
+            <a:noFill/>
+          </p:spPr>
+          <p:txBody>
+            <a:bodyPr wrap="square" rtlCol="0">
+              <a:spAutoFit/>
+            </a:bodyPr>
+            <a:lstStyle/>
+            <a:p>
+              <a:r>
+                <a:rPr lang="en-US" altLang="ko-KR" sz="1400" b="1" dirty="0">
+                  <a:solidFill>
+                    <a:srgbClr val="FF0000"/>
+                  </a:solidFill>
+                </a:rPr>
+                <a:t>(1)</a:t>
+              </a:r>
+              <a:endParaRPr lang="ko-KR" altLang="en-US" sz="1400" b="1" dirty="0">
+                <a:solidFill>
+                  <a:srgbClr val="FF0000"/>
+                </a:solidFill>
+              </a:endParaRPr>
+            </a:p>
+          </p:txBody>
+        </p:sp>
+      </p:grpSp>
+      <p:grpSp>
+        <p:nvGrpSpPr>
+          <p:cNvPr id="9" name="그룹 8">
+            <a:extLst>
+              <a:ext uri="{FF2B5EF4-FFF2-40B4-BE49-F238E27FC236}">
+                <a16:creationId xmlns:a16="http://schemas.microsoft.com/office/drawing/2014/main" id="{339B489A-D52B-0A95-5A03-52632428A9B3}"/>
+              </a:ext>
+            </a:extLst>
+          </p:cNvPr>
+          <p:cNvGrpSpPr/>
+          <p:nvPr/>
+        </p:nvGrpSpPr>
+        <p:grpSpPr>
+          <a:xfrm>
+            <a:off x="8441265" y="879144"/>
+            <a:ext cx="568024" cy="323166"/>
+            <a:chOff x="4586109" y="363524"/>
+            <a:chExt cx="568024" cy="323166"/>
+          </a:xfrm>
+        </p:grpSpPr>
+        <p:cxnSp>
+          <p:nvCxnSpPr>
+            <p:cNvPr id="10" name="직선 화살표 연결선 9">
+              <a:extLst>
+                <a:ext uri="{FF2B5EF4-FFF2-40B4-BE49-F238E27FC236}">
+                  <a16:creationId xmlns:a16="http://schemas.microsoft.com/office/drawing/2014/main" id="{EF3762CF-5BED-6CBF-CC19-9D3C2C143B63}"/>
+                </a:ext>
+              </a:extLst>
+            </p:cNvPr>
+            <p:cNvCxnSpPr>
+              <a:cxnSpLocks/>
+            </p:cNvCxnSpPr>
+            <p:nvPr/>
+          </p:nvCxnSpPr>
+          <p:spPr>
+            <a:xfrm>
+              <a:off x="4586109" y="686690"/>
+              <a:ext cx="568024" cy="0"/>
+            </a:xfrm>
+            <a:prstGeom prst="straightConnector1">
+              <a:avLst/>
+            </a:prstGeom>
+            <a:ln w="12700">
+              <a:solidFill>
+                <a:srgbClr val="FF0000"/>
+              </a:solidFill>
+              <a:tailEnd type="triangle"/>
+            </a:ln>
+          </p:spPr>
+          <p:style>
+            <a:lnRef idx="1">
+              <a:schemeClr val="accent2"/>
+            </a:lnRef>
+            <a:fillRef idx="0">
+              <a:schemeClr val="accent2"/>
+            </a:fillRef>
+            <a:effectRef idx="0">
+              <a:schemeClr val="accent2"/>
+            </a:effectRef>
+            <a:fontRef idx="minor">
+              <a:schemeClr val="tx1"/>
+            </a:fontRef>
+          </p:style>
+        </p:cxnSp>
+        <p:sp>
+          <p:nvSpPr>
+            <p:cNvPr id="11" name="TextBox 10">
+              <a:extLst>
+                <a:ext uri="{FF2B5EF4-FFF2-40B4-BE49-F238E27FC236}">
+                  <a16:creationId xmlns:a16="http://schemas.microsoft.com/office/drawing/2014/main" id="{663CA8EE-F768-00DA-C921-484C3AA519CC}"/>
+                </a:ext>
+              </a:extLst>
+            </p:cNvPr>
+            <p:cNvSpPr txBox="1"/>
+            <p:nvPr/>
+          </p:nvSpPr>
+          <p:spPr>
+            <a:xfrm>
+              <a:off x="4651021" y="363524"/>
+              <a:ext cx="440267" cy="307777"/>
+            </a:xfrm>
+            <a:prstGeom prst="rect">
+              <a:avLst/>
+            </a:prstGeom>
+            <a:noFill/>
+          </p:spPr>
+          <p:txBody>
+            <a:bodyPr wrap="square" rtlCol="0">
+              <a:spAutoFit/>
+            </a:bodyPr>
+            <a:lstStyle/>
+            <a:p>
+              <a:r>
+                <a:rPr lang="en-US" altLang="ko-KR" sz="1400" b="1" dirty="0">
+                  <a:solidFill>
+                    <a:srgbClr val="FF0000"/>
+                  </a:solidFill>
+                </a:rPr>
+                <a:t>(3)</a:t>
+              </a:r>
+              <a:endParaRPr lang="ko-KR" altLang="en-US" sz="1400" b="1" dirty="0">
+                <a:solidFill>
+                  <a:srgbClr val="FF0000"/>
+                </a:solidFill>
+              </a:endParaRPr>
+            </a:p>
+          </p:txBody>
+        </p:sp>
+      </p:grpSp>
+      <p:grpSp>
+        <p:nvGrpSpPr>
+          <p:cNvPr id="30" name="그룹 29">
+            <a:extLst>
+              <a:ext uri="{FF2B5EF4-FFF2-40B4-BE49-F238E27FC236}">
+                <a16:creationId xmlns:a16="http://schemas.microsoft.com/office/drawing/2014/main" id="{71CB22E8-3D0E-9C28-CDEB-3F4E587443FA}"/>
+              </a:ext>
+            </a:extLst>
+          </p:cNvPr>
+          <p:cNvGrpSpPr/>
+          <p:nvPr/>
+        </p:nvGrpSpPr>
+        <p:grpSpPr>
+          <a:xfrm>
+            <a:off x="3984979" y="958975"/>
+            <a:ext cx="1958622" cy="357626"/>
+            <a:chOff x="4075287" y="347931"/>
+            <a:chExt cx="1958622" cy="357626"/>
+          </a:xfrm>
+        </p:grpSpPr>
+        <p:cxnSp>
+          <p:nvCxnSpPr>
+            <p:cNvPr id="31" name="직선 화살표 연결선 30">
+              <a:extLst>
+                <a:ext uri="{FF2B5EF4-FFF2-40B4-BE49-F238E27FC236}">
+                  <a16:creationId xmlns:a16="http://schemas.microsoft.com/office/drawing/2014/main" id="{C0CB4A6F-3750-D818-3C88-7D3BC4677520}"/>
+                </a:ext>
+              </a:extLst>
+            </p:cNvPr>
+            <p:cNvCxnSpPr>
+              <a:cxnSpLocks/>
+            </p:cNvCxnSpPr>
+            <p:nvPr/>
+          </p:nvCxnSpPr>
+          <p:spPr>
+            <a:xfrm>
+              <a:off x="4295420" y="705557"/>
+              <a:ext cx="1738489" cy="0"/>
+            </a:xfrm>
+            <a:prstGeom prst="straightConnector1">
+              <a:avLst/>
+            </a:prstGeom>
+            <a:ln w="12700">
+              <a:solidFill>
+                <a:srgbClr val="FF0000"/>
+              </a:solidFill>
+              <a:tailEnd type="triangle"/>
+            </a:ln>
+          </p:spPr>
+          <p:style>
+            <a:lnRef idx="1">
+              <a:schemeClr val="accent2"/>
+            </a:lnRef>
+            <a:fillRef idx="0">
+              <a:schemeClr val="accent2"/>
+            </a:fillRef>
+            <a:effectRef idx="0">
+              <a:schemeClr val="accent2"/>
+            </a:effectRef>
+            <a:fontRef idx="minor">
+              <a:schemeClr val="tx1"/>
+            </a:fontRef>
+          </p:style>
+        </p:cxnSp>
+        <p:sp>
+          <p:nvSpPr>
+            <p:cNvPr id="32" name="TextBox 31">
+              <a:extLst>
+                <a:ext uri="{FF2B5EF4-FFF2-40B4-BE49-F238E27FC236}">
+                  <a16:creationId xmlns:a16="http://schemas.microsoft.com/office/drawing/2014/main" id="{76E0CD1F-5A28-A09F-6125-3EAEDDAA2F6F}"/>
+                </a:ext>
+              </a:extLst>
+            </p:cNvPr>
+            <p:cNvSpPr txBox="1"/>
+            <p:nvPr/>
+          </p:nvSpPr>
+          <p:spPr>
+            <a:xfrm>
+              <a:off x="4075287" y="347931"/>
+              <a:ext cx="440267" cy="307777"/>
+            </a:xfrm>
+            <a:prstGeom prst="rect">
+              <a:avLst/>
+            </a:prstGeom>
+            <a:noFill/>
+          </p:spPr>
+          <p:txBody>
+            <a:bodyPr wrap="square" rtlCol="0">
+              <a:spAutoFit/>
+            </a:bodyPr>
+            <a:lstStyle/>
+            <a:p>
+              <a:r>
+                <a:rPr lang="en-US" altLang="ko-KR" sz="1400" b="1" dirty="0">
+                  <a:solidFill>
+                    <a:srgbClr val="FF0000"/>
+                  </a:solidFill>
+                </a:rPr>
+                <a:t>(2)</a:t>
+              </a:r>
+              <a:endParaRPr lang="ko-KR" altLang="en-US" sz="1400" b="1" dirty="0">
+                <a:solidFill>
+                  <a:srgbClr val="FF0000"/>
+                </a:solidFill>
+              </a:endParaRPr>
+            </a:p>
+          </p:txBody>
+        </p:sp>
+      </p:grpSp>
+      <p:grpSp>
+        <p:nvGrpSpPr>
+          <p:cNvPr id="33" name="그룹 32">
+            <a:extLst>
+              <a:ext uri="{FF2B5EF4-FFF2-40B4-BE49-F238E27FC236}">
+                <a16:creationId xmlns:a16="http://schemas.microsoft.com/office/drawing/2014/main" id="{0BE322B1-C2B7-A918-4F76-4E9CC0B71CF3}"/>
+              </a:ext>
+            </a:extLst>
+          </p:cNvPr>
+          <p:cNvGrpSpPr/>
+          <p:nvPr/>
+        </p:nvGrpSpPr>
+        <p:grpSpPr>
+          <a:xfrm>
+            <a:off x="3656430" y="2850887"/>
+            <a:ext cx="2383124" cy="307777"/>
+            <a:chOff x="3650786" y="337178"/>
+            <a:chExt cx="2383124" cy="307777"/>
+          </a:xfrm>
+        </p:grpSpPr>
+        <p:cxnSp>
+          <p:nvCxnSpPr>
+            <p:cNvPr id="34" name="직선 화살표 연결선 33">
+              <a:extLst>
+                <a:ext uri="{FF2B5EF4-FFF2-40B4-BE49-F238E27FC236}">
+                  <a16:creationId xmlns:a16="http://schemas.microsoft.com/office/drawing/2014/main" id="{F19A129E-80A6-FB00-0D3B-E5A108D8A1CA}"/>
+                </a:ext>
+              </a:extLst>
+            </p:cNvPr>
+            <p:cNvCxnSpPr>
+              <a:cxnSpLocks/>
+            </p:cNvCxnSpPr>
+            <p:nvPr/>
+          </p:nvCxnSpPr>
+          <p:spPr>
+            <a:xfrm>
+              <a:off x="4295421" y="491067"/>
+              <a:ext cx="1738489" cy="0"/>
+            </a:xfrm>
+            <a:prstGeom prst="straightConnector1">
+              <a:avLst/>
+            </a:prstGeom>
+            <a:ln w="12700">
+              <a:solidFill>
+                <a:srgbClr val="FF0000"/>
+              </a:solidFill>
+              <a:tailEnd type="triangle"/>
+            </a:ln>
+          </p:spPr>
+          <p:style>
+            <a:lnRef idx="1">
+              <a:schemeClr val="accent2"/>
+            </a:lnRef>
+            <a:fillRef idx="0">
+              <a:schemeClr val="accent2"/>
+            </a:fillRef>
+            <a:effectRef idx="0">
+              <a:schemeClr val="accent2"/>
+            </a:effectRef>
+            <a:fontRef idx="minor">
+              <a:schemeClr val="tx1"/>
+            </a:fontRef>
+          </p:style>
+        </p:cxnSp>
+        <p:sp>
+          <p:nvSpPr>
+            <p:cNvPr id="35" name="TextBox 34">
+              <a:extLst>
+                <a:ext uri="{FF2B5EF4-FFF2-40B4-BE49-F238E27FC236}">
+                  <a16:creationId xmlns:a16="http://schemas.microsoft.com/office/drawing/2014/main" id="{2150E459-B66C-574E-960A-F49D586F49B9}"/>
+                </a:ext>
+              </a:extLst>
+            </p:cNvPr>
+            <p:cNvSpPr txBox="1"/>
+            <p:nvPr/>
+          </p:nvSpPr>
+          <p:spPr>
+            <a:xfrm>
+              <a:off x="3650786" y="337178"/>
+              <a:ext cx="745067" cy="307777"/>
+            </a:xfrm>
+            <a:prstGeom prst="rect">
+              <a:avLst/>
+            </a:prstGeom>
+            <a:noFill/>
+          </p:spPr>
+          <p:txBody>
+            <a:bodyPr wrap="square" rtlCol="0">
+              <a:spAutoFit/>
+            </a:bodyPr>
+            <a:lstStyle/>
+            <a:p>
+              <a:r>
+                <a:rPr lang="en-US" altLang="ko-KR" sz="1400" b="1" dirty="0">
+                  <a:solidFill>
+                    <a:srgbClr val="FF0000"/>
+                  </a:solidFill>
+                </a:rPr>
+                <a:t>(4) (8)</a:t>
+              </a:r>
+              <a:endParaRPr lang="ko-KR" altLang="en-US" sz="1400" b="1" dirty="0">
+                <a:solidFill>
+                  <a:srgbClr val="FF0000"/>
+                </a:solidFill>
+              </a:endParaRPr>
+            </a:p>
+          </p:txBody>
+        </p:sp>
+      </p:grpSp>
+      <p:pic>
+        <p:nvPicPr>
+          <p:cNvPr id="41" name="그림 40">
+            <a:extLst>
+              <a:ext uri="{FF2B5EF4-FFF2-40B4-BE49-F238E27FC236}">
+                <a16:creationId xmlns:a16="http://schemas.microsoft.com/office/drawing/2014/main" id="{05F2CE8F-DE44-FC8A-DF03-37B95B8219FD}"/>
+              </a:ext>
+            </a:extLst>
+          </p:cNvPr>
+          <p:cNvPicPr>
+            <a:picLocks noChangeAspect="1"/>
+          </p:cNvPicPr>
+          <p:nvPr/>
+        </p:nvPicPr>
+        <p:blipFill>
+          <a:blip r:embed="rId3">
+            <a:extLst>
+              <a:ext uri="{28A0092B-C50C-407E-A947-70E740481C1C}">
+                <a14:useLocalDpi xmlns:a14="http://schemas.microsoft.com/office/drawing/2010/main" val="0"/>
+              </a:ext>
+            </a:extLst>
+          </a:blip>
+          <a:stretch>
+            <a:fillRect/>
+          </a:stretch>
+        </p:blipFill>
+        <p:spPr>
+          <a:xfrm>
+            <a:off x="5803434" y="48863"/>
+            <a:ext cx="6286019" cy="800328"/>
+          </a:xfrm>
+          <a:prstGeom prst="rect">
+            <a:avLst/>
+          </a:prstGeom>
+          <a:ln>
+            <a:noFill/>
+          </a:ln>
+          <a:effectLst>
+            <a:outerShdw blurRad="50800" dist="38100" dir="2700000" algn="tl" rotWithShape="0">
+              <a:prstClr val="black">
+                <a:alpha val="40000"/>
+              </a:prstClr>
+            </a:outerShdw>
+          </a:effectLst>
+        </p:spPr>
+      </p:pic>
+      <p:cxnSp>
+        <p:nvCxnSpPr>
+          <p:cNvPr id="43" name="직선 화살표 연결선 42">
+            <a:extLst>
+              <a:ext uri="{FF2B5EF4-FFF2-40B4-BE49-F238E27FC236}">
+                <a16:creationId xmlns:a16="http://schemas.microsoft.com/office/drawing/2014/main" id="{0FDB3660-D602-0349-2232-ABF42B1ABAC6}"/>
+              </a:ext>
+            </a:extLst>
+          </p:cNvPr>
+          <p:cNvCxnSpPr>
+            <a:cxnSpLocks/>
+          </p:cNvCxnSpPr>
+          <p:nvPr/>
+        </p:nvCxnSpPr>
+        <p:spPr>
+          <a:xfrm>
+            <a:off x="8946444" y="879144"/>
+            <a:ext cx="83497" cy="218578"/>
+          </a:xfrm>
+          <a:prstGeom prst="straightConnector1">
+            <a:avLst/>
+          </a:prstGeom>
+          <a:ln>
+            <a:tailEnd type="triangle"/>
+          </a:ln>
+        </p:spPr>
+        <p:style>
+          <a:lnRef idx="1">
+            <a:schemeClr val="accent1"/>
+          </a:lnRef>
+          <a:fillRef idx="0">
+            <a:schemeClr val="accent1"/>
+          </a:fillRef>
+          <a:effectRef idx="0">
+            <a:schemeClr val="accent1"/>
+          </a:effectRef>
+          <a:fontRef idx="minor">
+            <a:schemeClr val="tx1"/>
+          </a:fontRef>
+        </p:style>
+      </p:cxnSp>
+      <p:grpSp>
+        <p:nvGrpSpPr>
+          <p:cNvPr id="46" name="그룹 45">
+            <a:extLst>
+              <a:ext uri="{FF2B5EF4-FFF2-40B4-BE49-F238E27FC236}">
+                <a16:creationId xmlns:a16="http://schemas.microsoft.com/office/drawing/2014/main" id="{7B658354-F0C5-D647-F172-DCFF1AC9E0C6}"/>
+              </a:ext>
+            </a:extLst>
+          </p:cNvPr>
+          <p:cNvGrpSpPr/>
+          <p:nvPr/>
+        </p:nvGrpSpPr>
+        <p:grpSpPr>
+          <a:xfrm>
+            <a:off x="9290756" y="1534539"/>
+            <a:ext cx="441436" cy="637083"/>
+            <a:chOff x="3916075" y="337178"/>
+            <a:chExt cx="441436" cy="637083"/>
+          </a:xfrm>
+        </p:grpSpPr>
+        <p:cxnSp>
+          <p:nvCxnSpPr>
+            <p:cNvPr id="47" name="직선 화살표 연결선 46">
+              <a:extLst>
+                <a:ext uri="{FF2B5EF4-FFF2-40B4-BE49-F238E27FC236}">
+                  <a16:creationId xmlns:a16="http://schemas.microsoft.com/office/drawing/2014/main" id="{C24628CE-A2A3-0A7E-4EF2-6D060F5A9B49}"/>
+                </a:ext>
+              </a:extLst>
+            </p:cNvPr>
+            <p:cNvCxnSpPr>
+              <a:cxnSpLocks/>
+            </p:cNvCxnSpPr>
+            <p:nvPr/>
+          </p:nvCxnSpPr>
+          <p:spPr>
+            <a:xfrm>
+              <a:off x="4357511" y="337178"/>
+              <a:ext cx="0" cy="637083"/>
+            </a:xfrm>
+            <a:prstGeom prst="straightConnector1">
+              <a:avLst/>
+            </a:prstGeom>
+            <a:ln w="12700">
+              <a:solidFill>
+                <a:srgbClr val="FF0000"/>
+              </a:solidFill>
+              <a:tailEnd type="triangle"/>
+            </a:ln>
+          </p:spPr>
+          <p:style>
+            <a:lnRef idx="1">
+              <a:schemeClr val="accent2"/>
+            </a:lnRef>
+            <a:fillRef idx="0">
+              <a:schemeClr val="accent2"/>
+            </a:fillRef>
+            <a:effectRef idx="0">
+              <a:schemeClr val="accent2"/>
+            </a:effectRef>
+            <a:fontRef idx="minor">
+              <a:schemeClr val="tx1"/>
+            </a:fontRef>
+          </p:style>
+        </p:cxnSp>
+        <p:sp>
+          <p:nvSpPr>
+            <p:cNvPr id="48" name="TextBox 47">
+              <a:extLst>
+                <a:ext uri="{FF2B5EF4-FFF2-40B4-BE49-F238E27FC236}">
+                  <a16:creationId xmlns:a16="http://schemas.microsoft.com/office/drawing/2014/main" id="{FE641BE6-F638-59F4-3564-4CD64879DCC9}"/>
+                </a:ext>
+              </a:extLst>
+            </p:cNvPr>
+            <p:cNvSpPr txBox="1"/>
+            <p:nvPr/>
+          </p:nvSpPr>
+          <p:spPr>
+            <a:xfrm>
+              <a:off x="3916075" y="337178"/>
+              <a:ext cx="440267" cy="307777"/>
+            </a:xfrm>
+            <a:prstGeom prst="rect">
+              <a:avLst/>
+            </a:prstGeom>
+            <a:noFill/>
+          </p:spPr>
+          <p:txBody>
+            <a:bodyPr wrap="square" rtlCol="0">
+              <a:spAutoFit/>
+            </a:bodyPr>
+            <a:lstStyle/>
+            <a:p>
+              <a:r>
+                <a:rPr lang="en-US" altLang="ko-KR" sz="1400" b="1" dirty="0">
+                  <a:solidFill>
+                    <a:srgbClr val="FF0000"/>
+                  </a:solidFill>
+                </a:rPr>
+                <a:t>(5)</a:t>
+              </a:r>
+              <a:endParaRPr lang="ko-KR" altLang="en-US" sz="1400" b="1" dirty="0">
+                <a:solidFill>
+                  <a:srgbClr val="FF0000"/>
+                </a:solidFill>
+              </a:endParaRPr>
+            </a:p>
+          </p:txBody>
+        </p:sp>
+      </p:grpSp>
+      <p:grpSp>
+        <p:nvGrpSpPr>
+          <p:cNvPr id="51" name="그룹 50">
+            <a:extLst>
+              <a:ext uri="{FF2B5EF4-FFF2-40B4-BE49-F238E27FC236}">
+                <a16:creationId xmlns:a16="http://schemas.microsoft.com/office/drawing/2014/main" id="{E1A245F1-1A0E-B190-2C93-3130C0655FB3}"/>
+              </a:ext>
+            </a:extLst>
+          </p:cNvPr>
+          <p:cNvGrpSpPr/>
+          <p:nvPr/>
+        </p:nvGrpSpPr>
+        <p:grpSpPr>
+          <a:xfrm>
+            <a:off x="7761112" y="2478809"/>
+            <a:ext cx="1268829" cy="307777"/>
+            <a:chOff x="3087513" y="337178"/>
+            <a:chExt cx="1268829" cy="307777"/>
+          </a:xfrm>
+        </p:grpSpPr>
+        <p:cxnSp>
+          <p:nvCxnSpPr>
+            <p:cNvPr id="52" name="직선 화살표 연결선 51">
+              <a:extLst>
+                <a:ext uri="{FF2B5EF4-FFF2-40B4-BE49-F238E27FC236}">
+                  <a16:creationId xmlns:a16="http://schemas.microsoft.com/office/drawing/2014/main" id="{D120D85A-747D-DD60-78B6-CF3E08C6E1EB}"/>
+                </a:ext>
+              </a:extLst>
+            </p:cNvPr>
+            <p:cNvCxnSpPr>
+              <a:cxnSpLocks/>
+            </p:cNvCxnSpPr>
+            <p:nvPr/>
+          </p:nvCxnSpPr>
+          <p:spPr>
+            <a:xfrm flipH="1">
+              <a:off x="3087513" y="644955"/>
+              <a:ext cx="1185331" cy="0"/>
+            </a:xfrm>
+            <a:prstGeom prst="straightConnector1">
+              <a:avLst/>
+            </a:prstGeom>
+            <a:ln w="12700">
+              <a:solidFill>
+                <a:srgbClr val="FF0000"/>
+              </a:solidFill>
+              <a:tailEnd type="triangle"/>
+            </a:ln>
+          </p:spPr>
+          <p:style>
+            <a:lnRef idx="1">
+              <a:schemeClr val="accent2"/>
+            </a:lnRef>
+            <a:fillRef idx="0">
+              <a:schemeClr val="accent2"/>
+            </a:fillRef>
+            <a:effectRef idx="0">
+              <a:schemeClr val="accent2"/>
+            </a:effectRef>
+            <a:fontRef idx="minor">
+              <a:schemeClr val="tx1"/>
+            </a:fontRef>
+          </p:style>
+        </p:cxnSp>
+        <p:sp>
+          <p:nvSpPr>
+            <p:cNvPr id="53" name="TextBox 52">
+              <a:extLst>
+                <a:ext uri="{FF2B5EF4-FFF2-40B4-BE49-F238E27FC236}">
+                  <a16:creationId xmlns:a16="http://schemas.microsoft.com/office/drawing/2014/main" id="{71CA4D1F-B0FD-9D86-2C8F-270AF365E200}"/>
+                </a:ext>
+              </a:extLst>
+            </p:cNvPr>
+            <p:cNvSpPr txBox="1"/>
+            <p:nvPr/>
+          </p:nvSpPr>
+          <p:spPr>
+            <a:xfrm>
+              <a:off x="3916075" y="337178"/>
+              <a:ext cx="440267" cy="307777"/>
+            </a:xfrm>
+            <a:prstGeom prst="rect">
+              <a:avLst/>
+            </a:prstGeom>
+            <a:noFill/>
+          </p:spPr>
+          <p:txBody>
+            <a:bodyPr wrap="square" rtlCol="0">
+              <a:spAutoFit/>
+            </a:bodyPr>
+            <a:lstStyle/>
+            <a:p>
+              <a:r>
+                <a:rPr lang="en-US" altLang="ko-KR" sz="1400" b="1" dirty="0">
+                  <a:solidFill>
+                    <a:srgbClr val="FF0000"/>
+                  </a:solidFill>
+                </a:rPr>
+                <a:t>(6)</a:t>
+              </a:r>
+              <a:endParaRPr lang="ko-KR" altLang="en-US" sz="1400" b="1" dirty="0">
+                <a:solidFill>
+                  <a:srgbClr val="FF0000"/>
+                </a:solidFill>
+              </a:endParaRPr>
+            </a:p>
+          </p:txBody>
+        </p:sp>
+      </p:grpSp>
+      <p:grpSp>
+        <p:nvGrpSpPr>
+          <p:cNvPr id="55" name="그룹 54">
+            <a:extLst>
+              <a:ext uri="{FF2B5EF4-FFF2-40B4-BE49-F238E27FC236}">
+                <a16:creationId xmlns:a16="http://schemas.microsoft.com/office/drawing/2014/main" id="{C2B716B3-2688-C8D3-A894-F557201B5819}"/>
+              </a:ext>
+            </a:extLst>
+          </p:cNvPr>
+          <p:cNvGrpSpPr/>
+          <p:nvPr/>
+        </p:nvGrpSpPr>
+        <p:grpSpPr>
+          <a:xfrm>
+            <a:off x="3990621" y="4779010"/>
+            <a:ext cx="1958622" cy="357626"/>
+            <a:chOff x="4075287" y="347931"/>
+            <a:chExt cx="1958622" cy="357626"/>
+          </a:xfrm>
+        </p:grpSpPr>
+        <p:cxnSp>
+          <p:nvCxnSpPr>
+            <p:cNvPr id="56" name="직선 화살표 연결선 55">
+              <a:extLst>
+                <a:ext uri="{FF2B5EF4-FFF2-40B4-BE49-F238E27FC236}">
+                  <a16:creationId xmlns:a16="http://schemas.microsoft.com/office/drawing/2014/main" id="{5081304C-98AE-18CC-D837-D40980A4C41A}"/>
+                </a:ext>
+              </a:extLst>
+            </p:cNvPr>
+            <p:cNvCxnSpPr>
+              <a:cxnSpLocks/>
+            </p:cNvCxnSpPr>
+            <p:nvPr/>
+          </p:nvCxnSpPr>
+          <p:spPr>
+            <a:xfrm>
+              <a:off x="4295420" y="705557"/>
+              <a:ext cx="1738489" cy="0"/>
+            </a:xfrm>
+            <a:prstGeom prst="straightConnector1">
+              <a:avLst/>
+            </a:prstGeom>
+            <a:ln w="12700">
+              <a:solidFill>
+                <a:srgbClr val="FF0000"/>
+              </a:solidFill>
+              <a:tailEnd type="triangle"/>
+            </a:ln>
+          </p:spPr>
+          <p:style>
+            <a:lnRef idx="1">
+              <a:schemeClr val="accent2"/>
+            </a:lnRef>
+            <a:fillRef idx="0">
+              <a:schemeClr val="accent2"/>
+            </a:fillRef>
+            <a:effectRef idx="0">
+              <a:schemeClr val="accent2"/>
+            </a:effectRef>
+            <a:fontRef idx="minor">
+              <a:schemeClr val="tx1"/>
+            </a:fontRef>
+          </p:style>
+        </p:cxnSp>
+        <p:sp>
+          <p:nvSpPr>
+            <p:cNvPr id="57" name="TextBox 56">
+              <a:extLst>
+                <a:ext uri="{FF2B5EF4-FFF2-40B4-BE49-F238E27FC236}">
+                  <a16:creationId xmlns:a16="http://schemas.microsoft.com/office/drawing/2014/main" id="{E918C17C-2E66-3904-3B2B-9AC8EA8256EE}"/>
+                </a:ext>
+              </a:extLst>
+            </p:cNvPr>
+            <p:cNvSpPr txBox="1"/>
+            <p:nvPr/>
+          </p:nvSpPr>
+          <p:spPr>
+            <a:xfrm>
+              <a:off x="4075287" y="347931"/>
+              <a:ext cx="440267" cy="307777"/>
+            </a:xfrm>
+            <a:prstGeom prst="rect">
+              <a:avLst/>
+            </a:prstGeom>
+            <a:noFill/>
+          </p:spPr>
+          <p:txBody>
+            <a:bodyPr wrap="square" rtlCol="0">
+              <a:spAutoFit/>
+            </a:bodyPr>
+            <a:lstStyle/>
+            <a:p>
+              <a:r>
+                <a:rPr lang="en-US" altLang="ko-KR" sz="1400" b="1" dirty="0">
+                  <a:solidFill>
+                    <a:srgbClr val="FF0000"/>
+                  </a:solidFill>
+                </a:rPr>
+                <a:t>(7)</a:t>
+              </a:r>
+              <a:endParaRPr lang="ko-KR" altLang="en-US" sz="1400" b="1" dirty="0">
+                <a:solidFill>
+                  <a:srgbClr val="FF0000"/>
+                </a:solidFill>
+              </a:endParaRPr>
+            </a:p>
+          </p:txBody>
+        </p:sp>
+      </p:grpSp>
+      <p:grpSp>
+        <p:nvGrpSpPr>
+          <p:cNvPr id="59" name="그룹 58">
+            <a:extLst>
+              <a:ext uri="{FF2B5EF4-FFF2-40B4-BE49-F238E27FC236}">
+                <a16:creationId xmlns:a16="http://schemas.microsoft.com/office/drawing/2014/main" id="{99BC106A-59A2-0D1F-778A-DB17C5F94B74}"/>
+              </a:ext>
+            </a:extLst>
+          </p:cNvPr>
+          <p:cNvGrpSpPr/>
+          <p:nvPr/>
+        </p:nvGrpSpPr>
+        <p:grpSpPr>
+          <a:xfrm>
+            <a:off x="10252224" y="2128857"/>
+            <a:ext cx="440267" cy="607821"/>
+            <a:chOff x="4354950" y="289055"/>
+            <a:chExt cx="440267" cy="607821"/>
+          </a:xfrm>
+        </p:grpSpPr>
+        <p:cxnSp>
+          <p:nvCxnSpPr>
+            <p:cNvPr id="60" name="직선 화살표 연결선 59">
+              <a:extLst>
+                <a:ext uri="{FF2B5EF4-FFF2-40B4-BE49-F238E27FC236}">
+                  <a16:creationId xmlns:a16="http://schemas.microsoft.com/office/drawing/2014/main" id="{374D8E0E-161C-92DD-5BBB-D37B5FC17712}"/>
+                </a:ext>
+              </a:extLst>
+            </p:cNvPr>
+            <p:cNvCxnSpPr>
+              <a:cxnSpLocks/>
+            </p:cNvCxnSpPr>
+            <p:nvPr/>
+          </p:nvCxnSpPr>
+          <p:spPr>
+            <a:xfrm flipV="1">
+              <a:off x="4356342" y="289055"/>
+              <a:ext cx="0" cy="607821"/>
+            </a:xfrm>
+            <a:prstGeom prst="straightConnector1">
+              <a:avLst/>
+            </a:prstGeom>
+            <a:ln w="12700">
+              <a:solidFill>
+                <a:srgbClr val="FF0000"/>
+              </a:solidFill>
+              <a:tailEnd type="triangle"/>
+            </a:ln>
+          </p:spPr>
+          <p:style>
+            <a:lnRef idx="1">
+              <a:schemeClr val="accent2"/>
+            </a:lnRef>
+            <a:fillRef idx="0">
+              <a:schemeClr val="accent2"/>
+            </a:fillRef>
+            <a:effectRef idx="0">
+              <a:schemeClr val="accent2"/>
+            </a:effectRef>
+            <a:fontRef idx="minor">
+              <a:schemeClr val="tx1"/>
+            </a:fontRef>
+          </p:style>
+        </p:cxnSp>
+        <p:sp>
+          <p:nvSpPr>
+            <p:cNvPr id="61" name="TextBox 60">
+              <a:extLst>
+                <a:ext uri="{FF2B5EF4-FFF2-40B4-BE49-F238E27FC236}">
+                  <a16:creationId xmlns:a16="http://schemas.microsoft.com/office/drawing/2014/main" id="{B5603E07-F378-3914-F016-F2CDA56E8383}"/>
+                </a:ext>
+              </a:extLst>
+            </p:cNvPr>
+            <p:cNvSpPr txBox="1"/>
+            <p:nvPr/>
+          </p:nvSpPr>
+          <p:spPr>
+            <a:xfrm>
+              <a:off x="4354950" y="393623"/>
+              <a:ext cx="440267" cy="307777"/>
+            </a:xfrm>
+            <a:prstGeom prst="rect">
+              <a:avLst/>
+            </a:prstGeom>
+            <a:noFill/>
+          </p:spPr>
+          <p:txBody>
+            <a:bodyPr wrap="square" rtlCol="0">
+              <a:spAutoFit/>
+            </a:bodyPr>
+            <a:lstStyle/>
+            <a:p>
+              <a:r>
+                <a:rPr lang="en-US" altLang="ko-KR" sz="1400" b="1" dirty="0">
+                  <a:solidFill>
+                    <a:srgbClr val="FF0000"/>
+                  </a:solidFill>
+                </a:rPr>
+                <a:t>(4)</a:t>
+              </a:r>
+              <a:endParaRPr lang="ko-KR" altLang="en-US" sz="1400" b="1" dirty="0">
+                <a:solidFill>
+                  <a:srgbClr val="FF0000"/>
+                </a:solidFill>
+              </a:endParaRPr>
+            </a:p>
+          </p:txBody>
+        </p:sp>
+      </p:grpSp>
+      <p:grpSp>
+        <p:nvGrpSpPr>
+          <p:cNvPr id="66" name="그룹 65">
+            <a:extLst>
+              <a:ext uri="{FF2B5EF4-FFF2-40B4-BE49-F238E27FC236}">
+                <a16:creationId xmlns:a16="http://schemas.microsoft.com/office/drawing/2014/main" id="{88CE9C10-9B54-3FBE-1FA8-922881486978}"/>
+              </a:ext>
+            </a:extLst>
+          </p:cNvPr>
+          <p:cNvGrpSpPr/>
+          <p:nvPr/>
+        </p:nvGrpSpPr>
+        <p:grpSpPr>
+          <a:xfrm>
+            <a:off x="9510305" y="3532676"/>
+            <a:ext cx="441436" cy="682235"/>
+            <a:chOff x="3916075" y="292026"/>
+            <a:chExt cx="441436" cy="682235"/>
+          </a:xfrm>
+        </p:grpSpPr>
+        <p:cxnSp>
+          <p:nvCxnSpPr>
+            <p:cNvPr id="67" name="직선 화살표 연결선 66">
+              <a:extLst>
+                <a:ext uri="{FF2B5EF4-FFF2-40B4-BE49-F238E27FC236}">
+                  <a16:creationId xmlns:a16="http://schemas.microsoft.com/office/drawing/2014/main" id="{0DEDC585-F91F-C184-7126-AB1B8EDA436A}"/>
+                </a:ext>
+              </a:extLst>
+            </p:cNvPr>
+            <p:cNvCxnSpPr>
+              <a:cxnSpLocks/>
+            </p:cNvCxnSpPr>
+            <p:nvPr/>
+          </p:nvCxnSpPr>
+          <p:spPr>
+            <a:xfrm>
+              <a:off x="4357511" y="337178"/>
+              <a:ext cx="0" cy="637083"/>
+            </a:xfrm>
+            <a:prstGeom prst="straightConnector1">
+              <a:avLst/>
+            </a:prstGeom>
+            <a:ln w="12700">
+              <a:solidFill>
+                <a:srgbClr val="FF0000"/>
+              </a:solidFill>
+              <a:tailEnd type="triangle"/>
+            </a:ln>
+          </p:spPr>
+          <p:style>
+            <a:lnRef idx="1">
+              <a:schemeClr val="accent2"/>
+            </a:lnRef>
+            <a:fillRef idx="0">
+              <a:schemeClr val="accent2"/>
+            </a:fillRef>
+            <a:effectRef idx="0">
+              <a:schemeClr val="accent2"/>
+            </a:effectRef>
+            <a:fontRef idx="minor">
+              <a:schemeClr val="tx1"/>
+            </a:fontRef>
+          </p:style>
+        </p:cxnSp>
+        <p:sp>
+          <p:nvSpPr>
+            <p:cNvPr id="68" name="TextBox 67">
+              <a:extLst>
+                <a:ext uri="{FF2B5EF4-FFF2-40B4-BE49-F238E27FC236}">
+                  <a16:creationId xmlns:a16="http://schemas.microsoft.com/office/drawing/2014/main" id="{35844824-F7C0-2ECE-E132-DD8297A84B0C}"/>
+                </a:ext>
+              </a:extLst>
+            </p:cNvPr>
+            <p:cNvSpPr txBox="1"/>
+            <p:nvPr/>
+          </p:nvSpPr>
+          <p:spPr>
+            <a:xfrm>
+              <a:off x="3916075" y="292026"/>
+              <a:ext cx="440267" cy="307777"/>
+            </a:xfrm>
+            <a:prstGeom prst="rect">
+              <a:avLst/>
+            </a:prstGeom>
+            <a:noFill/>
+          </p:spPr>
+          <p:txBody>
+            <a:bodyPr wrap="square" rtlCol="0">
+              <a:spAutoFit/>
+            </a:bodyPr>
+            <a:lstStyle/>
+            <a:p>
+              <a:r>
+                <a:rPr lang="en-US" altLang="ko-KR" sz="1400" b="1" dirty="0">
+                  <a:solidFill>
+                    <a:srgbClr val="FF0000"/>
+                  </a:solidFill>
+                </a:rPr>
+                <a:t>(8)</a:t>
+              </a:r>
+              <a:endParaRPr lang="ko-KR" altLang="en-US" sz="1400" b="1" dirty="0">
+                <a:solidFill>
+                  <a:srgbClr val="FF0000"/>
+                </a:solidFill>
+              </a:endParaRPr>
+            </a:p>
+          </p:txBody>
+        </p:sp>
+      </p:grpSp>
+      <p:grpSp>
+        <p:nvGrpSpPr>
+          <p:cNvPr id="69" name="그룹 68">
+            <a:extLst>
+              <a:ext uri="{FF2B5EF4-FFF2-40B4-BE49-F238E27FC236}">
+                <a16:creationId xmlns:a16="http://schemas.microsoft.com/office/drawing/2014/main" id="{9CFB45B5-29A7-8AB5-5C7A-C7AE789212BD}"/>
+              </a:ext>
+            </a:extLst>
+          </p:cNvPr>
+          <p:cNvGrpSpPr/>
+          <p:nvPr/>
+        </p:nvGrpSpPr>
+        <p:grpSpPr>
+          <a:xfrm>
+            <a:off x="7719362" y="5334895"/>
+            <a:ext cx="1271823" cy="307777"/>
+            <a:chOff x="3087513" y="630687"/>
+            <a:chExt cx="1271823" cy="307777"/>
+          </a:xfrm>
+        </p:grpSpPr>
+        <p:cxnSp>
+          <p:nvCxnSpPr>
+            <p:cNvPr id="70" name="직선 화살표 연결선 69">
+              <a:extLst>
+                <a:ext uri="{FF2B5EF4-FFF2-40B4-BE49-F238E27FC236}">
+                  <a16:creationId xmlns:a16="http://schemas.microsoft.com/office/drawing/2014/main" id="{417AE269-A637-61B8-3794-4EA9F38FD46E}"/>
+                </a:ext>
+              </a:extLst>
+            </p:cNvPr>
+            <p:cNvCxnSpPr>
+              <a:cxnSpLocks/>
+            </p:cNvCxnSpPr>
+            <p:nvPr/>
+          </p:nvCxnSpPr>
+          <p:spPr>
+            <a:xfrm flipH="1">
+              <a:off x="3087513" y="644955"/>
+              <a:ext cx="1185331" cy="0"/>
+            </a:xfrm>
+            <a:prstGeom prst="straightConnector1">
+              <a:avLst/>
+            </a:prstGeom>
+            <a:ln w="12700">
+              <a:solidFill>
+                <a:srgbClr val="FF0000"/>
+              </a:solidFill>
+              <a:tailEnd type="triangle"/>
+            </a:ln>
+          </p:spPr>
+          <p:style>
+            <a:lnRef idx="1">
+              <a:schemeClr val="accent2"/>
+            </a:lnRef>
+            <a:fillRef idx="0">
+              <a:schemeClr val="accent2"/>
+            </a:fillRef>
+            <a:effectRef idx="0">
+              <a:schemeClr val="accent2"/>
+            </a:effectRef>
+            <a:fontRef idx="minor">
+              <a:schemeClr val="tx1"/>
+            </a:fontRef>
+          </p:style>
+        </p:cxnSp>
+        <p:sp>
+          <p:nvSpPr>
+            <p:cNvPr id="71" name="TextBox 70">
+              <a:extLst>
+                <a:ext uri="{FF2B5EF4-FFF2-40B4-BE49-F238E27FC236}">
+                  <a16:creationId xmlns:a16="http://schemas.microsoft.com/office/drawing/2014/main" id="{623BFA65-07D9-E414-A495-0BB8F09420D9}"/>
+                </a:ext>
+              </a:extLst>
+            </p:cNvPr>
+            <p:cNvSpPr txBox="1"/>
+            <p:nvPr/>
+          </p:nvSpPr>
+          <p:spPr>
+            <a:xfrm>
+              <a:off x="3919069" y="630687"/>
+              <a:ext cx="440267" cy="307777"/>
+            </a:xfrm>
+            <a:prstGeom prst="rect">
+              <a:avLst/>
+            </a:prstGeom>
+            <a:noFill/>
+          </p:spPr>
+          <p:txBody>
+            <a:bodyPr wrap="square" rtlCol="0">
+              <a:spAutoFit/>
+            </a:bodyPr>
+            <a:lstStyle/>
+            <a:p>
+              <a:r>
+                <a:rPr lang="en-US" altLang="ko-KR" sz="1400" b="1" dirty="0">
+                  <a:solidFill>
+                    <a:srgbClr val="FF0000"/>
+                  </a:solidFill>
+                </a:rPr>
+                <a:t>(9)</a:t>
+              </a:r>
+              <a:endParaRPr lang="ko-KR" altLang="en-US" sz="1400" b="1" dirty="0">
+                <a:solidFill>
+                  <a:srgbClr val="FF0000"/>
+                </a:solidFill>
+              </a:endParaRPr>
+            </a:p>
+          </p:txBody>
+        </p:sp>
+      </p:grpSp>
+      <p:pic>
+        <p:nvPicPr>
+          <p:cNvPr id="73" name="그림 72">
+            <a:extLst>
+              <a:ext uri="{FF2B5EF4-FFF2-40B4-BE49-F238E27FC236}">
+                <a16:creationId xmlns:a16="http://schemas.microsoft.com/office/drawing/2014/main" id="{3E13AD85-37F9-4DD3-D769-6B56EB3F8F20}"/>
+              </a:ext>
+            </a:extLst>
+          </p:cNvPr>
+          <p:cNvPicPr>
+            <a:picLocks noChangeAspect="1"/>
+          </p:cNvPicPr>
+          <p:nvPr/>
+        </p:nvPicPr>
+        <p:blipFill>
+          <a:blip r:embed="rId4">
+            <a:extLst>
+              <a:ext uri="{28A0092B-C50C-407E-A947-70E740481C1C}">
+                <a14:useLocalDpi xmlns:a14="http://schemas.microsoft.com/office/drawing/2010/main" val="0"/>
+              </a:ext>
+            </a:extLst>
+          </a:blip>
+          <a:stretch>
+            <a:fillRect/>
+          </a:stretch>
+        </p:blipFill>
+        <p:spPr>
+          <a:xfrm>
+            <a:off x="10191952" y="4058044"/>
+            <a:ext cx="1762980" cy="302337"/>
+          </a:xfrm>
+          <a:prstGeom prst="rect">
+            <a:avLst/>
+          </a:prstGeom>
+          <a:effectLst>
+            <a:outerShdw blurRad="50800" dist="38100" dir="2700000" algn="tl" rotWithShape="0">
+              <a:prstClr val="black">
+                <a:alpha val="40000"/>
+              </a:prstClr>
+            </a:outerShdw>
+          </a:effectLst>
+        </p:spPr>
+      </p:pic>
+      <p:pic>
+        <p:nvPicPr>
+          <p:cNvPr id="75" name="그림 74">
+            <a:extLst>
+              <a:ext uri="{FF2B5EF4-FFF2-40B4-BE49-F238E27FC236}">
+                <a16:creationId xmlns:a16="http://schemas.microsoft.com/office/drawing/2014/main" id="{4AD7D7C2-EF3C-E8BD-A7E9-02BA10B6B6D3}"/>
+              </a:ext>
+            </a:extLst>
+          </p:cNvPr>
+          <p:cNvPicPr>
+            <a:picLocks noChangeAspect="1"/>
+          </p:cNvPicPr>
+          <p:nvPr/>
+        </p:nvPicPr>
+        <p:blipFill>
+          <a:blip r:embed="rId5">
+            <a:extLst>
+              <a:ext uri="{28A0092B-C50C-407E-A947-70E740481C1C}">
+                <a14:useLocalDpi xmlns:a14="http://schemas.microsoft.com/office/drawing/2010/main" val="0"/>
+              </a:ext>
+            </a:extLst>
+          </a:blip>
+          <a:stretch>
+            <a:fillRect/>
+          </a:stretch>
+        </p:blipFill>
+        <p:spPr>
+          <a:xfrm>
+            <a:off x="9906329" y="1355703"/>
+            <a:ext cx="2110692" cy="404958"/>
+          </a:xfrm>
+          <a:prstGeom prst="rect">
+            <a:avLst/>
+          </a:prstGeom>
+          <a:effectLst>
+            <a:outerShdw blurRad="50800" dist="38100" dir="2700000" algn="tl" rotWithShape="0">
+              <a:prstClr val="black">
+                <a:alpha val="40000"/>
+              </a:prstClr>
+            </a:outerShdw>
+          </a:effectLst>
+        </p:spPr>
+      </p:pic>
+      <p:cxnSp>
+        <p:nvCxnSpPr>
+          <p:cNvPr id="77" name="직선 화살표 연결선 76">
+            <a:extLst>
+              <a:ext uri="{FF2B5EF4-FFF2-40B4-BE49-F238E27FC236}">
+                <a16:creationId xmlns:a16="http://schemas.microsoft.com/office/drawing/2014/main" id="{62898084-9E73-BA86-7796-47067626B4A8}"/>
+              </a:ext>
+            </a:extLst>
+          </p:cNvPr>
+          <p:cNvCxnSpPr>
+            <a:cxnSpLocks/>
+          </p:cNvCxnSpPr>
+          <p:nvPr/>
+        </p:nvCxnSpPr>
+        <p:spPr>
+          <a:xfrm flipH="1" flipV="1">
+            <a:off x="4181363" y="3158664"/>
+            <a:ext cx="1858191" cy="1977972"/>
+          </a:xfrm>
+          <a:prstGeom prst="straightConnector1">
+            <a:avLst/>
+          </a:prstGeom>
+          <a:ln>
+            <a:tailEnd type="triangle"/>
+          </a:ln>
+        </p:spPr>
+        <p:style>
+          <a:lnRef idx="1">
+            <a:schemeClr val="accent1"/>
+          </a:lnRef>
+          <a:fillRef idx="0">
+            <a:schemeClr val="accent1"/>
+          </a:fillRef>
+          <a:effectRef idx="0">
+            <a:schemeClr val="accent1"/>
+          </a:effectRef>
+          <a:fontRef idx="minor">
+            <a:schemeClr val="tx1"/>
+          </a:fontRef>
+        </p:style>
+      </p:cxnSp>
+      <p:sp>
+        <p:nvSpPr>
+          <p:cNvPr id="80" name="TextBox 79">
+            <a:extLst>
+              <a:ext uri="{FF2B5EF4-FFF2-40B4-BE49-F238E27FC236}">
+                <a16:creationId xmlns:a16="http://schemas.microsoft.com/office/drawing/2014/main" id="{39EAE6C1-ACEA-724F-F918-A339ACEDBA11}"/>
+              </a:ext>
+            </a:extLst>
+          </p:cNvPr>
+          <p:cNvSpPr txBox="1"/>
+          <p:nvPr/>
+        </p:nvSpPr>
+        <p:spPr>
+          <a:xfrm>
+            <a:off x="3727569" y="3310457"/>
+            <a:ext cx="1382889" cy="276999"/>
+          </a:xfrm>
+          <a:prstGeom prst="rect">
+            <a:avLst/>
+          </a:prstGeom>
+          <a:noFill/>
+        </p:spPr>
+        <p:txBody>
+          <a:bodyPr wrap="square" rtlCol="0">
+            <a:spAutoFit/>
+          </a:bodyPr>
+          <a:lstStyle/>
+          <a:p>
+            <a:r>
+              <a:rPr lang="en-US" altLang="ko-KR" sz="1200" b="1" dirty="0" err="1"/>
+              <a:t>action_pred</a:t>
+            </a:r>
+            <a:endParaRPr lang="ko-KR" altLang="en-US" sz="1200" b="1" dirty="0"/>
+          </a:p>
+        </p:txBody>
+      </p:sp>
+      <p:sp>
+        <p:nvSpPr>
+          <p:cNvPr id="84" name="직사각형 83">
+            <a:extLst>
+              <a:ext uri="{FF2B5EF4-FFF2-40B4-BE49-F238E27FC236}">
+                <a16:creationId xmlns:a16="http://schemas.microsoft.com/office/drawing/2014/main" id="{621FC3DD-8432-424D-F15D-1C53F5CFFDD1}"/>
+              </a:ext>
+            </a:extLst>
+          </p:cNvPr>
+          <p:cNvSpPr/>
+          <p:nvPr/>
+        </p:nvSpPr>
+        <p:spPr>
+          <a:xfrm>
+            <a:off x="6376468" y="1300989"/>
+            <a:ext cx="1490133" cy="467100"/>
+          </a:xfrm>
+          <a:prstGeom prst="rect">
+            <a:avLst/>
+          </a:prstGeom>
+          <a:solidFill>
+            <a:srgbClr val="FFFFFF">
+              <a:alpha val="85098"/>
+            </a:srgbClr>
+          </a:solidFill>
+          <a:ln>
+            <a:noFill/>
+          </a:ln>
+        </p:spPr>
+        <p:style>
+          <a:lnRef idx="2">
+            <a:schemeClr val="accent1">
+              <a:shade val="15000"/>
+            </a:schemeClr>
+          </a:lnRef>
+          <a:fillRef idx="1">
+            <a:schemeClr val="accent1"/>
+          </a:fillRef>
+          <a:effectRef idx="0">
+            <a:schemeClr val="accent1"/>
+          </a:effectRef>
+          <a:fontRef idx="minor">
+            <a:schemeClr val="lt1"/>
+          </a:fontRef>
+        </p:style>
+        <p:txBody>
+          <a:bodyPr rtlCol="0" anchor="ctr"/>
+          <a:lstStyle/>
+          <a:p>
+            <a:pPr algn="ctr"/>
+            <a:endParaRPr lang="ko-KR" altLang="en-US"/>
+          </a:p>
+        </p:txBody>
+      </p:sp>
+      <p:sp>
+        <p:nvSpPr>
+          <p:cNvPr id="85" name="직사각형 84">
+            <a:extLst>
+              <a:ext uri="{FF2B5EF4-FFF2-40B4-BE49-F238E27FC236}">
+                <a16:creationId xmlns:a16="http://schemas.microsoft.com/office/drawing/2014/main" id="{D62F7C17-1747-98E5-74CE-A1354F34685D}"/>
+              </a:ext>
+            </a:extLst>
+          </p:cNvPr>
+          <p:cNvSpPr/>
+          <p:nvPr/>
+        </p:nvSpPr>
+        <p:spPr>
+          <a:xfrm>
+            <a:off x="5971116" y="3893280"/>
+            <a:ext cx="2470147" cy="1329579"/>
+          </a:xfrm>
+          <a:prstGeom prst="rect">
+            <a:avLst/>
+          </a:prstGeom>
+          <a:solidFill>
+            <a:srgbClr val="FFFFFF">
+              <a:alpha val="85098"/>
+            </a:srgbClr>
+          </a:solidFill>
+          <a:ln>
+            <a:noFill/>
+          </a:ln>
+        </p:spPr>
+        <p:style>
+          <a:lnRef idx="2">
+            <a:schemeClr val="accent1">
+              <a:shade val="15000"/>
+            </a:schemeClr>
+          </a:lnRef>
+          <a:fillRef idx="1">
+            <a:schemeClr val="accent1"/>
+          </a:fillRef>
+          <a:effectRef idx="0">
+            <a:schemeClr val="accent1"/>
+          </a:effectRef>
+          <a:fontRef idx="minor">
+            <a:schemeClr val="lt1"/>
+          </a:fontRef>
+        </p:style>
+        <p:txBody>
+          <a:bodyPr rtlCol="0" anchor="ctr"/>
+          <a:lstStyle/>
+          <a:p>
+            <a:pPr algn="ctr"/>
+            <a:endParaRPr lang="ko-KR" altLang="en-US"/>
+          </a:p>
+        </p:txBody>
+      </p:sp>
+      <p:sp>
+        <p:nvSpPr>
+          <p:cNvPr id="86" name="직사각형 85">
+            <a:extLst>
+              <a:ext uri="{FF2B5EF4-FFF2-40B4-BE49-F238E27FC236}">
+                <a16:creationId xmlns:a16="http://schemas.microsoft.com/office/drawing/2014/main" id="{657EC908-73AF-9F6B-29AB-99297E417284}"/>
+              </a:ext>
+            </a:extLst>
+          </p:cNvPr>
+          <p:cNvSpPr/>
+          <p:nvPr/>
+        </p:nvSpPr>
+        <p:spPr>
+          <a:xfrm>
+            <a:off x="6000045" y="1344100"/>
+            <a:ext cx="375031" cy="1193255"/>
+          </a:xfrm>
+          <a:prstGeom prst="rect">
+            <a:avLst/>
+          </a:prstGeom>
+          <a:solidFill>
+            <a:srgbClr val="FFFFFF">
+              <a:alpha val="85098"/>
+            </a:srgbClr>
+          </a:solidFill>
+          <a:ln>
+            <a:noFill/>
+          </a:ln>
+        </p:spPr>
+        <p:style>
+          <a:lnRef idx="2">
+            <a:schemeClr val="accent1">
+              <a:shade val="15000"/>
+            </a:schemeClr>
+          </a:lnRef>
+          <a:fillRef idx="1">
+            <a:schemeClr val="accent1"/>
+          </a:fillRef>
+          <a:effectRef idx="0">
+            <a:schemeClr val="accent1"/>
+          </a:effectRef>
+          <a:fontRef idx="minor">
+            <a:schemeClr val="lt1"/>
+          </a:fontRef>
+        </p:style>
+        <p:txBody>
+          <a:bodyPr rtlCol="0" anchor="ctr"/>
+          <a:lstStyle/>
+          <a:p>
+            <a:pPr algn="ctr"/>
+            <a:endParaRPr lang="ko-KR" altLang="en-US"/>
+          </a:p>
+        </p:txBody>
+      </p:sp>
+      <p:sp>
+        <p:nvSpPr>
+          <p:cNvPr id="87" name="직사각형 86">
+            <a:extLst>
+              <a:ext uri="{FF2B5EF4-FFF2-40B4-BE49-F238E27FC236}">
+                <a16:creationId xmlns:a16="http://schemas.microsoft.com/office/drawing/2014/main" id="{26EFD820-451C-DFC5-E692-81BDBA8289C6}"/>
+              </a:ext>
+            </a:extLst>
+          </p:cNvPr>
+          <p:cNvSpPr/>
+          <p:nvPr/>
+        </p:nvSpPr>
+        <p:spPr>
+          <a:xfrm>
+            <a:off x="585951" y="1110549"/>
+            <a:ext cx="2711745" cy="4714514"/>
+          </a:xfrm>
+          <a:prstGeom prst="rect">
+            <a:avLst/>
+          </a:prstGeom>
+          <a:solidFill>
+            <a:srgbClr val="FFFFFF">
+              <a:alpha val="74902"/>
+            </a:srgbClr>
+          </a:solidFill>
+          <a:ln>
+            <a:noFill/>
+          </a:ln>
+        </p:spPr>
+        <p:style>
+          <a:lnRef idx="2">
+            <a:schemeClr val="accent1">
+              <a:shade val="15000"/>
+            </a:schemeClr>
+          </a:lnRef>
+          <a:fillRef idx="1">
+            <a:schemeClr val="accent1"/>
+          </a:fillRef>
+          <a:effectRef idx="0">
+            <a:schemeClr val="accent1"/>
+          </a:effectRef>
+          <a:fontRef idx="minor">
+            <a:schemeClr val="lt1"/>
+          </a:fontRef>
+        </p:style>
+        <p:txBody>
+          <a:bodyPr rtlCol="0" anchor="ctr"/>
+          <a:lstStyle/>
+          <a:p>
+            <a:pPr algn="ctr"/>
+            <a:endParaRPr lang="ko-KR" altLang="en-US"/>
+          </a:p>
+        </p:txBody>
+      </p:sp>
+    </p:spTree>
+    <p:extLst>
+      <p:ext uri="{BB962C8B-B14F-4D97-AF65-F5344CB8AC3E}">
+        <p14:creationId xmlns:p14="http://schemas.microsoft.com/office/powerpoint/2010/main" val="1669108842"/>
       </p:ext>
     </p:extLst>
   </p:cSld>

</xml_diff>